<commit_message>
caso de teste(ainda não finalizado)
</commit_message>
<xml_diff>
--- a/RegrasNegocio/RN_Requisitos.pptx
+++ b/RegrasNegocio/RN_Requisitos.pptx
@@ -13,6 +13,12 @@
     <p:sldId id="260" r:id="rId7"/>
     <p:sldId id="262" r:id="rId8"/>
     <p:sldId id="263" r:id="rId9"/>
+    <p:sldId id="264" r:id="rId10"/>
+    <p:sldId id="266" r:id="rId11"/>
+    <p:sldId id="265" r:id="rId12"/>
+    <p:sldId id="267" r:id="rId13"/>
+    <p:sldId id="268" r:id="rId14"/>
+    <p:sldId id="269" r:id="rId15"/>
   </p:sldIdLst>
   <p:sldSz cx="12192000" cy="6858000"/>
   <p:notesSz cx="6858000" cy="9144000"/>
@@ -266,7 +272,7 @@
           <a:p>
             <a:fld id="{0A1764AE-7598-4101-9D63-6EC8D69CE664}" type="datetimeFigureOut">
               <a:rPr lang="pt-BR" smtClean="0"/>
-              <a:t>12/12/2023</a:t>
+              <a:t>22/01/2024</a:t>
             </a:fld>
             <a:endParaRPr lang="pt-BR"/>
           </a:p>
@@ -464,7 +470,7 @@
           <a:p>
             <a:fld id="{0A1764AE-7598-4101-9D63-6EC8D69CE664}" type="datetimeFigureOut">
               <a:rPr lang="pt-BR" smtClean="0"/>
-              <a:t>12/12/2023</a:t>
+              <a:t>22/01/2024</a:t>
             </a:fld>
             <a:endParaRPr lang="pt-BR"/>
           </a:p>
@@ -672,7 +678,7 @@
           <a:p>
             <a:fld id="{0A1764AE-7598-4101-9D63-6EC8D69CE664}" type="datetimeFigureOut">
               <a:rPr lang="pt-BR" smtClean="0"/>
-              <a:t>12/12/2023</a:t>
+              <a:t>22/01/2024</a:t>
             </a:fld>
             <a:endParaRPr lang="pt-BR"/>
           </a:p>
@@ -870,7 +876,7 @@
           <a:p>
             <a:fld id="{0A1764AE-7598-4101-9D63-6EC8D69CE664}" type="datetimeFigureOut">
               <a:rPr lang="pt-BR" smtClean="0"/>
-              <a:t>12/12/2023</a:t>
+              <a:t>22/01/2024</a:t>
             </a:fld>
             <a:endParaRPr lang="pt-BR"/>
           </a:p>
@@ -1145,7 +1151,7 @@
           <a:p>
             <a:fld id="{0A1764AE-7598-4101-9D63-6EC8D69CE664}" type="datetimeFigureOut">
               <a:rPr lang="pt-BR" smtClean="0"/>
-              <a:t>12/12/2023</a:t>
+              <a:t>22/01/2024</a:t>
             </a:fld>
             <a:endParaRPr lang="pt-BR"/>
           </a:p>
@@ -1410,7 +1416,7 @@
           <a:p>
             <a:fld id="{0A1764AE-7598-4101-9D63-6EC8D69CE664}" type="datetimeFigureOut">
               <a:rPr lang="pt-BR" smtClean="0"/>
-              <a:t>12/12/2023</a:t>
+              <a:t>22/01/2024</a:t>
             </a:fld>
             <a:endParaRPr lang="pt-BR"/>
           </a:p>
@@ -1822,7 +1828,7 @@
           <a:p>
             <a:fld id="{0A1764AE-7598-4101-9D63-6EC8D69CE664}" type="datetimeFigureOut">
               <a:rPr lang="pt-BR" smtClean="0"/>
-              <a:t>12/12/2023</a:t>
+              <a:t>22/01/2024</a:t>
             </a:fld>
             <a:endParaRPr lang="pt-BR"/>
           </a:p>
@@ -1963,7 +1969,7 @@
           <a:p>
             <a:fld id="{0A1764AE-7598-4101-9D63-6EC8D69CE664}" type="datetimeFigureOut">
               <a:rPr lang="pt-BR" smtClean="0"/>
-              <a:t>12/12/2023</a:t>
+              <a:t>22/01/2024</a:t>
             </a:fld>
             <a:endParaRPr lang="pt-BR"/>
           </a:p>
@@ -2076,7 +2082,7 @@
           <a:p>
             <a:fld id="{0A1764AE-7598-4101-9D63-6EC8D69CE664}" type="datetimeFigureOut">
               <a:rPr lang="pt-BR" smtClean="0"/>
-              <a:t>12/12/2023</a:t>
+              <a:t>22/01/2024</a:t>
             </a:fld>
             <a:endParaRPr lang="pt-BR"/>
           </a:p>
@@ -2387,7 +2393,7 @@
           <a:p>
             <a:fld id="{0A1764AE-7598-4101-9D63-6EC8D69CE664}" type="datetimeFigureOut">
               <a:rPr lang="pt-BR" smtClean="0"/>
-              <a:t>12/12/2023</a:t>
+              <a:t>22/01/2024</a:t>
             </a:fld>
             <a:endParaRPr lang="pt-BR"/>
           </a:p>
@@ -2675,7 +2681,7 @@
           <a:p>
             <a:fld id="{0A1764AE-7598-4101-9D63-6EC8D69CE664}" type="datetimeFigureOut">
               <a:rPr lang="pt-BR" smtClean="0"/>
-              <a:t>12/12/2023</a:t>
+              <a:t>22/01/2024</a:t>
             </a:fld>
             <a:endParaRPr lang="pt-BR"/>
           </a:p>
@@ -2916,7 +2922,7 @@
           <a:p>
             <a:fld id="{0A1764AE-7598-4101-9D63-6EC8D69CE664}" type="datetimeFigureOut">
               <a:rPr lang="pt-BR" smtClean="0"/>
-              <a:t>12/12/2023</a:t>
+              <a:t>22/01/2024</a:t>
             </a:fld>
             <a:endParaRPr lang="pt-BR"/>
           </a:p>
@@ -3382,7 +3388,7 @@
           <a:bodyPr/>
           <a:lstStyle/>
           <a:p>
-            <a:endParaRPr lang="pt-BR"/>
+            <a:endParaRPr lang="pt-BR" dirty="0"/>
           </a:p>
         </p:txBody>
       </p:sp>
@@ -3390,6 +3396,1845 @@
     <p:extLst>
       <p:ext uri="{BB962C8B-B14F-4D97-AF65-F5344CB8AC3E}">
         <p14:creationId xmlns:p14="http://schemas.microsoft.com/office/powerpoint/2010/main" val="1359056639"/>
+      </p:ext>
+    </p:extLst>
+  </p:cSld>
+  <p:clrMapOvr>
+    <a:masterClrMapping/>
+  </p:clrMapOvr>
+</p:sld>
+</file>
+
+<file path=ppt/slides/slide10.xml><?xml version="1.0" encoding="utf-8"?>
+<p:sld xmlns:a="http://schemas.openxmlformats.org/drawingml/2006/main" xmlns:r="http://schemas.openxmlformats.org/officeDocument/2006/relationships" xmlns:p="http://schemas.openxmlformats.org/presentationml/2006/main">
+  <p:cSld>
+    <p:spTree>
+      <p:nvGrpSpPr>
+        <p:cNvPr id="1" name=""/>
+        <p:cNvGrpSpPr/>
+        <p:nvPr/>
+      </p:nvGrpSpPr>
+      <p:grpSpPr>
+        <a:xfrm>
+          <a:off x="0" y="0"/>
+          <a:ext cx="0" cy="0"/>
+          <a:chOff x="0" y="0"/>
+          <a:chExt cx="0" cy="0"/>
+        </a:xfrm>
+      </p:grpSpPr>
+      <p:sp>
+        <p:nvSpPr>
+          <p:cNvPr id="3" name="Retângulo Arredondado 2"/>
+          <p:cNvSpPr/>
+          <p:nvPr/>
+        </p:nvSpPr>
+        <p:spPr>
+          <a:xfrm>
+            <a:off x="1189608" y="705853"/>
+            <a:ext cx="9445841" cy="593558"/>
+          </a:xfrm>
+          <a:prstGeom prst="roundRect">
+            <a:avLst/>
+          </a:prstGeom>
+        </p:spPr>
+        <p:style>
+          <a:lnRef idx="2">
+            <a:schemeClr val="dk1">
+              <a:shade val="50000"/>
+            </a:schemeClr>
+          </a:lnRef>
+          <a:fillRef idx="1">
+            <a:schemeClr val="dk1"/>
+          </a:fillRef>
+          <a:effectRef idx="0">
+            <a:schemeClr val="dk1"/>
+          </a:effectRef>
+          <a:fontRef idx="minor">
+            <a:schemeClr val="lt1"/>
+          </a:fontRef>
+        </p:style>
+        <p:txBody>
+          <a:bodyPr rtlCol="0" anchor="ctr"/>
+          <a:lstStyle/>
+          <a:p>
+            <a:pPr algn="ctr"/>
+            <a:endParaRPr lang="pt-BR"/>
+          </a:p>
+        </p:txBody>
+      </p:sp>
+      <p:sp>
+        <p:nvSpPr>
+          <p:cNvPr id="5" name="Retângulo 4"/>
+          <p:cNvSpPr/>
+          <p:nvPr/>
+        </p:nvSpPr>
+        <p:spPr>
+          <a:xfrm>
+            <a:off x="1267324" y="1299410"/>
+            <a:ext cx="9272337" cy="5301665"/>
+          </a:xfrm>
+          <a:prstGeom prst="rect">
+            <a:avLst/>
+          </a:prstGeom>
+          <a:noFill/>
+          <a:ln>
+            <a:solidFill>
+              <a:schemeClr val="tx1"/>
+            </a:solidFill>
+          </a:ln>
+        </p:spPr>
+        <p:style>
+          <a:lnRef idx="2">
+            <a:schemeClr val="accent1">
+              <a:shade val="50000"/>
+            </a:schemeClr>
+          </a:lnRef>
+          <a:fillRef idx="1">
+            <a:schemeClr val="accent1"/>
+          </a:fillRef>
+          <a:effectRef idx="0">
+            <a:schemeClr val="accent1"/>
+          </a:effectRef>
+          <a:fontRef idx="minor">
+            <a:schemeClr val="lt1"/>
+          </a:fontRef>
+        </p:style>
+        <p:txBody>
+          <a:bodyPr rtlCol="0" anchor="ctr"/>
+          <a:lstStyle/>
+          <a:p>
+            <a:pPr algn="ctr"/>
+            <a:endParaRPr lang="pt-BR"/>
+          </a:p>
+        </p:txBody>
+      </p:sp>
+      <p:sp>
+        <p:nvSpPr>
+          <p:cNvPr id="6" name="CaixaDeTexto 5"/>
+          <p:cNvSpPr txBox="1"/>
+          <p:nvPr/>
+        </p:nvSpPr>
+        <p:spPr>
+          <a:xfrm>
+            <a:off x="1395660" y="1495732"/>
+            <a:ext cx="9144001" cy="2339102"/>
+          </a:xfrm>
+          <a:prstGeom prst="rect">
+            <a:avLst/>
+          </a:prstGeom>
+          <a:noFill/>
+        </p:spPr>
+        <p:txBody>
+          <a:bodyPr wrap="square" rtlCol="0">
+            <a:spAutoFit/>
+          </a:bodyPr>
+          <a:lstStyle/>
+          <a:p>
+            <a:r>
+              <a:rPr lang="pt-BR" b="1" dirty="0" smtClean="0"/>
+              <a:t>RN01</a:t>
+            </a:r>
+            <a:r>
+              <a:rPr lang="pt-BR" dirty="0" smtClean="0"/>
+              <a:t>: Tela </a:t>
+            </a:r>
+            <a:r>
+              <a:rPr lang="pt-BR" dirty="0"/>
+              <a:t>Requisição &gt; Campos</a:t>
+            </a:r>
+            <a:endParaRPr lang="pt-BR" dirty="0" smtClean="0"/>
+          </a:p>
+          <a:p>
+            <a:r>
+              <a:rPr lang="pt-BR" b="1" dirty="0" smtClean="0"/>
+              <a:t>CT</a:t>
+            </a:r>
+            <a:r>
+              <a:rPr lang="pt-BR" dirty="0" smtClean="0"/>
+              <a:t>: Validar a obrigatoriedade de alguns campos (com exceção dos campos: Nome Funcionário)</a:t>
+            </a:r>
+          </a:p>
+          <a:p>
+            <a:pPr lvl="0"/>
+            <a:r>
+              <a:rPr lang="pt-BR" dirty="0" smtClean="0"/>
+              <a:t>Resultado esperado: </a:t>
+            </a:r>
+            <a:r>
+              <a:rPr lang="pt-BR" dirty="0"/>
+              <a:t>T</a:t>
+            </a:r>
+            <a:r>
+              <a:rPr lang="pt-BR" dirty="0" smtClean="0"/>
+              <a:t>odos </a:t>
+            </a:r>
+            <a:r>
+              <a:rPr lang="pt-BR" dirty="0"/>
+              <a:t>os campos </a:t>
+            </a:r>
+            <a:r>
+              <a:rPr lang="pt-BR" dirty="0" smtClean="0"/>
+              <a:t>devem ser preenchidos obrigatoriamente, a única exceção deve ser o campo Nome Funcionário. Se os campos obrigatórios não forem preenchidos, eles devem ficar com os fundos vermelhos e alertar o usuário da sua obrigatoriedade. Se todos forem preenchidos, deve adicionar normalmente.</a:t>
+            </a:r>
+          </a:p>
+          <a:p>
+            <a:r>
+              <a:rPr lang="pt-BR" b="1" dirty="0" err="1" smtClean="0"/>
+              <a:t>Pré</a:t>
+            </a:r>
+            <a:r>
+              <a:rPr lang="pt-BR" b="1" dirty="0" smtClean="0"/>
+              <a:t>- condição</a:t>
+            </a:r>
+            <a:r>
+              <a:rPr lang="pt-BR" dirty="0" smtClean="0"/>
+              <a:t>: Tela do almoxarifado deve estar aberta.</a:t>
+            </a:r>
+          </a:p>
+          <a:p>
+            <a:endParaRPr lang="pt-BR" sz="2000" dirty="0"/>
+          </a:p>
+        </p:txBody>
+      </p:sp>
+      <p:graphicFrame>
+        <p:nvGraphicFramePr>
+          <p:cNvPr id="8" name="Tabela 7"/>
+          <p:cNvGraphicFramePr>
+            <a:graphicFrameLocks noGrp="1"/>
+          </p:cNvGraphicFramePr>
+          <p:nvPr>
+            <p:extLst>
+              <p:ext uri="{D42A27DB-BD31-4B8C-83A1-F6EECF244321}">
+                <p14:modId xmlns:p14="http://schemas.microsoft.com/office/powerpoint/2010/main" val="2677908334"/>
+              </p:ext>
+            </p:extLst>
+          </p:nvPr>
+        </p:nvGraphicFramePr>
+        <p:xfrm>
+          <a:off x="1395660" y="3584631"/>
+          <a:ext cx="8637974" cy="2223562"/>
+        </p:xfrm>
+        <a:graphic>
+          <a:graphicData uri="http://schemas.openxmlformats.org/drawingml/2006/table">
+            <a:tbl>
+              <a:tblPr firstRow="1" bandRow="1">
+                <a:tableStyleId>{073A0DAA-6AF3-43AB-8588-CEC1D06C72B9}</a:tableStyleId>
+              </a:tblPr>
+              <a:tblGrid>
+                <a:gridCol w="4318987">
+                  <a:extLst>
+                    <a:ext uri="{9D8B030D-6E8A-4147-A177-3AD203B41FA5}">
+                      <a16:colId xmlns:a16="http://schemas.microsoft.com/office/drawing/2014/main" val="1568086812"/>
+                    </a:ext>
+                  </a:extLst>
+                </a:gridCol>
+                <a:gridCol w="4318987">
+                  <a:extLst>
+                    <a:ext uri="{9D8B030D-6E8A-4147-A177-3AD203B41FA5}">
+                      <a16:colId xmlns:a16="http://schemas.microsoft.com/office/drawing/2014/main" val="2953003252"/>
+                    </a:ext>
+                  </a:extLst>
+                </a:gridCol>
+              </a:tblGrid>
+              <a:tr h="278720">
+                <a:tc>
+                  <a:txBody>
+                    <a:bodyPr/>
+                    <a:lstStyle/>
+                    <a:p>
+                      <a:r>
+                        <a:rPr lang="pt-BR" dirty="0" smtClean="0"/>
+                        <a:t>Ação</a:t>
+                      </a:r>
+                      <a:r>
+                        <a:rPr lang="pt-BR" baseline="0" dirty="0" smtClean="0"/>
+                        <a:t> </a:t>
+                      </a:r>
+                      <a:endParaRPr lang="pt-BR" dirty="0"/>
+                    </a:p>
+                  </a:txBody>
+                  <a:tcPr/>
+                </a:tc>
+                <a:tc>
+                  <a:txBody>
+                    <a:bodyPr/>
+                    <a:lstStyle/>
+                    <a:p>
+                      <a:r>
+                        <a:rPr lang="pt-BR" dirty="0" smtClean="0"/>
+                        <a:t>Resultado</a:t>
+                      </a:r>
+                      <a:r>
+                        <a:rPr lang="pt-BR" baseline="0" dirty="0" smtClean="0"/>
+                        <a:t> esperado</a:t>
+                      </a:r>
+                      <a:endParaRPr lang="pt-BR" dirty="0"/>
+                    </a:p>
+                  </a:txBody>
+                  <a:tcPr/>
+                </a:tc>
+                <a:extLst>
+                  <a:ext uri="{0D108BD9-81ED-4DB2-BD59-A6C34878D82A}">
+                    <a16:rowId xmlns:a16="http://schemas.microsoft.com/office/drawing/2014/main" val="2950044456"/>
+                  </a:ext>
+                </a:extLst>
+              </a:tr>
+              <a:tr h="699562">
+                <a:tc>
+                  <a:txBody>
+                    <a:bodyPr/>
+                    <a:lstStyle/>
+                    <a:p>
+                      <a:pPr marL="0" marR="0" indent="0" algn="l" defTabSz="914400" rtl="0" eaLnBrk="1" fontAlgn="auto" latinLnBrk="0" hangingPunct="1">
+                        <a:lnSpc>
+                          <a:spcPct val="100000"/>
+                        </a:lnSpc>
+                        <a:spcBef>
+                          <a:spcPts val="0"/>
+                        </a:spcBef>
+                        <a:spcAft>
+                          <a:spcPts val="0"/>
+                        </a:spcAft>
+                        <a:buClrTx/>
+                        <a:buSzTx/>
+                        <a:buFontTx/>
+                        <a:buNone/>
+                        <a:tabLst/>
+                        <a:defRPr/>
+                      </a:pPr>
+                      <a:r>
+                        <a:rPr lang="pt-BR" sz="1600" dirty="0" smtClean="0"/>
+                        <a:t>1 </a:t>
+                      </a:r>
+                      <a:r>
+                        <a:rPr lang="pt-BR" sz="1600" dirty="0" smtClean="0"/>
+                        <a:t>- Clicar nos campos do almoxarifado</a:t>
+                      </a:r>
+                    </a:p>
+                    <a:p>
+                      <a:endParaRPr lang="pt-BR" sz="1600" dirty="0"/>
+                    </a:p>
+                  </a:txBody>
+                  <a:tcPr/>
+                </a:tc>
+                <a:tc>
+                  <a:txBody>
+                    <a:bodyPr/>
+                    <a:lstStyle/>
+                    <a:p>
+                      <a:pPr marL="0" marR="0" indent="0" algn="l" defTabSz="914400" rtl="0" eaLnBrk="1" fontAlgn="auto" latinLnBrk="0" hangingPunct="1">
+                        <a:lnSpc>
+                          <a:spcPct val="100000"/>
+                        </a:lnSpc>
+                        <a:spcBef>
+                          <a:spcPts val="0"/>
+                        </a:spcBef>
+                        <a:spcAft>
+                          <a:spcPts val="0"/>
+                        </a:spcAft>
+                        <a:buClrTx/>
+                        <a:buSzTx/>
+                        <a:buFontTx/>
+                        <a:buNone/>
+                        <a:tabLst/>
+                        <a:defRPr/>
+                      </a:pPr>
+                      <a:r>
+                        <a:rPr lang="pt-BR" sz="1600" dirty="0" smtClean="0"/>
+                        <a:t>O campo deve ficar disponível para o preenchimento </a:t>
+                      </a:r>
+                      <a:endParaRPr lang="pt-BR" sz="1600" dirty="0" smtClean="0"/>
+                    </a:p>
+                  </a:txBody>
+                  <a:tcPr/>
+                </a:tc>
+                <a:extLst>
+                  <a:ext uri="{0D108BD9-81ED-4DB2-BD59-A6C34878D82A}">
+                    <a16:rowId xmlns:a16="http://schemas.microsoft.com/office/drawing/2014/main" val="1126438125"/>
+                  </a:ext>
+                </a:extLst>
+              </a:tr>
+              <a:tr h="487760">
+                <a:tc>
+                  <a:txBody>
+                    <a:bodyPr/>
+                    <a:lstStyle/>
+                    <a:p>
+                      <a:r>
+                        <a:rPr lang="pt-BR" sz="1600" dirty="0" smtClean="0"/>
+                        <a:t>2 - Preenche-los com as informações correspondentes </a:t>
+                      </a:r>
+                      <a:endParaRPr lang="pt-BR" sz="1600" dirty="0"/>
+                    </a:p>
+                  </a:txBody>
+                  <a:tcPr/>
+                </a:tc>
+                <a:tc>
+                  <a:txBody>
+                    <a:bodyPr/>
+                    <a:lstStyle/>
+                    <a:p>
+                      <a:r>
+                        <a:rPr lang="pt-BR" sz="1600" dirty="0" smtClean="0"/>
+                        <a:t>Os</a:t>
+                      </a:r>
+                      <a:r>
+                        <a:rPr lang="pt-BR" sz="1600" baseline="0" dirty="0" smtClean="0"/>
+                        <a:t> campos preenchidos </a:t>
+                      </a:r>
+                      <a:endParaRPr lang="pt-BR" sz="1600" dirty="0"/>
+                    </a:p>
+                  </a:txBody>
+                  <a:tcPr/>
+                </a:tc>
+                <a:extLst>
+                  <a:ext uri="{0D108BD9-81ED-4DB2-BD59-A6C34878D82A}">
+                    <a16:rowId xmlns:a16="http://schemas.microsoft.com/office/drawing/2014/main" val="1453789401"/>
+                  </a:ext>
+                </a:extLst>
+              </a:tr>
+              <a:tr h="487760">
+                <a:tc>
+                  <a:txBody>
+                    <a:bodyPr/>
+                    <a:lstStyle/>
+                    <a:p>
+                      <a:r>
+                        <a:rPr lang="pt-BR" sz="1600" dirty="0" smtClean="0"/>
+                        <a:t>3 - Clicar em adicionar após preencher os campos obrigatórios </a:t>
+                      </a:r>
+                      <a:endParaRPr lang="pt-BR" sz="1600" dirty="0"/>
+                    </a:p>
+                  </a:txBody>
+                  <a:tcPr/>
+                </a:tc>
+                <a:tc>
+                  <a:txBody>
+                    <a:bodyPr/>
+                    <a:lstStyle/>
+                    <a:p>
+                      <a:r>
+                        <a:rPr lang="pt-BR" sz="1600" dirty="0" smtClean="0"/>
+                        <a:t>As informações devem ser adicionadas sem problemas</a:t>
+                      </a:r>
+                      <a:endParaRPr lang="pt-BR" sz="1600" dirty="0"/>
+                    </a:p>
+                  </a:txBody>
+                  <a:tcPr/>
+                </a:tc>
+                <a:extLst>
+                  <a:ext uri="{0D108BD9-81ED-4DB2-BD59-A6C34878D82A}">
+                    <a16:rowId xmlns:a16="http://schemas.microsoft.com/office/drawing/2014/main" val="1967245366"/>
+                  </a:ext>
+                </a:extLst>
+              </a:tr>
+            </a:tbl>
+          </a:graphicData>
+        </a:graphic>
+      </p:graphicFrame>
+    </p:spTree>
+    <p:extLst>
+      <p:ext uri="{BB962C8B-B14F-4D97-AF65-F5344CB8AC3E}">
+        <p14:creationId xmlns:p14="http://schemas.microsoft.com/office/powerpoint/2010/main" val="3137073363"/>
+      </p:ext>
+    </p:extLst>
+  </p:cSld>
+  <p:clrMapOvr>
+    <a:masterClrMapping/>
+  </p:clrMapOvr>
+</p:sld>
+</file>
+
+<file path=ppt/slides/slide11.xml><?xml version="1.0" encoding="utf-8"?>
+<p:sld xmlns:a="http://schemas.openxmlformats.org/drawingml/2006/main" xmlns:r="http://schemas.openxmlformats.org/officeDocument/2006/relationships" xmlns:p="http://schemas.openxmlformats.org/presentationml/2006/main">
+  <p:cSld>
+    <p:spTree>
+      <p:nvGrpSpPr>
+        <p:cNvPr id="1" name=""/>
+        <p:cNvGrpSpPr/>
+        <p:nvPr/>
+      </p:nvGrpSpPr>
+      <p:grpSpPr>
+        <a:xfrm>
+          <a:off x="0" y="0"/>
+          <a:ext cx="0" cy="0"/>
+          <a:chOff x="0" y="0"/>
+          <a:chExt cx="0" cy="0"/>
+        </a:xfrm>
+      </p:grpSpPr>
+      <p:sp>
+        <p:nvSpPr>
+          <p:cNvPr id="3" name="Retângulo Arredondado 2"/>
+          <p:cNvSpPr/>
+          <p:nvPr/>
+        </p:nvSpPr>
+        <p:spPr>
+          <a:xfrm>
+            <a:off x="1189608" y="705853"/>
+            <a:ext cx="9445841" cy="593558"/>
+          </a:xfrm>
+          <a:prstGeom prst="roundRect">
+            <a:avLst/>
+          </a:prstGeom>
+        </p:spPr>
+        <p:style>
+          <a:lnRef idx="2">
+            <a:schemeClr val="dk1">
+              <a:shade val="50000"/>
+            </a:schemeClr>
+          </a:lnRef>
+          <a:fillRef idx="1">
+            <a:schemeClr val="dk1"/>
+          </a:fillRef>
+          <a:effectRef idx="0">
+            <a:schemeClr val="dk1"/>
+          </a:effectRef>
+          <a:fontRef idx="minor">
+            <a:schemeClr val="lt1"/>
+          </a:fontRef>
+        </p:style>
+        <p:txBody>
+          <a:bodyPr rtlCol="0" anchor="ctr"/>
+          <a:lstStyle/>
+          <a:p>
+            <a:pPr algn="ctr"/>
+            <a:endParaRPr lang="pt-BR"/>
+          </a:p>
+        </p:txBody>
+      </p:sp>
+      <p:sp>
+        <p:nvSpPr>
+          <p:cNvPr id="5" name="Retângulo 4"/>
+          <p:cNvSpPr/>
+          <p:nvPr/>
+        </p:nvSpPr>
+        <p:spPr>
+          <a:xfrm>
+            <a:off x="1267324" y="1299410"/>
+            <a:ext cx="9272337" cy="5301665"/>
+          </a:xfrm>
+          <a:prstGeom prst="rect">
+            <a:avLst/>
+          </a:prstGeom>
+          <a:noFill/>
+          <a:ln>
+            <a:solidFill>
+              <a:schemeClr val="tx1"/>
+            </a:solidFill>
+          </a:ln>
+        </p:spPr>
+        <p:style>
+          <a:lnRef idx="2">
+            <a:schemeClr val="accent1">
+              <a:shade val="50000"/>
+            </a:schemeClr>
+          </a:lnRef>
+          <a:fillRef idx="1">
+            <a:schemeClr val="accent1"/>
+          </a:fillRef>
+          <a:effectRef idx="0">
+            <a:schemeClr val="accent1"/>
+          </a:effectRef>
+          <a:fontRef idx="minor">
+            <a:schemeClr val="lt1"/>
+          </a:fontRef>
+        </p:style>
+        <p:txBody>
+          <a:bodyPr rtlCol="0" anchor="ctr"/>
+          <a:lstStyle/>
+          <a:p>
+            <a:pPr algn="ctr"/>
+            <a:endParaRPr lang="pt-BR"/>
+          </a:p>
+        </p:txBody>
+      </p:sp>
+      <p:sp>
+        <p:nvSpPr>
+          <p:cNvPr id="6" name="CaixaDeTexto 5"/>
+          <p:cNvSpPr txBox="1"/>
+          <p:nvPr/>
+        </p:nvSpPr>
+        <p:spPr>
+          <a:xfrm>
+            <a:off x="1395660" y="1495732"/>
+            <a:ext cx="9144001" cy="1231106"/>
+          </a:xfrm>
+          <a:prstGeom prst="rect">
+            <a:avLst/>
+          </a:prstGeom>
+          <a:noFill/>
+        </p:spPr>
+        <p:txBody>
+          <a:bodyPr wrap="square" rtlCol="0">
+            <a:spAutoFit/>
+          </a:bodyPr>
+          <a:lstStyle/>
+          <a:p>
+            <a:r>
+              <a:rPr lang="pt-BR" b="1" dirty="0" smtClean="0"/>
+              <a:t>RN02</a:t>
+            </a:r>
+            <a:r>
+              <a:rPr lang="pt-BR" dirty="0" smtClean="0"/>
+              <a:t>: </a:t>
+            </a:r>
+            <a:r>
+              <a:rPr lang="pt-BR" dirty="0"/>
+              <a:t>Tela Requisição &gt; </a:t>
+            </a:r>
+            <a:r>
+              <a:rPr lang="pt-BR" dirty="0" smtClean="0"/>
+              <a:t>Campos</a:t>
+            </a:r>
+          </a:p>
+          <a:p>
+            <a:r>
+              <a:rPr lang="pt-BR" b="1" dirty="0" smtClean="0"/>
+              <a:t>CT</a:t>
+            </a:r>
+            <a:r>
+              <a:rPr lang="pt-BR" dirty="0" smtClean="0"/>
+              <a:t>: Ao usuário clicar nos campos, ele devem ficar verdes </a:t>
+            </a:r>
+          </a:p>
+          <a:p>
+            <a:r>
+              <a:rPr lang="pt-BR" b="1" dirty="0" err="1" smtClean="0"/>
+              <a:t>Pré</a:t>
+            </a:r>
+            <a:r>
+              <a:rPr lang="pt-BR" b="1" dirty="0" smtClean="0"/>
+              <a:t>- condição</a:t>
+            </a:r>
+            <a:r>
+              <a:rPr lang="pt-BR" dirty="0" smtClean="0"/>
+              <a:t>: Tela do almoxarifado deve estar aberta, e os campos devem ser clicados</a:t>
+            </a:r>
+          </a:p>
+          <a:p>
+            <a:endParaRPr lang="pt-BR" sz="2000" dirty="0"/>
+          </a:p>
+        </p:txBody>
+      </p:sp>
+      <p:graphicFrame>
+        <p:nvGraphicFramePr>
+          <p:cNvPr id="7" name="Tabela 6"/>
+          <p:cNvGraphicFramePr>
+            <a:graphicFrameLocks noGrp="1"/>
+          </p:cNvGraphicFramePr>
+          <p:nvPr>
+            <p:extLst>
+              <p:ext uri="{D42A27DB-BD31-4B8C-83A1-F6EECF244321}">
+                <p14:modId xmlns:p14="http://schemas.microsoft.com/office/powerpoint/2010/main" val="3620602900"/>
+              </p:ext>
+            </p:extLst>
+          </p:nvPr>
+        </p:nvGraphicFramePr>
+        <p:xfrm>
+          <a:off x="1593541" y="2776763"/>
+          <a:ext cx="8637974" cy="1065322"/>
+        </p:xfrm>
+        <a:graphic>
+          <a:graphicData uri="http://schemas.openxmlformats.org/drawingml/2006/table">
+            <a:tbl>
+              <a:tblPr firstRow="1" bandRow="1">
+                <a:tableStyleId>{073A0DAA-6AF3-43AB-8588-CEC1D06C72B9}</a:tableStyleId>
+              </a:tblPr>
+              <a:tblGrid>
+                <a:gridCol w="4318987">
+                  <a:extLst>
+                    <a:ext uri="{9D8B030D-6E8A-4147-A177-3AD203B41FA5}">
+                      <a16:colId xmlns:a16="http://schemas.microsoft.com/office/drawing/2014/main" val="1568086812"/>
+                    </a:ext>
+                  </a:extLst>
+                </a:gridCol>
+                <a:gridCol w="4318987">
+                  <a:extLst>
+                    <a:ext uri="{9D8B030D-6E8A-4147-A177-3AD203B41FA5}">
+                      <a16:colId xmlns:a16="http://schemas.microsoft.com/office/drawing/2014/main" val="2953003252"/>
+                    </a:ext>
+                  </a:extLst>
+                </a:gridCol>
+              </a:tblGrid>
+              <a:tr h="278720">
+                <a:tc>
+                  <a:txBody>
+                    <a:bodyPr/>
+                    <a:lstStyle/>
+                    <a:p>
+                      <a:r>
+                        <a:rPr lang="pt-BR" dirty="0" smtClean="0"/>
+                        <a:t>Ação</a:t>
+                      </a:r>
+                      <a:r>
+                        <a:rPr lang="pt-BR" baseline="0" dirty="0" smtClean="0"/>
+                        <a:t> </a:t>
+                      </a:r>
+                      <a:endParaRPr lang="pt-BR" dirty="0"/>
+                    </a:p>
+                  </a:txBody>
+                  <a:tcPr/>
+                </a:tc>
+                <a:tc>
+                  <a:txBody>
+                    <a:bodyPr/>
+                    <a:lstStyle/>
+                    <a:p>
+                      <a:r>
+                        <a:rPr lang="pt-BR" dirty="0" smtClean="0"/>
+                        <a:t>Resultado</a:t>
+                      </a:r>
+                      <a:r>
+                        <a:rPr lang="pt-BR" baseline="0" dirty="0" smtClean="0"/>
+                        <a:t> esperado</a:t>
+                      </a:r>
+                      <a:endParaRPr lang="pt-BR" dirty="0"/>
+                    </a:p>
+                  </a:txBody>
+                  <a:tcPr/>
+                </a:tc>
+                <a:extLst>
+                  <a:ext uri="{0D108BD9-81ED-4DB2-BD59-A6C34878D82A}">
+                    <a16:rowId xmlns:a16="http://schemas.microsoft.com/office/drawing/2014/main" val="2950044456"/>
+                  </a:ext>
+                </a:extLst>
+              </a:tr>
+              <a:tr h="699562">
+                <a:tc>
+                  <a:txBody>
+                    <a:bodyPr/>
+                    <a:lstStyle/>
+                    <a:p>
+                      <a:r>
+                        <a:rPr lang="pt-BR" sz="1600" dirty="0" smtClean="0"/>
+                        <a:t>1 - </a:t>
+                      </a:r>
+                      <a:r>
+                        <a:rPr lang="pt-BR" sz="1600" dirty="0" smtClean="0"/>
+                        <a:t>Clicar nos campos do almoxarifado</a:t>
+                      </a:r>
+                      <a:endParaRPr lang="pt-BR" sz="1600" dirty="0"/>
+                    </a:p>
+                  </a:txBody>
+                  <a:tcPr/>
+                </a:tc>
+                <a:tc>
+                  <a:txBody>
+                    <a:bodyPr/>
+                    <a:lstStyle/>
+                    <a:p>
+                      <a:pPr marL="0" marR="0" indent="0" algn="l" defTabSz="914400" rtl="0" eaLnBrk="1" fontAlgn="auto" latinLnBrk="0" hangingPunct="1">
+                        <a:lnSpc>
+                          <a:spcPct val="100000"/>
+                        </a:lnSpc>
+                        <a:spcBef>
+                          <a:spcPts val="0"/>
+                        </a:spcBef>
+                        <a:spcAft>
+                          <a:spcPts val="0"/>
+                        </a:spcAft>
+                        <a:buClrTx/>
+                        <a:buSzTx/>
+                        <a:buFontTx/>
+                        <a:buNone/>
+                        <a:tabLst/>
+                        <a:defRPr/>
+                      </a:pPr>
+                      <a:r>
+                        <a:rPr lang="pt-BR" sz="1600" dirty="0" smtClean="0"/>
+                        <a:t>O campo deve</a:t>
+                      </a:r>
+                      <a:r>
+                        <a:rPr lang="pt-BR" sz="1600" baseline="0" dirty="0" smtClean="0"/>
+                        <a:t> ficar com o fundo verde</a:t>
+                      </a:r>
+                      <a:endParaRPr lang="pt-BR" sz="1600" dirty="0"/>
+                    </a:p>
+                  </a:txBody>
+                  <a:tcPr/>
+                </a:tc>
+                <a:extLst>
+                  <a:ext uri="{0D108BD9-81ED-4DB2-BD59-A6C34878D82A}">
+                    <a16:rowId xmlns:a16="http://schemas.microsoft.com/office/drawing/2014/main" val="1126438125"/>
+                  </a:ext>
+                </a:extLst>
+              </a:tr>
+            </a:tbl>
+          </a:graphicData>
+        </a:graphic>
+      </p:graphicFrame>
+    </p:spTree>
+    <p:extLst>
+      <p:ext uri="{BB962C8B-B14F-4D97-AF65-F5344CB8AC3E}">
+        <p14:creationId xmlns:p14="http://schemas.microsoft.com/office/powerpoint/2010/main" val="2437864714"/>
+      </p:ext>
+    </p:extLst>
+  </p:cSld>
+  <p:clrMapOvr>
+    <a:masterClrMapping/>
+  </p:clrMapOvr>
+</p:sld>
+</file>
+
+<file path=ppt/slides/slide12.xml><?xml version="1.0" encoding="utf-8"?>
+<p:sld xmlns:a="http://schemas.openxmlformats.org/drawingml/2006/main" xmlns:r="http://schemas.openxmlformats.org/officeDocument/2006/relationships" xmlns:p="http://schemas.openxmlformats.org/presentationml/2006/main">
+  <p:cSld>
+    <p:spTree>
+      <p:nvGrpSpPr>
+        <p:cNvPr id="1" name=""/>
+        <p:cNvGrpSpPr/>
+        <p:nvPr/>
+      </p:nvGrpSpPr>
+      <p:grpSpPr>
+        <a:xfrm>
+          <a:off x="0" y="0"/>
+          <a:ext cx="0" cy="0"/>
+          <a:chOff x="0" y="0"/>
+          <a:chExt cx="0" cy="0"/>
+        </a:xfrm>
+      </p:grpSpPr>
+      <p:sp>
+        <p:nvSpPr>
+          <p:cNvPr id="3" name="Retângulo Arredondado 2"/>
+          <p:cNvSpPr/>
+          <p:nvPr/>
+        </p:nvSpPr>
+        <p:spPr>
+          <a:xfrm>
+            <a:off x="1189608" y="705853"/>
+            <a:ext cx="9445841" cy="593558"/>
+          </a:xfrm>
+          <a:prstGeom prst="roundRect">
+            <a:avLst/>
+          </a:prstGeom>
+        </p:spPr>
+        <p:style>
+          <a:lnRef idx="2">
+            <a:schemeClr val="dk1">
+              <a:shade val="50000"/>
+            </a:schemeClr>
+          </a:lnRef>
+          <a:fillRef idx="1">
+            <a:schemeClr val="dk1"/>
+          </a:fillRef>
+          <a:effectRef idx="0">
+            <a:schemeClr val="dk1"/>
+          </a:effectRef>
+          <a:fontRef idx="minor">
+            <a:schemeClr val="lt1"/>
+          </a:fontRef>
+        </p:style>
+        <p:txBody>
+          <a:bodyPr rtlCol="0" anchor="ctr"/>
+          <a:lstStyle/>
+          <a:p>
+            <a:pPr algn="ctr"/>
+            <a:endParaRPr lang="pt-BR"/>
+          </a:p>
+        </p:txBody>
+      </p:sp>
+      <p:sp>
+        <p:nvSpPr>
+          <p:cNvPr id="5" name="Retângulo 4"/>
+          <p:cNvSpPr/>
+          <p:nvPr/>
+        </p:nvSpPr>
+        <p:spPr>
+          <a:xfrm>
+            <a:off x="1267324" y="1299410"/>
+            <a:ext cx="9272337" cy="5301665"/>
+          </a:xfrm>
+          <a:prstGeom prst="rect">
+            <a:avLst/>
+          </a:prstGeom>
+          <a:noFill/>
+          <a:ln>
+            <a:solidFill>
+              <a:schemeClr val="tx1"/>
+            </a:solidFill>
+          </a:ln>
+        </p:spPr>
+        <p:style>
+          <a:lnRef idx="2">
+            <a:schemeClr val="accent1">
+              <a:shade val="50000"/>
+            </a:schemeClr>
+          </a:lnRef>
+          <a:fillRef idx="1">
+            <a:schemeClr val="accent1"/>
+          </a:fillRef>
+          <a:effectRef idx="0">
+            <a:schemeClr val="accent1"/>
+          </a:effectRef>
+          <a:fontRef idx="minor">
+            <a:schemeClr val="lt1"/>
+          </a:fontRef>
+        </p:style>
+        <p:txBody>
+          <a:bodyPr rtlCol="0" anchor="ctr"/>
+          <a:lstStyle/>
+          <a:p>
+            <a:pPr algn="ctr"/>
+            <a:endParaRPr lang="pt-BR"/>
+          </a:p>
+        </p:txBody>
+      </p:sp>
+      <p:sp>
+        <p:nvSpPr>
+          <p:cNvPr id="6" name="CaixaDeTexto 5"/>
+          <p:cNvSpPr txBox="1"/>
+          <p:nvPr/>
+        </p:nvSpPr>
+        <p:spPr>
+          <a:xfrm>
+            <a:off x="1395660" y="1495732"/>
+            <a:ext cx="9144001" cy="923330"/>
+          </a:xfrm>
+          <a:prstGeom prst="rect">
+            <a:avLst/>
+          </a:prstGeom>
+          <a:noFill/>
+        </p:spPr>
+        <p:txBody>
+          <a:bodyPr wrap="square" rtlCol="0">
+            <a:spAutoFit/>
+          </a:bodyPr>
+          <a:lstStyle/>
+          <a:p>
+            <a:r>
+              <a:rPr lang="pt-BR" b="1" dirty="0" smtClean="0"/>
+              <a:t>RN03</a:t>
+            </a:r>
+            <a:r>
+              <a:rPr lang="pt-BR" dirty="0" smtClean="0"/>
+              <a:t>: </a:t>
+            </a:r>
+            <a:r>
+              <a:rPr lang="pt-BR" dirty="0"/>
+              <a:t>Tela Requisição &gt; Campos</a:t>
+            </a:r>
+          </a:p>
+          <a:p>
+            <a:r>
+              <a:rPr lang="pt-BR" b="1" dirty="0" smtClean="0"/>
+              <a:t>CT</a:t>
+            </a:r>
+            <a:r>
+              <a:rPr lang="pt-BR" dirty="0" smtClean="0"/>
+              <a:t>: Os campos :”ID” e “Quantidade” só podem receber valores inteiros;</a:t>
+            </a:r>
+          </a:p>
+          <a:p>
+            <a:r>
+              <a:rPr lang="pt-BR" b="1" dirty="0" err="1" smtClean="0"/>
+              <a:t>Pré</a:t>
+            </a:r>
+            <a:r>
+              <a:rPr lang="pt-BR" b="1" dirty="0" smtClean="0"/>
+              <a:t>- condição</a:t>
+            </a:r>
+            <a:r>
+              <a:rPr lang="pt-BR" dirty="0" smtClean="0"/>
+              <a:t>: Tela do almoxarifado deve estar aberta</a:t>
+            </a:r>
+            <a:endParaRPr lang="pt-BR" sz="2000" dirty="0"/>
+          </a:p>
+        </p:txBody>
+      </p:sp>
+      <p:graphicFrame>
+        <p:nvGraphicFramePr>
+          <p:cNvPr id="7" name="Tabela 6"/>
+          <p:cNvGraphicFramePr>
+            <a:graphicFrameLocks noGrp="1"/>
+          </p:cNvGraphicFramePr>
+          <p:nvPr>
+            <p:extLst>
+              <p:ext uri="{D42A27DB-BD31-4B8C-83A1-F6EECF244321}">
+                <p14:modId xmlns:p14="http://schemas.microsoft.com/office/powerpoint/2010/main" val="2029422333"/>
+              </p:ext>
+            </p:extLst>
+          </p:nvPr>
+        </p:nvGraphicFramePr>
+        <p:xfrm>
+          <a:off x="1593541" y="2776763"/>
+          <a:ext cx="8637974" cy="2011680"/>
+        </p:xfrm>
+        <a:graphic>
+          <a:graphicData uri="http://schemas.openxmlformats.org/drawingml/2006/table">
+            <a:tbl>
+              <a:tblPr firstRow="1" bandRow="1">
+                <a:tableStyleId>{073A0DAA-6AF3-43AB-8588-CEC1D06C72B9}</a:tableStyleId>
+              </a:tblPr>
+              <a:tblGrid>
+                <a:gridCol w="4318987">
+                  <a:extLst>
+                    <a:ext uri="{9D8B030D-6E8A-4147-A177-3AD203B41FA5}">
+                      <a16:colId xmlns:a16="http://schemas.microsoft.com/office/drawing/2014/main" val="1568086812"/>
+                    </a:ext>
+                  </a:extLst>
+                </a:gridCol>
+                <a:gridCol w="4318987">
+                  <a:extLst>
+                    <a:ext uri="{9D8B030D-6E8A-4147-A177-3AD203B41FA5}">
+                      <a16:colId xmlns:a16="http://schemas.microsoft.com/office/drawing/2014/main" val="2953003252"/>
+                    </a:ext>
+                  </a:extLst>
+                </a:gridCol>
+              </a:tblGrid>
+              <a:tr h="278720">
+                <a:tc>
+                  <a:txBody>
+                    <a:bodyPr/>
+                    <a:lstStyle/>
+                    <a:p>
+                      <a:r>
+                        <a:rPr lang="pt-BR" dirty="0" smtClean="0"/>
+                        <a:t>Ação</a:t>
+                      </a:r>
+                      <a:r>
+                        <a:rPr lang="pt-BR" baseline="0" dirty="0" smtClean="0"/>
+                        <a:t> </a:t>
+                      </a:r>
+                      <a:endParaRPr lang="pt-BR" dirty="0"/>
+                    </a:p>
+                  </a:txBody>
+                  <a:tcPr/>
+                </a:tc>
+                <a:tc>
+                  <a:txBody>
+                    <a:bodyPr/>
+                    <a:lstStyle/>
+                    <a:p>
+                      <a:r>
+                        <a:rPr lang="pt-BR" dirty="0" smtClean="0"/>
+                        <a:t>Resultado</a:t>
+                      </a:r>
+                      <a:r>
+                        <a:rPr lang="pt-BR" baseline="0" dirty="0" smtClean="0"/>
+                        <a:t> esperado</a:t>
+                      </a:r>
+                      <a:endParaRPr lang="pt-BR" dirty="0"/>
+                    </a:p>
+                  </a:txBody>
+                  <a:tcPr/>
+                </a:tc>
+                <a:extLst>
+                  <a:ext uri="{0D108BD9-81ED-4DB2-BD59-A6C34878D82A}">
+                    <a16:rowId xmlns:a16="http://schemas.microsoft.com/office/drawing/2014/main" val="2950044456"/>
+                  </a:ext>
+                </a:extLst>
+              </a:tr>
+              <a:tr h="699562">
+                <a:tc>
+                  <a:txBody>
+                    <a:bodyPr/>
+                    <a:lstStyle/>
+                    <a:p>
+                      <a:r>
+                        <a:rPr lang="pt-BR" sz="1600" dirty="0" smtClean="0"/>
+                        <a:t>1 - </a:t>
+                      </a:r>
+                      <a:r>
+                        <a:rPr lang="pt-BR" sz="1600" dirty="0" smtClean="0"/>
+                        <a:t>Clicar nos</a:t>
+                      </a:r>
+                      <a:r>
+                        <a:rPr lang="pt-BR" sz="1600" baseline="0" dirty="0" smtClean="0"/>
+                        <a:t> </a:t>
+                      </a:r>
+                      <a:r>
+                        <a:rPr lang="pt-BR" sz="1600" dirty="0" smtClean="0"/>
+                        <a:t>campos</a:t>
+                      </a:r>
+                      <a:r>
+                        <a:rPr lang="pt-BR" sz="1600" baseline="0" dirty="0" smtClean="0"/>
+                        <a:t> ID e Quantidade, e preenche-lo </a:t>
+                      </a:r>
+                      <a:endParaRPr lang="pt-BR" sz="1600" dirty="0"/>
+                    </a:p>
+                  </a:txBody>
+                  <a:tcPr/>
+                </a:tc>
+                <a:tc>
+                  <a:txBody>
+                    <a:bodyPr/>
+                    <a:lstStyle/>
+                    <a:p>
+                      <a:pPr marL="0" marR="0" indent="0" algn="l" defTabSz="914400" rtl="0" eaLnBrk="1" fontAlgn="auto" latinLnBrk="0" hangingPunct="1">
+                        <a:lnSpc>
+                          <a:spcPct val="100000"/>
+                        </a:lnSpc>
+                        <a:spcBef>
+                          <a:spcPts val="0"/>
+                        </a:spcBef>
+                        <a:spcAft>
+                          <a:spcPts val="0"/>
+                        </a:spcAft>
+                        <a:buClrTx/>
+                        <a:buSzTx/>
+                        <a:buFontTx/>
+                        <a:buNone/>
+                        <a:tabLst/>
+                        <a:defRPr/>
+                      </a:pPr>
+                      <a:r>
+                        <a:rPr lang="pt-BR" sz="1600" dirty="0" smtClean="0"/>
+                        <a:t>Se for preenchido com valor inteiro</a:t>
+                      </a:r>
+                      <a:r>
+                        <a:rPr lang="pt-BR" sz="1600" baseline="0" dirty="0" smtClean="0"/>
+                        <a:t>, deve ser adicionado sem problemas, caso seja preenchido com algo distinto, fundo deve ficar vermelho e informar o erro </a:t>
+                      </a:r>
+                      <a:endParaRPr lang="pt-BR" sz="1600" dirty="0"/>
+                    </a:p>
+                  </a:txBody>
+                  <a:tcPr/>
+                </a:tc>
+                <a:extLst>
+                  <a:ext uri="{0D108BD9-81ED-4DB2-BD59-A6C34878D82A}">
+                    <a16:rowId xmlns:a16="http://schemas.microsoft.com/office/drawing/2014/main" val="1126438125"/>
+                  </a:ext>
+                </a:extLst>
+              </a:tr>
+              <a:tr h="487760">
+                <a:tc>
+                  <a:txBody>
+                    <a:bodyPr/>
+                    <a:lstStyle/>
+                    <a:p>
+                      <a:r>
+                        <a:rPr lang="pt-BR" sz="1600" dirty="0" smtClean="0"/>
+                        <a:t>2 - Clicar em adicionar após preencher os campos da</a:t>
+                      </a:r>
+                      <a:r>
+                        <a:rPr lang="pt-BR" sz="1600" baseline="0" dirty="0" smtClean="0"/>
+                        <a:t> forma correta</a:t>
+                      </a:r>
+                      <a:endParaRPr lang="pt-BR" sz="1600" dirty="0"/>
+                    </a:p>
+                  </a:txBody>
+                  <a:tcPr/>
+                </a:tc>
+                <a:tc>
+                  <a:txBody>
+                    <a:bodyPr/>
+                    <a:lstStyle/>
+                    <a:p>
+                      <a:r>
+                        <a:rPr lang="pt-BR" sz="1600" dirty="0" smtClean="0"/>
+                        <a:t>As informações devem ser adicionadas sem problemas</a:t>
+                      </a:r>
+                      <a:endParaRPr lang="pt-BR" sz="1600" dirty="0"/>
+                    </a:p>
+                  </a:txBody>
+                  <a:tcPr/>
+                </a:tc>
+                <a:extLst>
+                  <a:ext uri="{0D108BD9-81ED-4DB2-BD59-A6C34878D82A}">
+                    <a16:rowId xmlns:a16="http://schemas.microsoft.com/office/drawing/2014/main" val="1967245366"/>
+                  </a:ext>
+                </a:extLst>
+              </a:tr>
+            </a:tbl>
+          </a:graphicData>
+        </a:graphic>
+      </p:graphicFrame>
+    </p:spTree>
+    <p:extLst>
+      <p:ext uri="{BB962C8B-B14F-4D97-AF65-F5344CB8AC3E}">
+        <p14:creationId xmlns:p14="http://schemas.microsoft.com/office/powerpoint/2010/main" val="1728711558"/>
+      </p:ext>
+    </p:extLst>
+  </p:cSld>
+  <p:clrMapOvr>
+    <a:masterClrMapping/>
+  </p:clrMapOvr>
+</p:sld>
+</file>
+
+<file path=ppt/slides/slide13.xml><?xml version="1.0" encoding="utf-8"?>
+<p:sld xmlns:a="http://schemas.openxmlformats.org/drawingml/2006/main" xmlns:r="http://schemas.openxmlformats.org/officeDocument/2006/relationships" xmlns:p="http://schemas.openxmlformats.org/presentationml/2006/main">
+  <p:cSld>
+    <p:spTree>
+      <p:nvGrpSpPr>
+        <p:cNvPr id="1" name=""/>
+        <p:cNvGrpSpPr/>
+        <p:nvPr/>
+      </p:nvGrpSpPr>
+      <p:grpSpPr>
+        <a:xfrm>
+          <a:off x="0" y="0"/>
+          <a:ext cx="0" cy="0"/>
+          <a:chOff x="0" y="0"/>
+          <a:chExt cx="0" cy="0"/>
+        </a:xfrm>
+      </p:grpSpPr>
+      <p:sp>
+        <p:nvSpPr>
+          <p:cNvPr id="3" name="Retângulo Arredondado 2"/>
+          <p:cNvSpPr/>
+          <p:nvPr/>
+        </p:nvSpPr>
+        <p:spPr>
+          <a:xfrm>
+            <a:off x="1189608" y="705853"/>
+            <a:ext cx="9445841" cy="593558"/>
+          </a:xfrm>
+          <a:prstGeom prst="roundRect">
+            <a:avLst/>
+          </a:prstGeom>
+        </p:spPr>
+        <p:style>
+          <a:lnRef idx="2">
+            <a:schemeClr val="dk1">
+              <a:shade val="50000"/>
+            </a:schemeClr>
+          </a:lnRef>
+          <a:fillRef idx="1">
+            <a:schemeClr val="dk1"/>
+          </a:fillRef>
+          <a:effectRef idx="0">
+            <a:schemeClr val="dk1"/>
+          </a:effectRef>
+          <a:fontRef idx="minor">
+            <a:schemeClr val="lt1"/>
+          </a:fontRef>
+        </p:style>
+        <p:txBody>
+          <a:bodyPr rtlCol="0" anchor="ctr"/>
+          <a:lstStyle/>
+          <a:p>
+            <a:pPr algn="ctr"/>
+            <a:endParaRPr lang="pt-BR"/>
+          </a:p>
+        </p:txBody>
+      </p:sp>
+      <p:sp>
+        <p:nvSpPr>
+          <p:cNvPr id="5" name="Retângulo 4"/>
+          <p:cNvSpPr/>
+          <p:nvPr/>
+        </p:nvSpPr>
+        <p:spPr>
+          <a:xfrm>
+            <a:off x="1267324" y="1299410"/>
+            <a:ext cx="9272337" cy="5301665"/>
+          </a:xfrm>
+          <a:prstGeom prst="rect">
+            <a:avLst/>
+          </a:prstGeom>
+          <a:noFill/>
+          <a:ln>
+            <a:solidFill>
+              <a:schemeClr val="tx1"/>
+            </a:solidFill>
+          </a:ln>
+        </p:spPr>
+        <p:style>
+          <a:lnRef idx="2">
+            <a:schemeClr val="accent1">
+              <a:shade val="50000"/>
+            </a:schemeClr>
+          </a:lnRef>
+          <a:fillRef idx="1">
+            <a:schemeClr val="accent1"/>
+          </a:fillRef>
+          <a:effectRef idx="0">
+            <a:schemeClr val="accent1"/>
+          </a:effectRef>
+          <a:fontRef idx="minor">
+            <a:schemeClr val="lt1"/>
+          </a:fontRef>
+        </p:style>
+        <p:txBody>
+          <a:bodyPr rtlCol="0" anchor="ctr"/>
+          <a:lstStyle/>
+          <a:p>
+            <a:pPr algn="ctr"/>
+            <a:endParaRPr lang="pt-BR"/>
+          </a:p>
+        </p:txBody>
+      </p:sp>
+      <p:sp>
+        <p:nvSpPr>
+          <p:cNvPr id="6" name="CaixaDeTexto 5"/>
+          <p:cNvSpPr txBox="1"/>
+          <p:nvPr/>
+        </p:nvSpPr>
+        <p:spPr>
+          <a:xfrm>
+            <a:off x="1395660" y="1495732"/>
+            <a:ext cx="9144001" cy="923330"/>
+          </a:xfrm>
+          <a:prstGeom prst="rect">
+            <a:avLst/>
+          </a:prstGeom>
+          <a:noFill/>
+        </p:spPr>
+        <p:txBody>
+          <a:bodyPr wrap="square" rtlCol="0">
+            <a:spAutoFit/>
+          </a:bodyPr>
+          <a:lstStyle/>
+          <a:p>
+            <a:r>
+              <a:rPr lang="pt-BR" b="1" dirty="0" smtClean="0"/>
+              <a:t>RN04</a:t>
+            </a:r>
+            <a:r>
+              <a:rPr lang="pt-BR" dirty="0" smtClean="0"/>
+              <a:t>: </a:t>
+            </a:r>
+            <a:r>
+              <a:rPr lang="pt-BR" dirty="0"/>
+              <a:t>Tela Requisição &gt; Categoria Motivo</a:t>
+            </a:r>
+          </a:p>
+          <a:p>
+            <a:pPr lvl="0"/>
+            <a:r>
+              <a:rPr lang="pt-BR" b="1" dirty="0" smtClean="0"/>
+              <a:t>CT</a:t>
+            </a:r>
+            <a:r>
+              <a:rPr lang="pt-BR" dirty="0" smtClean="0"/>
+              <a:t>: </a:t>
+            </a:r>
+            <a:r>
+              <a:rPr lang="pt-BR" dirty="0"/>
+              <a:t>Ao carregar a tela os dados da Categoria Motivo devem ser carregados da API</a:t>
+            </a:r>
+            <a:r>
+              <a:rPr lang="pt-BR" dirty="0" smtClean="0"/>
+              <a:t>.;</a:t>
+            </a:r>
+          </a:p>
+          <a:p>
+            <a:r>
+              <a:rPr lang="pt-BR" b="1" dirty="0" err="1" smtClean="0"/>
+              <a:t>Pré</a:t>
+            </a:r>
+            <a:r>
+              <a:rPr lang="pt-BR" b="1" dirty="0" smtClean="0"/>
+              <a:t>- condição</a:t>
+            </a:r>
+            <a:r>
+              <a:rPr lang="pt-BR" dirty="0" smtClean="0"/>
+              <a:t>: Tela do almoxarifado deve estar aberta</a:t>
+            </a:r>
+            <a:endParaRPr lang="pt-BR" sz="2000" dirty="0"/>
+          </a:p>
+        </p:txBody>
+      </p:sp>
+      <p:graphicFrame>
+        <p:nvGraphicFramePr>
+          <p:cNvPr id="7" name="Tabela 6"/>
+          <p:cNvGraphicFramePr>
+            <a:graphicFrameLocks noGrp="1"/>
+          </p:cNvGraphicFramePr>
+          <p:nvPr>
+            <p:extLst>
+              <p:ext uri="{D42A27DB-BD31-4B8C-83A1-F6EECF244321}">
+                <p14:modId xmlns:p14="http://schemas.microsoft.com/office/powerpoint/2010/main" val="3814541022"/>
+              </p:ext>
+            </p:extLst>
+          </p:nvPr>
+        </p:nvGraphicFramePr>
+        <p:xfrm>
+          <a:off x="1593541" y="2776763"/>
+          <a:ext cx="8637974" cy="1065322"/>
+        </p:xfrm>
+        <a:graphic>
+          <a:graphicData uri="http://schemas.openxmlformats.org/drawingml/2006/table">
+            <a:tbl>
+              <a:tblPr firstRow="1" bandRow="1">
+                <a:tableStyleId>{073A0DAA-6AF3-43AB-8588-CEC1D06C72B9}</a:tableStyleId>
+              </a:tblPr>
+              <a:tblGrid>
+                <a:gridCol w="4318987">
+                  <a:extLst>
+                    <a:ext uri="{9D8B030D-6E8A-4147-A177-3AD203B41FA5}">
+                      <a16:colId xmlns:a16="http://schemas.microsoft.com/office/drawing/2014/main" val="1568086812"/>
+                    </a:ext>
+                  </a:extLst>
+                </a:gridCol>
+                <a:gridCol w="4318987">
+                  <a:extLst>
+                    <a:ext uri="{9D8B030D-6E8A-4147-A177-3AD203B41FA5}">
+                      <a16:colId xmlns:a16="http://schemas.microsoft.com/office/drawing/2014/main" val="2953003252"/>
+                    </a:ext>
+                  </a:extLst>
+                </a:gridCol>
+              </a:tblGrid>
+              <a:tr h="278720">
+                <a:tc>
+                  <a:txBody>
+                    <a:bodyPr/>
+                    <a:lstStyle/>
+                    <a:p>
+                      <a:r>
+                        <a:rPr lang="pt-BR" dirty="0" smtClean="0"/>
+                        <a:t>Ação</a:t>
+                      </a:r>
+                      <a:r>
+                        <a:rPr lang="pt-BR" baseline="0" dirty="0" smtClean="0"/>
+                        <a:t> </a:t>
+                      </a:r>
+                      <a:endParaRPr lang="pt-BR" dirty="0"/>
+                    </a:p>
+                  </a:txBody>
+                  <a:tcPr/>
+                </a:tc>
+                <a:tc>
+                  <a:txBody>
+                    <a:bodyPr/>
+                    <a:lstStyle/>
+                    <a:p>
+                      <a:r>
+                        <a:rPr lang="pt-BR" dirty="0" smtClean="0"/>
+                        <a:t>Resultado</a:t>
+                      </a:r>
+                      <a:r>
+                        <a:rPr lang="pt-BR" baseline="0" dirty="0" smtClean="0"/>
+                        <a:t> esperado</a:t>
+                      </a:r>
+                      <a:endParaRPr lang="pt-BR" dirty="0"/>
+                    </a:p>
+                  </a:txBody>
+                  <a:tcPr/>
+                </a:tc>
+                <a:extLst>
+                  <a:ext uri="{0D108BD9-81ED-4DB2-BD59-A6C34878D82A}">
+                    <a16:rowId xmlns:a16="http://schemas.microsoft.com/office/drawing/2014/main" val="2950044456"/>
+                  </a:ext>
+                </a:extLst>
+              </a:tr>
+              <a:tr h="699562">
+                <a:tc>
+                  <a:txBody>
+                    <a:bodyPr/>
+                    <a:lstStyle/>
+                    <a:p>
+                      <a:r>
+                        <a:rPr lang="pt-BR" sz="1600" dirty="0" smtClean="0"/>
+                        <a:t>1 - </a:t>
+                      </a:r>
+                      <a:r>
+                        <a:rPr lang="pt-BR" sz="1600" dirty="0" smtClean="0"/>
+                        <a:t>Clicar no</a:t>
+                      </a:r>
+                      <a:r>
+                        <a:rPr lang="pt-BR" sz="1600" baseline="0" dirty="0" smtClean="0"/>
+                        <a:t> </a:t>
+                      </a:r>
+                      <a:r>
+                        <a:rPr lang="pt-BR" sz="1600" dirty="0" smtClean="0"/>
+                        <a:t>campo</a:t>
+                      </a:r>
+                      <a:r>
+                        <a:rPr lang="pt-BR" sz="1600" baseline="0" dirty="0" smtClean="0"/>
+                        <a:t> :“Motivo”</a:t>
+                      </a:r>
+                      <a:endParaRPr lang="pt-BR" sz="1600" dirty="0"/>
+                    </a:p>
+                  </a:txBody>
+                  <a:tcPr/>
+                </a:tc>
+                <a:tc>
+                  <a:txBody>
+                    <a:bodyPr/>
+                    <a:lstStyle/>
+                    <a:p>
+                      <a:pPr marL="0" marR="0" indent="0" algn="l" defTabSz="914400" rtl="0" eaLnBrk="1" fontAlgn="auto" latinLnBrk="0" hangingPunct="1">
+                        <a:lnSpc>
+                          <a:spcPct val="100000"/>
+                        </a:lnSpc>
+                        <a:spcBef>
+                          <a:spcPts val="0"/>
+                        </a:spcBef>
+                        <a:spcAft>
+                          <a:spcPts val="0"/>
+                        </a:spcAft>
+                        <a:buClrTx/>
+                        <a:buSzTx/>
+                        <a:buFontTx/>
+                        <a:buNone/>
+                        <a:tabLst/>
+                        <a:defRPr/>
+                      </a:pPr>
+                      <a:r>
+                        <a:rPr lang="pt-BR" sz="1600" dirty="0" smtClean="0"/>
+                        <a:t>Os</a:t>
+                      </a:r>
+                      <a:r>
+                        <a:rPr lang="pt-BR" sz="1600" baseline="0" dirty="0" smtClean="0"/>
+                        <a:t> dados devem automaticamente preencher esse campo com as informações salvas</a:t>
+                      </a:r>
+                      <a:endParaRPr lang="pt-BR" sz="1600" dirty="0"/>
+                    </a:p>
+                  </a:txBody>
+                  <a:tcPr/>
+                </a:tc>
+                <a:extLst>
+                  <a:ext uri="{0D108BD9-81ED-4DB2-BD59-A6C34878D82A}">
+                    <a16:rowId xmlns:a16="http://schemas.microsoft.com/office/drawing/2014/main" val="1126438125"/>
+                  </a:ext>
+                </a:extLst>
+              </a:tr>
+            </a:tbl>
+          </a:graphicData>
+        </a:graphic>
+      </p:graphicFrame>
+    </p:spTree>
+    <p:extLst>
+      <p:ext uri="{BB962C8B-B14F-4D97-AF65-F5344CB8AC3E}">
+        <p14:creationId xmlns:p14="http://schemas.microsoft.com/office/powerpoint/2010/main" val="2154416141"/>
+      </p:ext>
+    </p:extLst>
+  </p:cSld>
+  <p:clrMapOvr>
+    <a:masterClrMapping/>
+  </p:clrMapOvr>
+</p:sld>
+</file>
+
+<file path=ppt/slides/slide14.xml><?xml version="1.0" encoding="utf-8"?>
+<p:sld xmlns:a="http://schemas.openxmlformats.org/drawingml/2006/main" xmlns:r="http://schemas.openxmlformats.org/officeDocument/2006/relationships" xmlns:p="http://schemas.openxmlformats.org/presentationml/2006/main">
+  <p:cSld>
+    <p:spTree>
+      <p:nvGrpSpPr>
+        <p:cNvPr id="1" name=""/>
+        <p:cNvGrpSpPr/>
+        <p:nvPr/>
+      </p:nvGrpSpPr>
+      <p:grpSpPr>
+        <a:xfrm>
+          <a:off x="0" y="0"/>
+          <a:ext cx="0" cy="0"/>
+          <a:chOff x="0" y="0"/>
+          <a:chExt cx="0" cy="0"/>
+        </a:xfrm>
+      </p:grpSpPr>
+      <p:sp>
+        <p:nvSpPr>
+          <p:cNvPr id="3" name="Retângulo Arredondado 2"/>
+          <p:cNvSpPr/>
+          <p:nvPr/>
+        </p:nvSpPr>
+        <p:spPr>
+          <a:xfrm>
+            <a:off x="1189608" y="705853"/>
+            <a:ext cx="9445841" cy="593558"/>
+          </a:xfrm>
+          <a:prstGeom prst="roundRect">
+            <a:avLst/>
+          </a:prstGeom>
+        </p:spPr>
+        <p:style>
+          <a:lnRef idx="2">
+            <a:schemeClr val="dk1">
+              <a:shade val="50000"/>
+            </a:schemeClr>
+          </a:lnRef>
+          <a:fillRef idx="1">
+            <a:schemeClr val="dk1"/>
+          </a:fillRef>
+          <a:effectRef idx="0">
+            <a:schemeClr val="dk1"/>
+          </a:effectRef>
+          <a:fontRef idx="minor">
+            <a:schemeClr val="lt1"/>
+          </a:fontRef>
+        </p:style>
+        <p:txBody>
+          <a:bodyPr rtlCol="0" anchor="ctr"/>
+          <a:lstStyle/>
+          <a:p>
+            <a:pPr algn="ctr"/>
+            <a:endParaRPr lang="pt-BR"/>
+          </a:p>
+        </p:txBody>
+      </p:sp>
+      <p:sp>
+        <p:nvSpPr>
+          <p:cNvPr id="5" name="Retângulo 4"/>
+          <p:cNvSpPr/>
+          <p:nvPr/>
+        </p:nvSpPr>
+        <p:spPr>
+          <a:xfrm>
+            <a:off x="1267324" y="1299410"/>
+            <a:ext cx="9272337" cy="5301665"/>
+          </a:xfrm>
+          <a:prstGeom prst="rect">
+            <a:avLst/>
+          </a:prstGeom>
+          <a:noFill/>
+          <a:ln>
+            <a:solidFill>
+              <a:schemeClr val="tx1"/>
+            </a:solidFill>
+          </a:ln>
+        </p:spPr>
+        <p:style>
+          <a:lnRef idx="2">
+            <a:schemeClr val="accent1">
+              <a:shade val="50000"/>
+            </a:schemeClr>
+          </a:lnRef>
+          <a:fillRef idx="1">
+            <a:schemeClr val="accent1"/>
+          </a:fillRef>
+          <a:effectRef idx="0">
+            <a:schemeClr val="accent1"/>
+          </a:effectRef>
+          <a:fontRef idx="minor">
+            <a:schemeClr val="lt1"/>
+          </a:fontRef>
+        </p:style>
+        <p:txBody>
+          <a:bodyPr rtlCol="0" anchor="ctr"/>
+          <a:lstStyle/>
+          <a:p>
+            <a:pPr algn="ctr"/>
+            <a:endParaRPr lang="pt-BR"/>
+          </a:p>
+        </p:txBody>
+      </p:sp>
+      <p:sp>
+        <p:nvSpPr>
+          <p:cNvPr id="6" name="CaixaDeTexto 5"/>
+          <p:cNvSpPr txBox="1"/>
+          <p:nvPr/>
+        </p:nvSpPr>
+        <p:spPr>
+          <a:xfrm>
+            <a:off x="1395660" y="1495732"/>
+            <a:ext cx="9144001" cy="923330"/>
+          </a:xfrm>
+          <a:prstGeom prst="rect">
+            <a:avLst/>
+          </a:prstGeom>
+          <a:noFill/>
+        </p:spPr>
+        <p:txBody>
+          <a:bodyPr wrap="square" rtlCol="0">
+            <a:spAutoFit/>
+          </a:bodyPr>
+          <a:lstStyle/>
+          <a:p>
+            <a:r>
+              <a:rPr lang="pt-BR" b="1" dirty="0" smtClean="0"/>
+              <a:t>RN04</a:t>
+            </a:r>
+            <a:r>
+              <a:rPr lang="pt-BR" dirty="0" smtClean="0"/>
+              <a:t>: </a:t>
+            </a:r>
+            <a:r>
+              <a:rPr lang="pt-BR" dirty="0"/>
+              <a:t>Tela Requisição &gt; Categoria Motivo</a:t>
+            </a:r>
+          </a:p>
+          <a:p>
+            <a:pPr lvl="0"/>
+            <a:r>
+              <a:rPr lang="pt-BR" b="1" dirty="0" smtClean="0"/>
+              <a:t>CT</a:t>
+            </a:r>
+            <a:r>
+              <a:rPr lang="pt-BR" dirty="0" smtClean="0"/>
+              <a:t>: </a:t>
+            </a:r>
+            <a:r>
+              <a:rPr lang="pt-BR" dirty="0"/>
+              <a:t>Ao carregar a tela os dados da Categoria Motivo devem ser carregados da API</a:t>
+            </a:r>
+            <a:r>
+              <a:rPr lang="pt-BR" dirty="0" smtClean="0"/>
+              <a:t>.;</a:t>
+            </a:r>
+          </a:p>
+          <a:p>
+            <a:r>
+              <a:rPr lang="pt-BR" b="1" dirty="0" err="1" smtClean="0"/>
+              <a:t>Pré</a:t>
+            </a:r>
+            <a:r>
+              <a:rPr lang="pt-BR" b="1" dirty="0" smtClean="0"/>
+              <a:t>- condição</a:t>
+            </a:r>
+            <a:r>
+              <a:rPr lang="pt-BR" dirty="0" smtClean="0"/>
+              <a:t>: Tela do almoxarifado deve estar aberta</a:t>
+            </a:r>
+            <a:endParaRPr lang="pt-BR" sz="2000" dirty="0"/>
+          </a:p>
+        </p:txBody>
+      </p:sp>
+      <p:graphicFrame>
+        <p:nvGraphicFramePr>
+          <p:cNvPr id="7" name="Tabela 6"/>
+          <p:cNvGraphicFramePr>
+            <a:graphicFrameLocks noGrp="1"/>
+          </p:cNvGraphicFramePr>
+          <p:nvPr>
+            <p:extLst>
+              <p:ext uri="{D42A27DB-BD31-4B8C-83A1-F6EECF244321}">
+                <p14:modId xmlns:p14="http://schemas.microsoft.com/office/powerpoint/2010/main" val="3814541022"/>
+              </p:ext>
+            </p:extLst>
+          </p:nvPr>
+        </p:nvGraphicFramePr>
+        <p:xfrm>
+          <a:off x="1593541" y="2776763"/>
+          <a:ext cx="8637974" cy="1065322"/>
+        </p:xfrm>
+        <a:graphic>
+          <a:graphicData uri="http://schemas.openxmlformats.org/drawingml/2006/table">
+            <a:tbl>
+              <a:tblPr firstRow="1" bandRow="1">
+                <a:tableStyleId>{073A0DAA-6AF3-43AB-8588-CEC1D06C72B9}</a:tableStyleId>
+              </a:tblPr>
+              <a:tblGrid>
+                <a:gridCol w="4318987">
+                  <a:extLst>
+                    <a:ext uri="{9D8B030D-6E8A-4147-A177-3AD203B41FA5}">
+                      <a16:colId xmlns:a16="http://schemas.microsoft.com/office/drawing/2014/main" val="1568086812"/>
+                    </a:ext>
+                  </a:extLst>
+                </a:gridCol>
+                <a:gridCol w="4318987">
+                  <a:extLst>
+                    <a:ext uri="{9D8B030D-6E8A-4147-A177-3AD203B41FA5}">
+                      <a16:colId xmlns:a16="http://schemas.microsoft.com/office/drawing/2014/main" val="2953003252"/>
+                    </a:ext>
+                  </a:extLst>
+                </a:gridCol>
+              </a:tblGrid>
+              <a:tr h="278720">
+                <a:tc>
+                  <a:txBody>
+                    <a:bodyPr/>
+                    <a:lstStyle/>
+                    <a:p>
+                      <a:r>
+                        <a:rPr lang="pt-BR" dirty="0" smtClean="0"/>
+                        <a:t>Ação</a:t>
+                      </a:r>
+                      <a:r>
+                        <a:rPr lang="pt-BR" baseline="0" dirty="0" smtClean="0"/>
+                        <a:t> </a:t>
+                      </a:r>
+                      <a:endParaRPr lang="pt-BR" dirty="0"/>
+                    </a:p>
+                  </a:txBody>
+                  <a:tcPr/>
+                </a:tc>
+                <a:tc>
+                  <a:txBody>
+                    <a:bodyPr/>
+                    <a:lstStyle/>
+                    <a:p>
+                      <a:r>
+                        <a:rPr lang="pt-BR" dirty="0" smtClean="0"/>
+                        <a:t>Resultado</a:t>
+                      </a:r>
+                      <a:r>
+                        <a:rPr lang="pt-BR" baseline="0" dirty="0" smtClean="0"/>
+                        <a:t> esperado</a:t>
+                      </a:r>
+                      <a:endParaRPr lang="pt-BR" dirty="0"/>
+                    </a:p>
+                  </a:txBody>
+                  <a:tcPr/>
+                </a:tc>
+                <a:extLst>
+                  <a:ext uri="{0D108BD9-81ED-4DB2-BD59-A6C34878D82A}">
+                    <a16:rowId xmlns:a16="http://schemas.microsoft.com/office/drawing/2014/main" val="2950044456"/>
+                  </a:ext>
+                </a:extLst>
+              </a:tr>
+              <a:tr h="699562">
+                <a:tc>
+                  <a:txBody>
+                    <a:bodyPr/>
+                    <a:lstStyle/>
+                    <a:p>
+                      <a:r>
+                        <a:rPr lang="pt-BR" sz="1600" dirty="0" smtClean="0"/>
+                        <a:t>1 - </a:t>
+                      </a:r>
+                      <a:r>
+                        <a:rPr lang="pt-BR" sz="1600" dirty="0" smtClean="0"/>
+                        <a:t>Clicar no</a:t>
+                      </a:r>
+                      <a:r>
+                        <a:rPr lang="pt-BR" sz="1600" baseline="0" dirty="0" smtClean="0"/>
+                        <a:t> </a:t>
+                      </a:r>
+                      <a:r>
+                        <a:rPr lang="pt-BR" sz="1600" dirty="0" smtClean="0"/>
+                        <a:t>campo</a:t>
+                      </a:r>
+                      <a:r>
+                        <a:rPr lang="pt-BR" sz="1600" baseline="0" dirty="0" smtClean="0"/>
+                        <a:t> :“Motivo”</a:t>
+                      </a:r>
+                      <a:endParaRPr lang="pt-BR" sz="1600" dirty="0"/>
+                    </a:p>
+                  </a:txBody>
+                  <a:tcPr/>
+                </a:tc>
+                <a:tc>
+                  <a:txBody>
+                    <a:bodyPr/>
+                    <a:lstStyle/>
+                    <a:p>
+                      <a:pPr marL="0" marR="0" indent="0" algn="l" defTabSz="914400" rtl="0" eaLnBrk="1" fontAlgn="auto" latinLnBrk="0" hangingPunct="1">
+                        <a:lnSpc>
+                          <a:spcPct val="100000"/>
+                        </a:lnSpc>
+                        <a:spcBef>
+                          <a:spcPts val="0"/>
+                        </a:spcBef>
+                        <a:spcAft>
+                          <a:spcPts val="0"/>
+                        </a:spcAft>
+                        <a:buClrTx/>
+                        <a:buSzTx/>
+                        <a:buFontTx/>
+                        <a:buNone/>
+                        <a:tabLst/>
+                        <a:defRPr/>
+                      </a:pPr>
+                      <a:r>
+                        <a:rPr lang="pt-BR" sz="1600" dirty="0" smtClean="0"/>
+                        <a:t>Os</a:t>
+                      </a:r>
+                      <a:r>
+                        <a:rPr lang="pt-BR" sz="1600" baseline="0" dirty="0" smtClean="0"/>
+                        <a:t> dados devem automaticamente preencher esse campo com as informações salvas</a:t>
+                      </a:r>
+                      <a:endParaRPr lang="pt-BR" sz="1600" dirty="0"/>
+                    </a:p>
+                  </a:txBody>
+                  <a:tcPr/>
+                </a:tc>
+                <a:extLst>
+                  <a:ext uri="{0D108BD9-81ED-4DB2-BD59-A6C34878D82A}">
+                    <a16:rowId xmlns:a16="http://schemas.microsoft.com/office/drawing/2014/main" val="1126438125"/>
+                  </a:ext>
+                </a:extLst>
+              </a:tr>
+            </a:tbl>
+          </a:graphicData>
+        </a:graphic>
+      </p:graphicFrame>
+    </p:spTree>
+    <p:extLst>
+      <p:ext uri="{BB962C8B-B14F-4D97-AF65-F5344CB8AC3E}">
+        <p14:creationId xmlns:p14="http://schemas.microsoft.com/office/powerpoint/2010/main" val="3366572704"/>
       </p:ext>
     </p:extLst>
   </p:cSld>
@@ -6013,6 +7858,70 @@
     <p:extLst>
       <p:ext uri="{BB962C8B-B14F-4D97-AF65-F5344CB8AC3E}">
         <p14:creationId xmlns:p14="http://schemas.microsoft.com/office/powerpoint/2010/main" val="1904971298"/>
+      </p:ext>
+    </p:extLst>
+  </p:cSld>
+  <p:clrMapOvr>
+    <a:masterClrMapping/>
+  </p:clrMapOvr>
+</p:sld>
+</file>
+
+<file path=ppt/slides/slide9.xml><?xml version="1.0" encoding="utf-8"?>
+<p:sld xmlns:a="http://schemas.openxmlformats.org/drawingml/2006/main" xmlns:r="http://schemas.openxmlformats.org/officeDocument/2006/relationships" xmlns:p="http://schemas.openxmlformats.org/presentationml/2006/main">
+  <p:cSld>
+    <p:spTree>
+      <p:nvGrpSpPr>
+        <p:cNvPr id="1" name=""/>
+        <p:cNvGrpSpPr/>
+        <p:nvPr/>
+      </p:nvGrpSpPr>
+      <p:grpSpPr>
+        <a:xfrm>
+          <a:off x="0" y="0"/>
+          <a:ext cx="0" cy="0"/>
+          <a:chOff x="0" y="0"/>
+          <a:chExt cx="0" cy="0"/>
+        </a:xfrm>
+      </p:grpSpPr>
+      <p:sp>
+        <p:nvSpPr>
+          <p:cNvPr id="2" name="Título 1">
+            <a:extLst>
+              <a:ext uri="{FF2B5EF4-FFF2-40B4-BE49-F238E27FC236}">
+                <a16:creationId xmlns:a16="http://schemas.microsoft.com/office/drawing/2014/main" id="{64900655-8A5A-26AD-DB1A-7875212CDD7B}"/>
+              </a:ext>
+            </a:extLst>
+          </p:cNvPr>
+          <p:cNvSpPr>
+            <a:spLocks noGrp="1"/>
+          </p:cNvSpPr>
+          <p:nvPr>
+            <p:ph type="title"/>
+          </p:nvPr>
+        </p:nvSpPr>
+        <p:spPr>
+          <a:xfrm>
+            <a:off x="3462757" y="2582779"/>
+            <a:ext cx="5039559" cy="1466348"/>
+          </a:xfrm>
+        </p:spPr>
+        <p:txBody>
+          <a:bodyPr/>
+          <a:lstStyle/>
+          <a:p>
+            <a:r>
+              <a:rPr lang="pt-BR" dirty="0" smtClean="0"/>
+              <a:t>Casos de testes</a:t>
+            </a:r>
+            <a:endParaRPr lang="pt-BR" dirty="0"/>
+          </a:p>
+        </p:txBody>
+      </p:sp>
+    </p:spTree>
+    <p:extLst>
+      <p:ext uri="{BB962C8B-B14F-4D97-AF65-F5344CB8AC3E}">
+        <p14:creationId xmlns:p14="http://schemas.microsoft.com/office/powerpoint/2010/main" val="3697032413"/>
       </p:ext>
     </p:extLst>
   </p:cSld>

</xml_diff>

<commit_message>
Teste Selenium, Caso de teste e Relatório
</commit_message>
<xml_diff>
--- a/RegrasNegocio/RN_Requisitos.pptx
+++ b/RegrasNegocio/RN_Requisitos.pptx
@@ -14,11 +14,18 @@
     <p:sldId id="262" r:id="rId8"/>
     <p:sldId id="263" r:id="rId9"/>
     <p:sldId id="264" r:id="rId10"/>
-    <p:sldId id="266" r:id="rId11"/>
-    <p:sldId id="265" r:id="rId12"/>
-    <p:sldId id="267" r:id="rId13"/>
-    <p:sldId id="268" r:id="rId14"/>
-    <p:sldId id="269" r:id="rId15"/>
+    <p:sldId id="271" r:id="rId11"/>
+    <p:sldId id="266" r:id="rId12"/>
+    <p:sldId id="265" r:id="rId13"/>
+    <p:sldId id="267" r:id="rId14"/>
+    <p:sldId id="268" r:id="rId15"/>
+    <p:sldId id="270" r:id="rId16"/>
+    <p:sldId id="272" r:id="rId17"/>
+    <p:sldId id="277" r:id="rId18"/>
+    <p:sldId id="276" r:id="rId19"/>
+    <p:sldId id="275" r:id="rId20"/>
+    <p:sldId id="274" r:id="rId21"/>
+    <p:sldId id="273" r:id="rId22"/>
   </p:sldIdLst>
   <p:sldSz cx="12192000" cy="6858000"/>
   <p:notesSz cx="6858000" cy="9144000"/>
@@ -272,7 +279,7 @@
           <a:p>
             <a:fld id="{0A1764AE-7598-4101-9D63-6EC8D69CE664}" type="datetimeFigureOut">
               <a:rPr lang="pt-BR" smtClean="0"/>
-              <a:t>22/01/2024</a:t>
+              <a:t>24/01/2024</a:t>
             </a:fld>
             <a:endParaRPr lang="pt-BR"/>
           </a:p>
@@ -470,7 +477,7 @@
           <a:p>
             <a:fld id="{0A1764AE-7598-4101-9D63-6EC8D69CE664}" type="datetimeFigureOut">
               <a:rPr lang="pt-BR" smtClean="0"/>
-              <a:t>22/01/2024</a:t>
+              <a:t>24/01/2024</a:t>
             </a:fld>
             <a:endParaRPr lang="pt-BR"/>
           </a:p>
@@ -678,7 +685,7 @@
           <a:p>
             <a:fld id="{0A1764AE-7598-4101-9D63-6EC8D69CE664}" type="datetimeFigureOut">
               <a:rPr lang="pt-BR" smtClean="0"/>
-              <a:t>22/01/2024</a:t>
+              <a:t>24/01/2024</a:t>
             </a:fld>
             <a:endParaRPr lang="pt-BR"/>
           </a:p>
@@ -876,7 +883,7 @@
           <a:p>
             <a:fld id="{0A1764AE-7598-4101-9D63-6EC8D69CE664}" type="datetimeFigureOut">
               <a:rPr lang="pt-BR" smtClean="0"/>
-              <a:t>22/01/2024</a:t>
+              <a:t>24/01/2024</a:t>
             </a:fld>
             <a:endParaRPr lang="pt-BR"/>
           </a:p>
@@ -1151,7 +1158,7 @@
           <a:p>
             <a:fld id="{0A1764AE-7598-4101-9D63-6EC8D69CE664}" type="datetimeFigureOut">
               <a:rPr lang="pt-BR" smtClean="0"/>
-              <a:t>22/01/2024</a:t>
+              <a:t>24/01/2024</a:t>
             </a:fld>
             <a:endParaRPr lang="pt-BR"/>
           </a:p>
@@ -1416,7 +1423,7 @@
           <a:p>
             <a:fld id="{0A1764AE-7598-4101-9D63-6EC8D69CE664}" type="datetimeFigureOut">
               <a:rPr lang="pt-BR" smtClean="0"/>
-              <a:t>22/01/2024</a:t>
+              <a:t>24/01/2024</a:t>
             </a:fld>
             <a:endParaRPr lang="pt-BR"/>
           </a:p>
@@ -1828,7 +1835,7 @@
           <a:p>
             <a:fld id="{0A1764AE-7598-4101-9D63-6EC8D69CE664}" type="datetimeFigureOut">
               <a:rPr lang="pt-BR" smtClean="0"/>
-              <a:t>22/01/2024</a:t>
+              <a:t>24/01/2024</a:t>
             </a:fld>
             <a:endParaRPr lang="pt-BR"/>
           </a:p>
@@ -1969,7 +1976,7 @@
           <a:p>
             <a:fld id="{0A1764AE-7598-4101-9D63-6EC8D69CE664}" type="datetimeFigureOut">
               <a:rPr lang="pt-BR" smtClean="0"/>
-              <a:t>22/01/2024</a:t>
+              <a:t>24/01/2024</a:t>
             </a:fld>
             <a:endParaRPr lang="pt-BR"/>
           </a:p>
@@ -2082,7 +2089,7 @@
           <a:p>
             <a:fld id="{0A1764AE-7598-4101-9D63-6EC8D69CE664}" type="datetimeFigureOut">
               <a:rPr lang="pt-BR" smtClean="0"/>
-              <a:t>22/01/2024</a:t>
+              <a:t>24/01/2024</a:t>
             </a:fld>
             <a:endParaRPr lang="pt-BR"/>
           </a:p>
@@ -2393,7 +2400,7 @@
           <a:p>
             <a:fld id="{0A1764AE-7598-4101-9D63-6EC8D69CE664}" type="datetimeFigureOut">
               <a:rPr lang="pt-BR" smtClean="0"/>
-              <a:t>22/01/2024</a:t>
+              <a:t>24/01/2024</a:t>
             </a:fld>
             <a:endParaRPr lang="pt-BR"/>
           </a:p>
@@ -2681,7 +2688,7 @@
           <a:p>
             <a:fld id="{0A1764AE-7598-4101-9D63-6EC8D69CE664}" type="datetimeFigureOut">
               <a:rPr lang="pt-BR" smtClean="0"/>
-              <a:t>22/01/2024</a:t>
+              <a:t>24/01/2024</a:t>
             </a:fld>
             <a:endParaRPr lang="pt-BR"/>
           </a:p>
@@ -2922,7 +2929,7 @@
           <a:p>
             <a:fld id="{0A1764AE-7598-4101-9D63-6EC8D69CE664}" type="datetimeFigureOut">
               <a:rPr lang="pt-BR" smtClean="0"/>
-              <a:t>22/01/2024</a:t>
+              <a:t>24/01/2024</a:t>
             </a:fld>
             <a:endParaRPr lang="pt-BR"/>
           </a:p>
@@ -3424,6 +3431,80 @@
       </p:grpSpPr>
       <p:sp>
         <p:nvSpPr>
+          <p:cNvPr id="2" name="Título 1">
+            <a:extLst>
+              <a:ext uri="{FF2B5EF4-FFF2-40B4-BE49-F238E27FC236}">
+                <a16:creationId xmlns:a16="http://schemas.microsoft.com/office/drawing/2014/main" id="{64900655-8A5A-26AD-DB1A-7875212CDD7B}"/>
+              </a:ext>
+            </a:extLst>
+          </p:cNvPr>
+          <p:cNvSpPr>
+            <a:spLocks noGrp="1"/>
+          </p:cNvSpPr>
+          <p:nvPr>
+            <p:ph type="title"/>
+          </p:nvPr>
+        </p:nvSpPr>
+        <p:spPr>
+          <a:xfrm>
+            <a:off x="391886" y="2595841"/>
+            <a:ext cx="9966960" cy="1466348"/>
+          </a:xfrm>
+        </p:spPr>
+        <p:txBody>
+          <a:bodyPr>
+            <a:normAutofit/>
+          </a:bodyPr>
+          <a:lstStyle/>
+          <a:p>
+            <a:r>
+              <a:rPr lang="pt-BR" sz="3200" dirty="0" smtClean="0"/>
+              <a:t>Link </a:t>
+            </a:r>
+            <a:r>
+              <a:rPr lang="pt-BR" sz="3200" dirty="0" err="1" smtClean="0"/>
+              <a:t>Api</a:t>
+            </a:r>
+            <a:r>
+              <a:rPr lang="pt-BR" sz="3200" dirty="0"/>
+              <a:t>: https://splendorous-starlight-c2b50a.netlify.app/</a:t>
+            </a:r>
+            <a:endParaRPr lang="pt-BR" sz="3200" dirty="0"/>
+          </a:p>
+        </p:txBody>
+      </p:sp>
+    </p:spTree>
+    <p:extLst>
+      <p:ext uri="{BB962C8B-B14F-4D97-AF65-F5344CB8AC3E}">
+        <p14:creationId xmlns:p14="http://schemas.microsoft.com/office/powerpoint/2010/main" val="1317568908"/>
+      </p:ext>
+    </p:extLst>
+  </p:cSld>
+  <p:clrMapOvr>
+    <a:masterClrMapping/>
+  </p:clrMapOvr>
+</p:sld>
+</file>
+
+<file path=ppt/slides/slide11.xml><?xml version="1.0" encoding="utf-8"?>
+<p:sld xmlns:a="http://schemas.openxmlformats.org/drawingml/2006/main" xmlns:r="http://schemas.openxmlformats.org/officeDocument/2006/relationships" xmlns:p="http://schemas.openxmlformats.org/presentationml/2006/main">
+  <p:cSld>
+    <p:spTree>
+      <p:nvGrpSpPr>
+        <p:cNvPr id="1" name=""/>
+        <p:cNvGrpSpPr/>
+        <p:nvPr/>
+      </p:nvGrpSpPr>
+      <p:grpSpPr>
+        <a:xfrm>
+          <a:off x="0" y="0"/>
+          <a:ext cx="0" cy="0"/>
+          <a:chOff x="0" y="0"/>
+          <a:chExt cx="0" cy="0"/>
+        </a:xfrm>
+      </p:grpSpPr>
+      <p:sp>
+        <p:nvSpPr>
           <p:cNvPr id="3" name="Retângulo Arredondado 2"/>
           <p:cNvSpPr/>
           <p:nvPr/>
@@ -3551,7 +3632,15 @@
             </a:r>
             <a:r>
               <a:rPr lang="pt-BR" dirty="0" smtClean="0"/>
-              <a:t>: Validar a obrigatoriedade de alguns campos (com exceção dos campos: Nome Funcionário)</a:t>
+              <a:t>: Validar a obrigatoriedade de alguns campos (com exceção </a:t>
+            </a:r>
+            <a:r>
+              <a:rPr lang="pt-BR" dirty="0" smtClean="0"/>
+              <a:t>do campo: </a:t>
+            </a:r>
+            <a:r>
+              <a:rPr lang="pt-BR" dirty="0" smtClean="0"/>
+              <a:t>Nome Funcionário)</a:t>
             </a:r>
           </a:p>
           <a:p>
@@ -3574,7 +3663,15 @@
             </a:r>
             <a:r>
               <a:rPr lang="pt-BR" dirty="0" smtClean="0"/>
-              <a:t>devem ser preenchidos obrigatoriamente, a única exceção deve ser o campo Nome Funcionário. Se os campos obrigatórios não forem preenchidos, eles devem ficar com os fundos vermelhos e alertar o usuário da sua obrigatoriedade. Se todos forem preenchidos, deve adicionar normalmente.</a:t>
+              <a:t>devem ser preenchidos obrigatoriamente, a única exceção deve ser o </a:t>
+            </a:r>
+            <a:r>
+              <a:rPr lang="pt-BR" dirty="0" smtClean="0"/>
+              <a:t>campo: ”Nome Funcionário”. </a:t>
+            </a:r>
+            <a:r>
+              <a:rPr lang="pt-BR" dirty="0" smtClean="0"/>
+              <a:t>Se os campos obrigatórios não forem preenchidos, eles devem ficar com os fundos vermelhos e alertar o usuário da sua obrigatoriedade. Se todos forem preenchidos, deve adicionar normalmente.</a:t>
             </a:r>
           </a:p>
           <a:p>
@@ -3704,11 +3801,7 @@
                       </a:pPr>
                       <a:r>
                         <a:rPr lang="pt-BR" sz="1600" dirty="0" smtClean="0"/>
-                        <a:t>1 </a:t>
-                      </a:r>
-                      <a:r>
-                        <a:rPr lang="pt-BR" sz="1600" dirty="0" smtClean="0"/>
-                        <a:t>- Clicar nos campos do almoxarifado</a:t>
+                        <a:t>1 - Clicar nos campos do almoxarifado</a:t>
                       </a:r>
                     </a:p>
                     <a:p>
@@ -3743,7 +3836,6 @@
                         <a:rPr lang="pt-BR" sz="1600" dirty="0" smtClean="0"/>
                         <a:t>O campo deve ficar disponível para o preenchimento </a:t>
                       </a:r>
-                      <a:endParaRPr lang="pt-BR" sz="1600" dirty="0" smtClean="0"/>
                     </a:p>
                   </a:txBody>
                   <a:tcPr/>
@@ -3845,7 +3937,7 @@
 </p:sld>
 </file>
 
-<file path=ppt/slides/slide11.xml><?xml version="1.0" encoding="utf-8"?>
+<file path=ppt/slides/slide12.xml><?xml version="1.0" encoding="utf-8"?>
 <p:sld xmlns:a="http://schemas.openxmlformats.org/drawingml/2006/main" xmlns:r="http://schemas.openxmlformats.org/officeDocument/2006/relationships" xmlns:p="http://schemas.openxmlformats.org/presentationml/2006/main">
   <p:cSld>
     <p:spTree>
@@ -4107,11 +4199,7 @@
                     <a:p>
                       <a:r>
                         <a:rPr lang="pt-BR" sz="1600" dirty="0" smtClean="0"/>
-                        <a:t>1 - </a:t>
-                      </a:r>
-                      <a:r>
-                        <a:rPr lang="pt-BR" sz="1600" dirty="0" smtClean="0"/>
-                        <a:t>Clicar nos campos do almoxarifado</a:t>
+                        <a:t>1 - Clicar nos campos do almoxarifado</a:t>
                       </a:r>
                       <a:endParaRPr lang="pt-BR" sz="1600" dirty="0"/>
                     </a:p>
@@ -4176,7 +4264,7 @@
 </p:sld>
 </file>
 
-<file path=ppt/slides/slide12.xml><?xml version="1.0" encoding="utf-8"?>
+<file path=ppt/slides/slide13.xml><?xml version="1.0" encoding="utf-8"?>
 <p:sld xmlns:a="http://schemas.openxmlformats.org/drawingml/2006/main" xmlns:r="http://schemas.openxmlformats.org/officeDocument/2006/relationships" xmlns:p="http://schemas.openxmlformats.org/presentationml/2006/main">
   <p:cSld>
     <p:spTree>
@@ -4432,11 +4520,7 @@
                     <a:p>
                       <a:r>
                         <a:rPr lang="pt-BR" sz="1600" dirty="0" smtClean="0"/>
-                        <a:t>1 - </a:t>
-                      </a:r>
-                      <a:r>
-                        <a:rPr lang="pt-BR" sz="1600" dirty="0" smtClean="0"/>
-                        <a:t>Clicar nos</a:t>
+                        <a:t>1 - Clicar nos</a:t>
                       </a:r>
                       <a:r>
                         <a:rPr lang="pt-BR" sz="1600" baseline="0" dirty="0" smtClean="0"/>
@@ -4552,7 +4636,7 @@
 </p:sld>
 </file>
 
-<file path=ppt/slides/slide13.xml><?xml version="1.0" encoding="utf-8"?>
+<file path=ppt/slides/slide14.xml><?xml version="1.0" encoding="utf-8"?>
 <p:sld xmlns:a="http://schemas.openxmlformats.org/drawingml/2006/main" xmlns:r="http://schemas.openxmlformats.org/officeDocument/2006/relationships" xmlns:p="http://schemas.openxmlformats.org/presentationml/2006/main">
   <p:cSld>
     <p:spTree>
@@ -4817,11 +4901,7 @@
                     <a:p>
                       <a:r>
                         <a:rPr lang="pt-BR" sz="1600" dirty="0" smtClean="0"/>
-                        <a:t>1 - </a:t>
-                      </a:r>
-                      <a:r>
-                        <a:rPr lang="pt-BR" sz="1600" dirty="0" smtClean="0"/>
-                        <a:t>Clicar no</a:t>
+                        <a:t>1 - Clicar no</a:t>
                       </a:r>
                       <a:r>
                         <a:rPr lang="pt-BR" sz="1600" baseline="0" dirty="0" smtClean="0"/>
@@ -4898,7 +4978,7 @@
 </p:sld>
 </file>
 
-<file path=ppt/slides/slide14.xml><?xml version="1.0" encoding="utf-8"?>
+<file path=ppt/slides/slide15.xml><?xml version="1.0" encoding="utf-8"?>
 <p:sld xmlns:a="http://schemas.openxmlformats.org/drawingml/2006/main" xmlns:r="http://schemas.openxmlformats.org/officeDocument/2006/relationships" xmlns:p="http://schemas.openxmlformats.org/presentationml/2006/main">
   <p:cSld>
     <p:spTree>
@@ -5010,7 +5090,7 @@
         <p:spPr>
           <a:xfrm>
             <a:off x="1395660" y="1495732"/>
-            <a:ext cx="9144001" cy="923330"/>
+            <a:ext cx="9144001" cy="1477328"/>
           </a:xfrm>
           <a:prstGeom prst="rect">
             <a:avLst/>
@@ -5025,7 +5105,7 @@
           <a:p>
             <a:r>
               <a:rPr lang="pt-BR" b="1" dirty="0" smtClean="0"/>
-              <a:t>RN04</a:t>
+              <a:t>RN05</a:t>
             </a:r>
             <a:r>
               <a:rPr lang="pt-BR" dirty="0" smtClean="0"/>
@@ -5033,7 +5113,7 @@
             </a:r>
             <a:r>
               <a:rPr lang="pt-BR" dirty="0"/>
-              <a:t>Tela Requisição &gt; Categoria Motivo</a:t>
+              <a:t>Tela Requisição &gt; Motivo</a:t>
             </a:r>
           </a:p>
           <a:p>
@@ -5047,13 +5127,34 @@
               <a:t>: </a:t>
             </a:r>
             <a:r>
+              <a:rPr lang="pt-BR" dirty="0" smtClean="0"/>
+              <a:t>Ao </a:t>
+            </a:r>
+            <a:r>
               <a:rPr lang="pt-BR" dirty="0"/>
-              <a:t>Ao carregar a tela os dados da Categoria Motivo devem ser carregados da API</a:t>
+              <a:t>alterar os dados de uma categoria do </a:t>
             </a:r>
             <a:r>
               <a:rPr lang="pt-BR" dirty="0" smtClean="0"/>
-              <a:t>.;</a:t>
-            </a:r>
+              <a:t>motivo, </a:t>
+            </a:r>
+            <a:r>
+              <a:rPr lang="pt-BR" dirty="0"/>
+              <a:t>o campo motivo deve </a:t>
+            </a:r>
+            <a:r>
+              <a:rPr lang="pt-BR" dirty="0" smtClean="0"/>
+              <a:t>ser alterado e exibir  os </a:t>
+            </a:r>
+            <a:r>
+              <a:rPr lang="pt-BR" dirty="0"/>
+              <a:t>motivos da categoria </a:t>
+            </a:r>
+            <a:r>
+              <a:rPr lang="pt-BR" dirty="0" smtClean="0"/>
+              <a:t>que foi informada, se o campo da categoria não for preenchido, o campo motivo deve ficar desabilitado e com a cor de  fundo cinza;</a:t>
+            </a:r>
+            <a:endParaRPr lang="pt-BR" dirty="0" smtClean="0"/>
           </a:p>
           <a:p>
             <a:r>
@@ -5081,14 +5182,14 @@
           <p:nvPr>
             <p:extLst>
               <p:ext uri="{D42A27DB-BD31-4B8C-83A1-F6EECF244321}">
-                <p14:modId xmlns:p14="http://schemas.microsoft.com/office/powerpoint/2010/main" val="3814541022"/>
+                <p14:modId xmlns:p14="http://schemas.microsoft.com/office/powerpoint/2010/main" val="2616128368"/>
               </p:ext>
             </p:extLst>
           </p:nvPr>
         </p:nvGraphicFramePr>
         <p:xfrm>
-          <a:off x="1593541" y="2776763"/>
-          <a:ext cx="8637974" cy="1065322"/>
+          <a:off x="1489038" y="3169381"/>
+          <a:ext cx="8637974" cy="1188720"/>
         </p:xfrm>
         <a:graphic>
           <a:graphicData uri="http://schemas.openxmlformats.org/drawingml/2006/table">
@@ -5163,11 +5264,7 @@
                     <a:p>
                       <a:r>
                         <a:rPr lang="pt-BR" sz="1600" dirty="0" smtClean="0"/>
-                        <a:t>1 - </a:t>
-                      </a:r>
-                      <a:r>
-                        <a:rPr lang="pt-BR" sz="1600" dirty="0" smtClean="0"/>
-                        <a:t>Clicar no</a:t>
+                        <a:t>1 - Clicar no</a:t>
                       </a:r>
                       <a:r>
                         <a:rPr lang="pt-BR" sz="1600" baseline="0" dirty="0" smtClean="0"/>
@@ -5179,7 +5276,15 @@
                       </a:r>
                       <a:r>
                         <a:rPr lang="pt-BR" sz="1600" baseline="0" dirty="0" smtClean="0"/>
-                        <a:t> :“Motivo”</a:t>
+                        <a:t> </a:t>
+                      </a:r>
+                      <a:r>
+                        <a:rPr lang="pt-BR" sz="1600" baseline="0" dirty="0" smtClean="0"/>
+                        <a:t>:“Categoria Motivo</a:t>
+                      </a:r>
+                      <a:r>
+                        <a:rPr lang="pt-BR" sz="1600" baseline="0" dirty="0" smtClean="0"/>
+                        <a:t>”</a:t>
                       </a:r>
                       <a:endParaRPr lang="pt-BR" sz="1600" dirty="0"/>
                     </a:p>
@@ -5214,7 +5319,11 @@
                       </a:r>
                       <a:r>
                         <a:rPr lang="pt-BR" sz="1600" baseline="0" dirty="0" smtClean="0"/>
-                        <a:t> dados devem automaticamente preencher esse campo com as informações salvas</a:t>
+                        <a:t> dados devem automaticamente </a:t>
+                      </a:r>
+                      <a:r>
+                        <a:rPr lang="pt-BR" sz="1600" baseline="0" dirty="0" smtClean="0"/>
+                        <a:t>preencher o campo :”Motivo”  a partir dos motivos da categoria informada</a:t>
                       </a:r>
                       <a:endParaRPr lang="pt-BR" sz="1600" dirty="0"/>
                     </a:p>
@@ -5234,7 +5343,1685 @@
     </p:spTree>
     <p:extLst>
       <p:ext uri="{BB962C8B-B14F-4D97-AF65-F5344CB8AC3E}">
-        <p14:creationId xmlns:p14="http://schemas.microsoft.com/office/powerpoint/2010/main" val="3366572704"/>
+        <p14:creationId xmlns:p14="http://schemas.microsoft.com/office/powerpoint/2010/main" val="1794978601"/>
+      </p:ext>
+    </p:extLst>
+  </p:cSld>
+  <p:clrMapOvr>
+    <a:masterClrMapping/>
+  </p:clrMapOvr>
+</p:sld>
+</file>
+
+<file path=ppt/slides/slide16.xml><?xml version="1.0" encoding="utf-8"?>
+<p:sld xmlns:a="http://schemas.openxmlformats.org/drawingml/2006/main" xmlns:r="http://schemas.openxmlformats.org/officeDocument/2006/relationships" xmlns:p="http://schemas.openxmlformats.org/presentationml/2006/main">
+  <p:cSld>
+    <p:spTree>
+      <p:nvGrpSpPr>
+        <p:cNvPr id="1" name=""/>
+        <p:cNvGrpSpPr/>
+        <p:nvPr/>
+      </p:nvGrpSpPr>
+      <p:grpSpPr>
+        <a:xfrm>
+          <a:off x="0" y="0"/>
+          <a:ext cx="0" cy="0"/>
+          <a:chOff x="0" y="0"/>
+          <a:chExt cx="0" cy="0"/>
+        </a:xfrm>
+      </p:grpSpPr>
+      <p:sp>
+        <p:nvSpPr>
+          <p:cNvPr id="3" name="Retângulo Arredondado 2"/>
+          <p:cNvSpPr/>
+          <p:nvPr/>
+        </p:nvSpPr>
+        <p:spPr>
+          <a:xfrm>
+            <a:off x="1189608" y="705853"/>
+            <a:ext cx="9445841" cy="593558"/>
+          </a:xfrm>
+          <a:prstGeom prst="roundRect">
+            <a:avLst/>
+          </a:prstGeom>
+        </p:spPr>
+        <p:style>
+          <a:lnRef idx="2">
+            <a:schemeClr val="dk1">
+              <a:shade val="50000"/>
+            </a:schemeClr>
+          </a:lnRef>
+          <a:fillRef idx="1">
+            <a:schemeClr val="dk1"/>
+          </a:fillRef>
+          <a:effectRef idx="0">
+            <a:schemeClr val="dk1"/>
+          </a:effectRef>
+          <a:fontRef idx="minor">
+            <a:schemeClr val="lt1"/>
+          </a:fontRef>
+        </p:style>
+        <p:txBody>
+          <a:bodyPr rtlCol="0" anchor="ctr"/>
+          <a:lstStyle/>
+          <a:p>
+            <a:pPr algn="ctr"/>
+            <a:endParaRPr lang="pt-BR"/>
+          </a:p>
+        </p:txBody>
+      </p:sp>
+      <p:sp>
+        <p:nvSpPr>
+          <p:cNvPr id="5" name="Retângulo 4"/>
+          <p:cNvSpPr/>
+          <p:nvPr/>
+        </p:nvSpPr>
+        <p:spPr>
+          <a:xfrm>
+            <a:off x="1267324" y="1299410"/>
+            <a:ext cx="9272337" cy="5301665"/>
+          </a:xfrm>
+          <a:prstGeom prst="rect">
+            <a:avLst/>
+          </a:prstGeom>
+          <a:noFill/>
+          <a:ln>
+            <a:solidFill>
+              <a:schemeClr val="tx1"/>
+            </a:solidFill>
+          </a:ln>
+        </p:spPr>
+        <p:style>
+          <a:lnRef idx="2">
+            <a:schemeClr val="accent1">
+              <a:shade val="50000"/>
+            </a:schemeClr>
+          </a:lnRef>
+          <a:fillRef idx="1">
+            <a:schemeClr val="accent1"/>
+          </a:fillRef>
+          <a:effectRef idx="0">
+            <a:schemeClr val="accent1"/>
+          </a:effectRef>
+          <a:fontRef idx="minor">
+            <a:schemeClr val="lt1"/>
+          </a:fontRef>
+        </p:style>
+        <p:txBody>
+          <a:bodyPr rtlCol="0" anchor="ctr"/>
+          <a:lstStyle/>
+          <a:p>
+            <a:pPr algn="ctr"/>
+            <a:endParaRPr lang="pt-BR"/>
+          </a:p>
+        </p:txBody>
+      </p:sp>
+      <p:sp>
+        <p:nvSpPr>
+          <p:cNvPr id="6" name="CaixaDeTexto 5"/>
+          <p:cNvSpPr txBox="1"/>
+          <p:nvPr/>
+        </p:nvSpPr>
+        <p:spPr>
+          <a:xfrm>
+            <a:off x="1395660" y="1495732"/>
+            <a:ext cx="9144001" cy="1477328"/>
+          </a:xfrm>
+          <a:prstGeom prst="rect">
+            <a:avLst/>
+          </a:prstGeom>
+          <a:noFill/>
+        </p:spPr>
+        <p:txBody>
+          <a:bodyPr wrap="square" rtlCol="0">
+            <a:spAutoFit/>
+          </a:bodyPr>
+          <a:lstStyle/>
+          <a:p>
+            <a:r>
+              <a:rPr lang="pt-BR" b="1" dirty="0" smtClean="0"/>
+              <a:t>RN06</a:t>
+            </a:r>
+            <a:r>
+              <a:rPr lang="pt-BR" dirty="0"/>
+              <a:t>: Tela Requisição &gt; [ ID] [Departamento]</a:t>
+            </a:r>
+          </a:p>
+          <a:p>
+            <a:r>
+              <a:rPr lang="pt-BR" b="1" dirty="0" smtClean="0"/>
+              <a:t>CT</a:t>
+            </a:r>
+            <a:r>
+              <a:rPr lang="pt-BR" dirty="0" smtClean="0"/>
+              <a:t>: </a:t>
+            </a:r>
+            <a:r>
+              <a:rPr lang="pt-BR" dirty="0"/>
+              <a:t>Ao digitar um </a:t>
+            </a:r>
+            <a:r>
+              <a:rPr lang="pt-BR" dirty="0" smtClean="0"/>
+              <a:t>id </a:t>
+            </a:r>
+            <a:r>
+              <a:rPr lang="pt-BR" dirty="0"/>
+              <a:t>no campo [ID] e esse existe na base de dados ou API o sistema deve exibir a descrição do departamento no campo Departamento. Se ao digitar um código, o mesmo não existir, logo a descrição deverá está vazia do campo Departamento</a:t>
+            </a:r>
+            <a:r>
+              <a:rPr lang="pt-BR" dirty="0" smtClean="0"/>
+              <a:t>.</a:t>
+            </a:r>
+            <a:endParaRPr lang="pt-BR" dirty="0" smtClean="0"/>
+          </a:p>
+          <a:p>
+            <a:r>
+              <a:rPr lang="pt-BR" b="1" dirty="0" err="1" smtClean="0"/>
+              <a:t>Pré</a:t>
+            </a:r>
+            <a:r>
+              <a:rPr lang="pt-BR" b="1" dirty="0" smtClean="0"/>
+              <a:t>- condição</a:t>
+            </a:r>
+            <a:r>
+              <a:rPr lang="pt-BR" dirty="0" smtClean="0"/>
+              <a:t>: Tela do almoxarifado deve estar aberta</a:t>
+            </a:r>
+            <a:endParaRPr lang="pt-BR" sz="2000" dirty="0"/>
+          </a:p>
+        </p:txBody>
+      </p:sp>
+      <p:graphicFrame>
+        <p:nvGraphicFramePr>
+          <p:cNvPr id="7" name="Tabela 6"/>
+          <p:cNvGraphicFramePr>
+            <a:graphicFrameLocks noGrp="1"/>
+          </p:cNvGraphicFramePr>
+          <p:nvPr>
+            <p:extLst>
+              <p:ext uri="{D42A27DB-BD31-4B8C-83A1-F6EECF244321}">
+                <p14:modId xmlns:p14="http://schemas.microsoft.com/office/powerpoint/2010/main" val="1212442528"/>
+              </p:ext>
+            </p:extLst>
+          </p:nvPr>
+        </p:nvGraphicFramePr>
+        <p:xfrm>
+          <a:off x="1489038" y="3169381"/>
+          <a:ext cx="8637974" cy="2216870"/>
+        </p:xfrm>
+        <a:graphic>
+          <a:graphicData uri="http://schemas.openxmlformats.org/drawingml/2006/table">
+            <a:tbl>
+              <a:tblPr firstRow="1" bandRow="1">
+                <a:tableStyleId>{073A0DAA-6AF3-43AB-8588-CEC1D06C72B9}</a:tableStyleId>
+              </a:tblPr>
+              <a:tblGrid>
+                <a:gridCol w="4318987">
+                  <a:extLst>
+                    <a:ext uri="{9D8B030D-6E8A-4147-A177-3AD203B41FA5}">
+                      <a16:colId xmlns:a16="http://schemas.microsoft.com/office/drawing/2014/main" val="1568086812"/>
+                    </a:ext>
+                  </a:extLst>
+                </a:gridCol>
+                <a:gridCol w="4318987">
+                  <a:extLst>
+                    <a:ext uri="{9D8B030D-6E8A-4147-A177-3AD203B41FA5}">
+                      <a16:colId xmlns:a16="http://schemas.microsoft.com/office/drawing/2014/main" val="2953003252"/>
+                    </a:ext>
+                  </a:extLst>
+                </a:gridCol>
+              </a:tblGrid>
+              <a:tr h="278720">
+                <a:tc>
+                  <a:txBody>
+                    <a:bodyPr/>
+                    <a:lstStyle/>
+                    <a:p>
+                      <a:r>
+                        <a:rPr lang="pt-BR" dirty="0" smtClean="0"/>
+                        <a:t>Ação</a:t>
+                      </a:r>
+                      <a:r>
+                        <a:rPr lang="pt-BR" baseline="0" dirty="0" smtClean="0"/>
+                        <a:t> </a:t>
+                      </a:r>
+                      <a:endParaRPr lang="pt-BR" dirty="0"/>
+                    </a:p>
+                  </a:txBody>
+                  <a:tcPr/>
+                </a:tc>
+                <a:tc>
+                  <a:txBody>
+                    <a:bodyPr/>
+                    <a:lstStyle/>
+                    <a:p>
+                      <a:r>
+                        <a:rPr lang="pt-BR" dirty="0" smtClean="0"/>
+                        <a:t>Resultado</a:t>
+                      </a:r>
+                      <a:r>
+                        <a:rPr lang="pt-BR" baseline="0" dirty="0" smtClean="0"/>
+                        <a:t> esperado</a:t>
+                      </a:r>
+                      <a:endParaRPr lang="pt-BR" dirty="0"/>
+                    </a:p>
+                  </a:txBody>
+                  <a:tcPr/>
+                </a:tc>
+                <a:extLst>
+                  <a:ext uri="{0D108BD9-81ED-4DB2-BD59-A6C34878D82A}">
+                    <a16:rowId xmlns:a16="http://schemas.microsoft.com/office/drawing/2014/main" val="2950044456"/>
+                  </a:ext>
+                </a:extLst>
+              </a:tr>
+              <a:tr h="540470">
+                <a:tc>
+                  <a:txBody>
+                    <a:bodyPr/>
+                    <a:lstStyle/>
+                    <a:p>
+                      <a:r>
+                        <a:rPr lang="pt-BR" sz="1600" dirty="0" smtClean="0"/>
+                        <a:t>1 - Clicar no</a:t>
+                      </a:r>
+                      <a:r>
+                        <a:rPr lang="pt-BR" sz="1600" baseline="0" dirty="0" smtClean="0"/>
+                        <a:t> </a:t>
+                      </a:r>
+                      <a:r>
+                        <a:rPr lang="pt-BR" sz="1600" dirty="0" smtClean="0"/>
+                        <a:t>campo</a:t>
+                      </a:r>
+                      <a:r>
+                        <a:rPr lang="pt-BR" sz="1600" baseline="0" dirty="0" smtClean="0"/>
+                        <a:t> </a:t>
+                      </a:r>
+                      <a:r>
+                        <a:rPr lang="pt-BR" sz="1600" baseline="0" dirty="0" smtClean="0"/>
+                        <a:t>:“ID”</a:t>
+                      </a:r>
+                      <a:endParaRPr lang="pt-BR" sz="1600" dirty="0"/>
+                    </a:p>
+                  </a:txBody>
+                  <a:tcPr/>
+                </a:tc>
+                <a:tc>
+                  <a:txBody>
+                    <a:bodyPr/>
+                    <a:lstStyle/>
+                    <a:p>
+                      <a:pPr marL="0" marR="0" indent="0" algn="l" defTabSz="914400" rtl="0" eaLnBrk="1" fontAlgn="auto" latinLnBrk="0" hangingPunct="1">
+                        <a:lnSpc>
+                          <a:spcPct val="100000"/>
+                        </a:lnSpc>
+                        <a:spcBef>
+                          <a:spcPts val="0"/>
+                        </a:spcBef>
+                        <a:spcAft>
+                          <a:spcPts val="0"/>
+                        </a:spcAft>
+                        <a:buClrTx/>
+                        <a:buSzTx/>
+                        <a:buFontTx/>
+                        <a:buNone/>
+                        <a:tabLst/>
+                        <a:defRPr/>
+                      </a:pPr>
+                      <a:r>
+                        <a:rPr lang="pt-BR" sz="1600" dirty="0" smtClean="0"/>
+                        <a:t>O campo</a:t>
+                      </a:r>
+                      <a:r>
+                        <a:rPr lang="pt-BR" sz="1600" baseline="0" dirty="0" smtClean="0"/>
+                        <a:t> ficar habilitado;</a:t>
+                      </a:r>
+                      <a:endParaRPr lang="pt-BR" sz="1600" dirty="0"/>
+                    </a:p>
+                  </a:txBody>
+                  <a:tcPr/>
+                </a:tc>
+                <a:extLst>
+                  <a:ext uri="{0D108BD9-81ED-4DB2-BD59-A6C34878D82A}">
+                    <a16:rowId xmlns:a16="http://schemas.microsoft.com/office/drawing/2014/main" val="1126438125"/>
+                  </a:ext>
+                </a:extLst>
+              </a:tr>
+              <a:tr h="699562">
+                <a:tc>
+                  <a:txBody>
+                    <a:bodyPr/>
+                    <a:lstStyle/>
+                    <a:p>
+                      <a:r>
+                        <a:rPr lang="pt-BR" sz="1600" dirty="0" smtClean="0"/>
+                        <a:t>2 – Informar</a:t>
+                      </a:r>
+                      <a:r>
+                        <a:rPr lang="pt-BR" sz="1600" baseline="0" dirty="0" smtClean="0"/>
+                        <a:t> um id</a:t>
+                      </a:r>
+                      <a:endParaRPr lang="pt-BR" sz="1600" dirty="0"/>
+                    </a:p>
+                  </a:txBody>
+                  <a:tcPr/>
+                </a:tc>
+                <a:tc>
+                  <a:txBody>
+                    <a:bodyPr/>
+                    <a:lstStyle/>
+                    <a:p>
+                      <a:pPr marL="0" marR="0" indent="0" algn="l" defTabSz="914400" rtl="0" eaLnBrk="1" fontAlgn="auto" latinLnBrk="0" hangingPunct="1">
+                        <a:lnSpc>
+                          <a:spcPct val="100000"/>
+                        </a:lnSpc>
+                        <a:spcBef>
+                          <a:spcPts val="0"/>
+                        </a:spcBef>
+                        <a:spcAft>
+                          <a:spcPts val="0"/>
+                        </a:spcAft>
+                        <a:buClrTx/>
+                        <a:buSzTx/>
+                        <a:buFontTx/>
+                        <a:buNone/>
+                        <a:tabLst/>
+                        <a:defRPr/>
+                      </a:pPr>
+                      <a:r>
+                        <a:rPr lang="pt-BR" sz="1600" dirty="0" smtClean="0"/>
+                        <a:t>Se o id</a:t>
+                      </a:r>
+                      <a:r>
+                        <a:rPr lang="pt-BR" sz="1600" baseline="0" dirty="0" smtClean="0"/>
+                        <a:t> informado existir na base de dados, o campo Departamento deve ser preenchido automaticamente com a descrição do departamento. Se o id não existir, a descrição deve ficar vazia</a:t>
+                      </a:r>
+                      <a:endParaRPr lang="pt-BR" sz="1600" dirty="0"/>
+                    </a:p>
+                  </a:txBody>
+                  <a:tcPr/>
+                </a:tc>
+                <a:extLst>
+                  <a:ext uri="{0D108BD9-81ED-4DB2-BD59-A6C34878D82A}">
+                    <a16:rowId xmlns:a16="http://schemas.microsoft.com/office/drawing/2014/main" val="2516000402"/>
+                  </a:ext>
+                </a:extLst>
+              </a:tr>
+            </a:tbl>
+          </a:graphicData>
+        </a:graphic>
+      </p:graphicFrame>
+    </p:spTree>
+    <p:extLst>
+      <p:ext uri="{BB962C8B-B14F-4D97-AF65-F5344CB8AC3E}">
+        <p14:creationId xmlns:p14="http://schemas.microsoft.com/office/powerpoint/2010/main" val="3099926310"/>
+      </p:ext>
+    </p:extLst>
+  </p:cSld>
+  <p:clrMapOvr>
+    <a:masterClrMapping/>
+  </p:clrMapOvr>
+</p:sld>
+</file>
+
+<file path=ppt/slides/slide17.xml><?xml version="1.0" encoding="utf-8"?>
+<p:sld xmlns:a="http://schemas.openxmlformats.org/drawingml/2006/main" xmlns:r="http://schemas.openxmlformats.org/officeDocument/2006/relationships" xmlns:p="http://schemas.openxmlformats.org/presentationml/2006/main">
+  <p:cSld>
+    <p:spTree>
+      <p:nvGrpSpPr>
+        <p:cNvPr id="1" name=""/>
+        <p:cNvGrpSpPr/>
+        <p:nvPr/>
+      </p:nvGrpSpPr>
+      <p:grpSpPr>
+        <a:xfrm>
+          <a:off x="0" y="0"/>
+          <a:ext cx="0" cy="0"/>
+          <a:chOff x="0" y="0"/>
+          <a:chExt cx="0" cy="0"/>
+        </a:xfrm>
+      </p:grpSpPr>
+      <p:sp>
+        <p:nvSpPr>
+          <p:cNvPr id="3" name="Retângulo Arredondado 2"/>
+          <p:cNvSpPr/>
+          <p:nvPr/>
+        </p:nvSpPr>
+        <p:spPr>
+          <a:xfrm>
+            <a:off x="1189608" y="705853"/>
+            <a:ext cx="9445841" cy="593558"/>
+          </a:xfrm>
+          <a:prstGeom prst="roundRect">
+            <a:avLst/>
+          </a:prstGeom>
+        </p:spPr>
+        <p:style>
+          <a:lnRef idx="2">
+            <a:schemeClr val="dk1">
+              <a:shade val="50000"/>
+            </a:schemeClr>
+          </a:lnRef>
+          <a:fillRef idx="1">
+            <a:schemeClr val="dk1"/>
+          </a:fillRef>
+          <a:effectRef idx="0">
+            <a:schemeClr val="dk1"/>
+          </a:effectRef>
+          <a:fontRef idx="minor">
+            <a:schemeClr val="lt1"/>
+          </a:fontRef>
+        </p:style>
+        <p:txBody>
+          <a:bodyPr rtlCol="0" anchor="ctr"/>
+          <a:lstStyle/>
+          <a:p>
+            <a:pPr algn="ctr"/>
+            <a:endParaRPr lang="pt-BR"/>
+          </a:p>
+        </p:txBody>
+      </p:sp>
+      <p:sp>
+        <p:nvSpPr>
+          <p:cNvPr id="5" name="Retângulo 4"/>
+          <p:cNvSpPr/>
+          <p:nvPr/>
+        </p:nvSpPr>
+        <p:spPr>
+          <a:xfrm>
+            <a:off x="1267324" y="1299410"/>
+            <a:ext cx="9272337" cy="5301665"/>
+          </a:xfrm>
+          <a:prstGeom prst="rect">
+            <a:avLst/>
+          </a:prstGeom>
+          <a:noFill/>
+          <a:ln>
+            <a:solidFill>
+              <a:schemeClr val="tx1"/>
+            </a:solidFill>
+          </a:ln>
+        </p:spPr>
+        <p:style>
+          <a:lnRef idx="2">
+            <a:schemeClr val="accent1">
+              <a:shade val="50000"/>
+            </a:schemeClr>
+          </a:lnRef>
+          <a:fillRef idx="1">
+            <a:schemeClr val="accent1"/>
+          </a:fillRef>
+          <a:effectRef idx="0">
+            <a:schemeClr val="accent1"/>
+          </a:effectRef>
+          <a:fontRef idx="minor">
+            <a:schemeClr val="lt1"/>
+          </a:fontRef>
+        </p:style>
+        <p:txBody>
+          <a:bodyPr rtlCol="0" anchor="ctr"/>
+          <a:lstStyle/>
+          <a:p>
+            <a:pPr algn="ctr"/>
+            <a:endParaRPr lang="pt-BR"/>
+          </a:p>
+        </p:txBody>
+      </p:sp>
+      <p:sp>
+        <p:nvSpPr>
+          <p:cNvPr id="6" name="CaixaDeTexto 5"/>
+          <p:cNvSpPr txBox="1"/>
+          <p:nvPr/>
+        </p:nvSpPr>
+        <p:spPr>
+          <a:xfrm>
+            <a:off x="1395660" y="1495732"/>
+            <a:ext cx="9144001" cy="1477328"/>
+          </a:xfrm>
+          <a:prstGeom prst="rect">
+            <a:avLst/>
+          </a:prstGeom>
+          <a:noFill/>
+        </p:spPr>
+        <p:txBody>
+          <a:bodyPr wrap="square" rtlCol="0">
+            <a:spAutoFit/>
+          </a:bodyPr>
+          <a:lstStyle/>
+          <a:p>
+            <a:pPr lvl="0">
+              <a:defRPr/>
+            </a:pPr>
+            <a:r>
+              <a:rPr lang="pt-BR" b="1" dirty="0" smtClean="0"/>
+              <a:t>RN07</a:t>
+            </a:r>
+            <a:r>
+              <a:rPr lang="pt-BR" dirty="0"/>
+              <a:t>: Tela Requisição &gt; [ ID </a:t>
+            </a:r>
+            <a:r>
+              <a:rPr lang="pt-BR" dirty="0" err="1"/>
+              <a:t>Fun</a:t>
+            </a:r>
+            <a:r>
+              <a:rPr lang="pt-BR" dirty="0"/>
+              <a:t>] [Nome </a:t>
+            </a:r>
+            <a:r>
+              <a:rPr lang="pt-BR" dirty="0" smtClean="0"/>
+              <a:t>Funcionário]</a:t>
+            </a:r>
+            <a:endParaRPr lang="pt-BR" dirty="0"/>
+          </a:p>
+          <a:p>
+            <a:r>
+              <a:rPr lang="pt-BR" b="1" dirty="0" smtClean="0"/>
+              <a:t>CT</a:t>
+            </a:r>
+            <a:r>
+              <a:rPr lang="pt-BR" dirty="0" smtClean="0"/>
+              <a:t>: </a:t>
+            </a:r>
+            <a:r>
+              <a:rPr lang="pt-BR" dirty="0"/>
+              <a:t>Ao digitar um código no campo ID </a:t>
+            </a:r>
+            <a:r>
+              <a:rPr lang="pt-BR" dirty="0" err="1"/>
+              <a:t>Func</a:t>
+            </a:r>
+            <a:r>
+              <a:rPr lang="pt-BR" dirty="0"/>
+              <a:t> e esse existe na base de </a:t>
+            </a:r>
+            <a:r>
+              <a:rPr lang="pt-BR" dirty="0" smtClean="0"/>
+              <a:t>dados o </a:t>
+            </a:r>
+            <a:r>
+              <a:rPr lang="pt-BR" dirty="0"/>
+              <a:t>sistema deve exibir o nome do funcionário no </a:t>
+            </a:r>
+            <a:r>
+              <a:rPr lang="pt-BR" dirty="0" smtClean="0"/>
+              <a:t>campo: Nome Funcionário. </a:t>
+            </a:r>
+            <a:r>
+              <a:rPr lang="pt-BR" dirty="0"/>
+              <a:t>Se ao digitar um código, o mesmo não existir, logo o campo </a:t>
+            </a:r>
+            <a:r>
+              <a:rPr lang="pt-BR" dirty="0" smtClean="0"/>
+              <a:t>deve fica </a:t>
+            </a:r>
+            <a:r>
+              <a:rPr lang="pt-BR" dirty="0"/>
+              <a:t>vazio</a:t>
+            </a:r>
+            <a:r>
+              <a:rPr lang="pt-BR" dirty="0" smtClean="0"/>
+              <a:t>.</a:t>
+            </a:r>
+            <a:endParaRPr lang="pt-BR" dirty="0" smtClean="0"/>
+          </a:p>
+          <a:p>
+            <a:r>
+              <a:rPr lang="pt-BR" b="1" dirty="0" err="1" smtClean="0"/>
+              <a:t>Pré</a:t>
+            </a:r>
+            <a:r>
+              <a:rPr lang="pt-BR" b="1" dirty="0" smtClean="0"/>
+              <a:t>- condição</a:t>
+            </a:r>
+            <a:r>
+              <a:rPr lang="pt-BR" dirty="0" smtClean="0"/>
+              <a:t>: Tela do almoxarifado deve estar aberta</a:t>
+            </a:r>
+            <a:endParaRPr lang="pt-BR" sz="2000" dirty="0"/>
+          </a:p>
+        </p:txBody>
+      </p:sp>
+      <p:graphicFrame>
+        <p:nvGraphicFramePr>
+          <p:cNvPr id="7" name="Tabela 6"/>
+          <p:cNvGraphicFramePr>
+            <a:graphicFrameLocks noGrp="1"/>
+          </p:cNvGraphicFramePr>
+          <p:nvPr>
+            <p:extLst>
+              <p:ext uri="{D42A27DB-BD31-4B8C-83A1-F6EECF244321}">
+                <p14:modId xmlns:p14="http://schemas.microsoft.com/office/powerpoint/2010/main" val="4002910999"/>
+              </p:ext>
+            </p:extLst>
+          </p:nvPr>
+        </p:nvGraphicFramePr>
+        <p:xfrm>
+          <a:off x="1489038" y="3169381"/>
+          <a:ext cx="8637974" cy="1888282"/>
+        </p:xfrm>
+        <a:graphic>
+          <a:graphicData uri="http://schemas.openxmlformats.org/drawingml/2006/table">
+            <a:tbl>
+              <a:tblPr firstRow="1" bandRow="1">
+                <a:tableStyleId>{073A0DAA-6AF3-43AB-8588-CEC1D06C72B9}</a:tableStyleId>
+              </a:tblPr>
+              <a:tblGrid>
+                <a:gridCol w="4318987">
+                  <a:extLst>
+                    <a:ext uri="{9D8B030D-6E8A-4147-A177-3AD203B41FA5}">
+                      <a16:colId xmlns:a16="http://schemas.microsoft.com/office/drawing/2014/main" val="1568086812"/>
+                    </a:ext>
+                  </a:extLst>
+                </a:gridCol>
+                <a:gridCol w="4318987">
+                  <a:extLst>
+                    <a:ext uri="{9D8B030D-6E8A-4147-A177-3AD203B41FA5}">
+                      <a16:colId xmlns:a16="http://schemas.microsoft.com/office/drawing/2014/main" val="2953003252"/>
+                    </a:ext>
+                  </a:extLst>
+                </a:gridCol>
+              </a:tblGrid>
+              <a:tr h="278720">
+                <a:tc>
+                  <a:txBody>
+                    <a:bodyPr/>
+                    <a:lstStyle/>
+                    <a:p>
+                      <a:r>
+                        <a:rPr lang="pt-BR" dirty="0" smtClean="0"/>
+                        <a:t>Ação</a:t>
+                      </a:r>
+                      <a:r>
+                        <a:rPr lang="pt-BR" baseline="0" dirty="0" smtClean="0"/>
+                        <a:t> </a:t>
+                      </a:r>
+                      <a:endParaRPr lang="pt-BR" dirty="0"/>
+                    </a:p>
+                  </a:txBody>
+                  <a:tcPr/>
+                </a:tc>
+                <a:tc>
+                  <a:txBody>
+                    <a:bodyPr/>
+                    <a:lstStyle/>
+                    <a:p>
+                      <a:r>
+                        <a:rPr lang="pt-BR" dirty="0" smtClean="0"/>
+                        <a:t>Resultado</a:t>
+                      </a:r>
+                      <a:r>
+                        <a:rPr lang="pt-BR" baseline="0" dirty="0" smtClean="0"/>
+                        <a:t> esperado</a:t>
+                      </a:r>
+                      <a:endParaRPr lang="pt-BR" dirty="0"/>
+                    </a:p>
+                  </a:txBody>
+                  <a:tcPr/>
+                </a:tc>
+                <a:extLst>
+                  <a:ext uri="{0D108BD9-81ED-4DB2-BD59-A6C34878D82A}">
+                    <a16:rowId xmlns:a16="http://schemas.microsoft.com/office/drawing/2014/main" val="2950044456"/>
+                  </a:ext>
+                </a:extLst>
+              </a:tr>
+              <a:tr h="699562">
+                <a:tc>
+                  <a:txBody>
+                    <a:bodyPr/>
+                    <a:lstStyle/>
+                    <a:p>
+                      <a:r>
+                        <a:rPr lang="pt-BR" sz="1600" dirty="0" smtClean="0"/>
+                        <a:t>1 - Clicar no</a:t>
+                      </a:r>
+                      <a:r>
+                        <a:rPr lang="pt-BR" sz="1600" baseline="0" dirty="0" smtClean="0"/>
+                        <a:t> </a:t>
+                      </a:r>
+                      <a:r>
+                        <a:rPr lang="pt-BR" sz="1600" dirty="0" smtClean="0"/>
+                        <a:t>campo</a:t>
+                      </a:r>
+                      <a:r>
+                        <a:rPr lang="pt-BR" sz="1600" baseline="0" dirty="0" smtClean="0"/>
+                        <a:t> </a:t>
+                      </a:r>
+                      <a:r>
+                        <a:rPr lang="pt-BR" sz="1600" baseline="0" dirty="0" smtClean="0"/>
+                        <a:t>:“</a:t>
+                      </a:r>
+                      <a:r>
+                        <a:rPr lang="pt-BR" sz="1600" dirty="0" smtClean="0"/>
+                        <a:t>ID </a:t>
+                      </a:r>
+                      <a:r>
+                        <a:rPr lang="pt-BR" sz="1600" dirty="0" err="1" smtClean="0"/>
+                        <a:t>Func</a:t>
+                      </a:r>
+                      <a:r>
+                        <a:rPr lang="pt-BR" sz="1600" dirty="0" smtClean="0"/>
+                        <a:t> </a:t>
+                      </a:r>
+                      <a:r>
+                        <a:rPr lang="pt-BR" sz="1600" baseline="0" dirty="0" smtClean="0"/>
+                        <a:t>”</a:t>
+                      </a:r>
+                      <a:endParaRPr lang="pt-BR" sz="1600" dirty="0"/>
+                    </a:p>
+                  </a:txBody>
+                  <a:tcPr/>
+                </a:tc>
+                <a:tc>
+                  <a:txBody>
+                    <a:bodyPr/>
+                    <a:lstStyle/>
+                    <a:p>
+                      <a:pPr marL="0" marR="0" indent="0" algn="l" defTabSz="914400" rtl="0" eaLnBrk="1" fontAlgn="auto" latinLnBrk="0" hangingPunct="1">
+                        <a:lnSpc>
+                          <a:spcPct val="100000"/>
+                        </a:lnSpc>
+                        <a:spcBef>
+                          <a:spcPts val="0"/>
+                        </a:spcBef>
+                        <a:spcAft>
+                          <a:spcPts val="0"/>
+                        </a:spcAft>
+                        <a:buClrTx/>
+                        <a:buSzTx/>
+                        <a:buFontTx/>
+                        <a:buNone/>
+                        <a:tabLst/>
+                        <a:defRPr/>
+                      </a:pPr>
+                      <a:r>
+                        <a:rPr lang="pt-BR" sz="1600" dirty="0" smtClean="0"/>
+                        <a:t>O campo</a:t>
+                      </a:r>
+                      <a:r>
+                        <a:rPr lang="pt-BR" sz="1600" baseline="0" dirty="0" smtClean="0"/>
+                        <a:t> ficar habilitado;</a:t>
+                      </a:r>
+                      <a:endParaRPr lang="pt-BR" sz="1600" dirty="0" smtClean="0"/>
+                    </a:p>
+                    <a:p>
+                      <a:pPr marL="0" marR="0" indent="0" algn="l" defTabSz="914400" rtl="0" eaLnBrk="1" fontAlgn="auto" latinLnBrk="0" hangingPunct="1">
+                        <a:lnSpc>
+                          <a:spcPct val="100000"/>
+                        </a:lnSpc>
+                        <a:spcBef>
+                          <a:spcPts val="0"/>
+                        </a:spcBef>
+                        <a:spcAft>
+                          <a:spcPts val="0"/>
+                        </a:spcAft>
+                        <a:buClrTx/>
+                        <a:buSzTx/>
+                        <a:buFontTx/>
+                        <a:buNone/>
+                        <a:tabLst/>
+                        <a:defRPr/>
+                      </a:pPr>
+                      <a:endParaRPr lang="pt-BR" sz="1600" dirty="0"/>
+                    </a:p>
+                  </a:txBody>
+                  <a:tcPr/>
+                </a:tc>
+                <a:extLst>
+                  <a:ext uri="{0D108BD9-81ED-4DB2-BD59-A6C34878D82A}">
+                    <a16:rowId xmlns:a16="http://schemas.microsoft.com/office/drawing/2014/main" val="1126438125"/>
+                  </a:ext>
+                </a:extLst>
+              </a:tr>
+              <a:tr h="699562">
+                <a:tc>
+                  <a:txBody>
+                    <a:bodyPr/>
+                    <a:lstStyle/>
+                    <a:p>
+                      <a:pPr marL="0" marR="0" indent="0" algn="l" defTabSz="914400" rtl="0" eaLnBrk="1" fontAlgn="auto" latinLnBrk="0" hangingPunct="1">
+                        <a:lnSpc>
+                          <a:spcPct val="100000"/>
+                        </a:lnSpc>
+                        <a:spcBef>
+                          <a:spcPts val="0"/>
+                        </a:spcBef>
+                        <a:spcAft>
+                          <a:spcPts val="0"/>
+                        </a:spcAft>
+                        <a:buClrTx/>
+                        <a:buSzTx/>
+                        <a:buFontTx/>
+                        <a:buNone/>
+                        <a:tabLst/>
+                        <a:defRPr/>
+                      </a:pPr>
+                      <a:r>
+                        <a:rPr lang="pt-BR" sz="1600" dirty="0" smtClean="0"/>
+                        <a:t>2 – Informar</a:t>
+                      </a:r>
+                      <a:r>
+                        <a:rPr lang="pt-BR" sz="1600" baseline="0" dirty="0" smtClean="0"/>
+                        <a:t> um id</a:t>
+                      </a:r>
+                      <a:endParaRPr lang="pt-BR" sz="1600" dirty="0" smtClean="0"/>
+                    </a:p>
+                    <a:p>
+                      <a:endParaRPr lang="pt-BR" sz="1600" dirty="0"/>
+                    </a:p>
+                  </a:txBody>
+                  <a:tcPr/>
+                </a:tc>
+                <a:tc>
+                  <a:txBody>
+                    <a:bodyPr/>
+                    <a:lstStyle/>
+                    <a:p>
+                      <a:pPr marL="0" marR="0" indent="0" algn="l" defTabSz="914400" rtl="0" eaLnBrk="1" fontAlgn="auto" latinLnBrk="0" hangingPunct="1">
+                        <a:lnSpc>
+                          <a:spcPct val="100000"/>
+                        </a:lnSpc>
+                        <a:spcBef>
+                          <a:spcPts val="0"/>
+                        </a:spcBef>
+                        <a:spcAft>
+                          <a:spcPts val="0"/>
+                        </a:spcAft>
+                        <a:buClrTx/>
+                        <a:buSzTx/>
+                        <a:buFontTx/>
+                        <a:buNone/>
+                        <a:tabLst/>
+                        <a:defRPr/>
+                      </a:pPr>
+                      <a:r>
+                        <a:rPr lang="pt-BR" sz="1600" dirty="0" smtClean="0"/>
+                        <a:t>Se</a:t>
+                      </a:r>
+                      <a:r>
+                        <a:rPr lang="pt-BR" sz="1600" baseline="0" dirty="0" smtClean="0"/>
+                        <a:t> o id do funcionário existir, o</a:t>
+                      </a:r>
+                      <a:r>
+                        <a:rPr lang="pt-BR" sz="1600" dirty="0" smtClean="0"/>
+                        <a:t>s</a:t>
+                      </a:r>
+                      <a:r>
+                        <a:rPr lang="pt-BR" sz="1600" baseline="0" dirty="0" smtClean="0"/>
+                        <a:t> dados devem automaticamente preencher o campo :”</a:t>
+                      </a:r>
+                      <a:r>
+                        <a:rPr lang="pt-BR" sz="1600" dirty="0" smtClean="0"/>
+                        <a:t> Nome Funcionário”. Se não, o campo deve ficar vazio</a:t>
+                      </a:r>
+                      <a:endParaRPr lang="pt-BR" sz="1600" dirty="0"/>
+                    </a:p>
+                  </a:txBody>
+                  <a:tcPr/>
+                </a:tc>
+                <a:extLst>
+                  <a:ext uri="{0D108BD9-81ED-4DB2-BD59-A6C34878D82A}">
+                    <a16:rowId xmlns:a16="http://schemas.microsoft.com/office/drawing/2014/main" val="4054034765"/>
+                  </a:ext>
+                </a:extLst>
+              </a:tr>
+            </a:tbl>
+          </a:graphicData>
+        </a:graphic>
+      </p:graphicFrame>
+    </p:spTree>
+    <p:extLst>
+      <p:ext uri="{BB962C8B-B14F-4D97-AF65-F5344CB8AC3E}">
+        <p14:creationId xmlns:p14="http://schemas.microsoft.com/office/powerpoint/2010/main" val="1403290906"/>
+      </p:ext>
+    </p:extLst>
+  </p:cSld>
+  <p:clrMapOvr>
+    <a:masterClrMapping/>
+  </p:clrMapOvr>
+</p:sld>
+</file>
+
+<file path=ppt/slides/slide18.xml><?xml version="1.0" encoding="utf-8"?>
+<p:sld xmlns:a="http://schemas.openxmlformats.org/drawingml/2006/main" xmlns:r="http://schemas.openxmlformats.org/officeDocument/2006/relationships" xmlns:p="http://schemas.openxmlformats.org/presentationml/2006/main">
+  <p:cSld>
+    <p:spTree>
+      <p:nvGrpSpPr>
+        <p:cNvPr id="1" name=""/>
+        <p:cNvGrpSpPr/>
+        <p:nvPr/>
+      </p:nvGrpSpPr>
+      <p:grpSpPr>
+        <a:xfrm>
+          <a:off x="0" y="0"/>
+          <a:ext cx="0" cy="0"/>
+          <a:chOff x="0" y="0"/>
+          <a:chExt cx="0" cy="0"/>
+        </a:xfrm>
+      </p:grpSpPr>
+      <p:sp>
+        <p:nvSpPr>
+          <p:cNvPr id="3" name="Retângulo Arredondado 2"/>
+          <p:cNvSpPr/>
+          <p:nvPr/>
+        </p:nvSpPr>
+        <p:spPr>
+          <a:xfrm>
+            <a:off x="1189608" y="705853"/>
+            <a:ext cx="9445841" cy="593558"/>
+          </a:xfrm>
+          <a:prstGeom prst="roundRect">
+            <a:avLst/>
+          </a:prstGeom>
+        </p:spPr>
+        <p:style>
+          <a:lnRef idx="2">
+            <a:schemeClr val="dk1">
+              <a:shade val="50000"/>
+            </a:schemeClr>
+          </a:lnRef>
+          <a:fillRef idx="1">
+            <a:schemeClr val="dk1"/>
+          </a:fillRef>
+          <a:effectRef idx="0">
+            <a:schemeClr val="dk1"/>
+          </a:effectRef>
+          <a:fontRef idx="minor">
+            <a:schemeClr val="lt1"/>
+          </a:fontRef>
+        </p:style>
+        <p:txBody>
+          <a:bodyPr rtlCol="0" anchor="ctr"/>
+          <a:lstStyle/>
+          <a:p>
+            <a:pPr algn="ctr"/>
+            <a:endParaRPr lang="pt-BR"/>
+          </a:p>
+        </p:txBody>
+      </p:sp>
+      <p:sp>
+        <p:nvSpPr>
+          <p:cNvPr id="5" name="Retângulo 4"/>
+          <p:cNvSpPr/>
+          <p:nvPr/>
+        </p:nvSpPr>
+        <p:spPr>
+          <a:xfrm>
+            <a:off x="1267324" y="1299410"/>
+            <a:ext cx="9272337" cy="5301665"/>
+          </a:xfrm>
+          <a:prstGeom prst="rect">
+            <a:avLst/>
+          </a:prstGeom>
+          <a:noFill/>
+          <a:ln>
+            <a:solidFill>
+              <a:schemeClr val="tx1"/>
+            </a:solidFill>
+          </a:ln>
+        </p:spPr>
+        <p:style>
+          <a:lnRef idx="2">
+            <a:schemeClr val="accent1">
+              <a:shade val="50000"/>
+            </a:schemeClr>
+          </a:lnRef>
+          <a:fillRef idx="1">
+            <a:schemeClr val="accent1"/>
+          </a:fillRef>
+          <a:effectRef idx="0">
+            <a:schemeClr val="accent1"/>
+          </a:effectRef>
+          <a:fontRef idx="minor">
+            <a:schemeClr val="lt1"/>
+          </a:fontRef>
+        </p:style>
+        <p:txBody>
+          <a:bodyPr rtlCol="0" anchor="ctr"/>
+          <a:lstStyle/>
+          <a:p>
+            <a:pPr algn="ctr"/>
+            <a:endParaRPr lang="pt-BR"/>
+          </a:p>
+        </p:txBody>
+      </p:sp>
+      <p:sp>
+        <p:nvSpPr>
+          <p:cNvPr id="6" name="CaixaDeTexto 5"/>
+          <p:cNvSpPr txBox="1"/>
+          <p:nvPr/>
+        </p:nvSpPr>
+        <p:spPr>
+          <a:xfrm>
+            <a:off x="1395660" y="1495732"/>
+            <a:ext cx="9144001" cy="1477328"/>
+          </a:xfrm>
+          <a:prstGeom prst="rect">
+            <a:avLst/>
+          </a:prstGeom>
+          <a:noFill/>
+        </p:spPr>
+        <p:txBody>
+          <a:bodyPr wrap="square" rtlCol="0">
+            <a:spAutoFit/>
+          </a:bodyPr>
+          <a:lstStyle/>
+          <a:p>
+            <a:r>
+              <a:rPr lang="pt-BR" b="1" dirty="0" smtClean="0"/>
+              <a:t>RN05</a:t>
+            </a:r>
+            <a:r>
+              <a:rPr lang="pt-BR" dirty="0" smtClean="0"/>
+              <a:t>: </a:t>
+            </a:r>
+            <a:r>
+              <a:rPr lang="pt-BR" dirty="0"/>
+              <a:t>Tela Requisição &gt; Motivo</a:t>
+            </a:r>
+          </a:p>
+          <a:p>
+            <a:pPr lvl="0"/>
+            <a:r>
+              <a:rPr lang="pt-BR" b="1" dirty="0" smtClean="0"/>
+              <a:t>CT</a:t>
+            </a:r>
+            <a:r>
+              <a:rPr lang="pt-BR" dirty="0" smtClean="0"/>
+              <a:t>: </a:t>
+            </a:r>
+            <a:r>
+              <a:rPr lang="pt-BR" dirty="0" smtClean="0"/>
+              <a:t>Ao </a:t>
+            </a:r>
+            <a:r>
+              <a:rPr lang="pt-BR" dirty="0"/>
+              <a:t>alterar os dados de uma categoria do </a:t>
+            </a:r>
+            <a:r>
+              <a:rPr lang="pt-BR" dirty="0" smtClean="0"/>
+              <a:t>motivo, </a:t>
+            </a:r>
+            <a:r>
+              <a:rPr lang="pt-BR" dirty="0"/>
+              <a:t>o campo motivo deve </a:t>
+            </a:r>
+            <a:r>
+              <a:rPr lang="pt-BR" dirty="0" smtClean="0"/>
+              <a:t>ser alterado e exibir  os </a:t>
+            </a:r>
+            <a:r>
+              <a:rPr lang="pt-BR" dirty="0"/>
+              <a:t>motivos da categoria </a:t>
+            </a:r>
+            <a:r>
+              <a:rPr lang="pt-BR" dirty="0" smtClean="0"/>
+              <a:t>que foi informada, se o campo da categoria não for preenchido, o campo motivo deve ficar desabilitado e com a cor de  fundo cinza;</a:t>
+            </a:r>
+            <a:endParaRPr lang="pt-BR" dirty="0" smtClean="0"/>
+          </a:p>
+          <a:p>
+            <a:r>
+              <a:rPr lang="pt-BR" b="1" dirty="0" err="1" smtClean="0"/>
+              <a:t>Pré</a:t>
+            </a:r>
+            <a:r>
+              <a:rPr lang="pt-BR" b="1" dirty="0" smtClean="0"/>
+              <a:t>- condição</a:t>
+            </a:r>
+            <a:r>
+              <a:rPr lang="pt-BR" dirty="0" smtClean="0"/>
+              <a:t>: Tela do almoxarifado deve estar aberta</a:t>
+            </a:r>
+            <a:endParaRPr lang="pt-BR" sz="2000" dirty="0"/>
+          </a:p>
+        </p:txBody>
+      </p:sp>
+      <p:graphicFrame>
+        <p:nvGraphicFramePr>
+          <p:cNvPr id="7" name="Tabela 6"/>
+          <p:cNvGraphicFramePr>
+            <a:graphicFrameLocks noGrp="1"/>
+          </p:cNvGraphicFramePr>
+          <p:nvPr>
+            <p:extLst>
+              <p:ext uri="{D42A27DB-BD31-4B8C-83A1-F6EECF244321}">
+                <p14:modId xmlns:p14="http://schemas.microsoft.com/office/powerpoint/2010/main" val="2616128368"/>
+              </p:ext>
+            </p:extLst>
+          </p:nvPr>
+        </p:nvGraphicFramePr>
+        <p:xfrm>
+          <a:off x="1489038" y="3169381"/>
+          <a:ext cx="8637974" cy="1188720"/>
+        </p:xfrm>
+        <a:graphic>
+          <a:graphicData uri="http://schemas.openxmlformats.org/drawingml/2006/table">
+            <a:tbl>
+              <a:tblPr firstRow="1" bandRow="1">
+                <a:tableStyleId>{073A0DAA-6AF3-43AB-8588-CEC1D06C72B9}</a:tableStyleId>
+              </a:tblPr>
+              <a:tblGrid>
+                <a:gridCol w="4318987">
+                  <a:extLst>
+                    <a:ext uri="{9D8B030D-6E8A-4147-A177-3AD203B41FA5}">
+                      <a16:colId xmlns:a16="http://schemas.microsoft.com/office/drawing/2014/main" val="1568086812"/>
+                    </a:ext>
+                  </a:extLst>
+                </a:gridCol>
+                <a:gridCol w="4318987">
+                  <a:extLst>
+                    <a:ext uri="{9D8B030D-6E8A-4147-A177-3AD203B41FA5}">
+                      <a16:colId xmlns:a16="http://schemas.microsoft.com/office/drawing/2014/main" val="2953003252"/>
+                    </a:ext>
+                  </a:extLst>
+                </a:gridCol>
+              </a:tblGrid>
+              <a:tr h="278720">
+                <a:tc>
+                  <a:txBody>
+                    <a:bodyPr/>
+                    <a:lstStyle/>
+                    <a:p>
+                      <a:r>
+                        <a:rPr lang="pt-BR" dirty="0" smtClean="0"/>
+                        <a:t>Ação</a:t>
+                      </a:r>
+                      <a:r>
+                        <a:rPr lang="pt-BR" baseline="0" dirty="0" smtClean="0"/>
+                        <a:t> </a:t>
+                      </a:r>
+                      <a:endParaRPr lang="pt-BR" dirty="0"/>
+                    </a:p>
+                  </a:txBody>
+                  <a:tcPr/>
+                </a:tc>
+                <a:tc>
+                  <a:txBody>
+                    <a:bodyPr/>
+                    <a:lstStyle/>
+                    <a:p>
+                      <a:r>
+                        <a:rPr lang="pt-BR" dirty="0" smtClean="0"/>
+                        <a:t>Resultado</a:t>
+                      </a:r>
+                      <a:r>
+                        <a:rPr lang="pt-BR" baseline="0" dirty="0" smtClean="0"/>
+                        <a:t> esperado</a:t>
+                      </a:r>
+                      <a:endParaRPr lang="pt-BR" dirty="0"/>
+                    </a:p>
+                  </a:txBody>
+                  <a:tcPr/>
+                </a:tc>
+                <a:extLst>
+                  <a:ext uri="{0D108BD9-81ED-4DB2-BD59-A6C34878D82A}">
+                    <a16:rowId xmlns:a16="http://schemas.microsoft.com/office/drawing/2014/main" val="2950044456"/>
+                  </a:ext>
+                </a:extLst>
+              </a:tr>
+              <a:tr h="699562">
+                <a:tc>
+                  <a:txBody>
+                    <a:bodyPr/>
+                    <a:lstStyle/>
+                    <a:p>
+                      <a:r>
+                        <a:rPr lang="pt-BR" sz="1600" dirty="0" smtClean="0"/>
+                        <a:t>1 - Clicar no</a:t>
+                      </a:r>
+                      <a:r>
+                        <a:rPr lang="pt-BR" sz="1600" baseline="0" dirty="0" smtClean="0"/>
+                        <a:t> </a:t>
+                      </a:r>
+                      <a:r>
+                        <a:rPr lang="pt-BR" sz="1600" dirty="0" smtClean="0"/>
+                        <a:t>campo</a:t>
+                      </a:r>
+                      <a:r>
+                        <a:rPr lang="pt-BR" sz="1600" baseline="0" dirty="0" smtClean="0"/>
+                        <a:t> </a:t>
+                      </a:r>
+                      <a:r>
+                        <a:rPr lang="pt-BR" sz="1600" baseline="0" dirty="0" smtClean="0"/>
+                        <a:t>:“Categoria Motivo</a:t>
+                      </a:r>
+                      <a:r>
+                        <a:rPr lang="pt-BR" sz="1600" baseline="0" dirty="0" smtClean="0"/>
+                        <a:t>”</a:t>
+                      </a:r>
+                      <a:endParaRPr lang="pt-BR" sz="1600" dirty="0"/>
+                    </a:p>
+                  </a:txBody>
+                  <a:tcPr/>
+                </a:tc>
+                <a:tc>
+                  <a:txBody>
+                    <a:bodyPr/>
+                    <a:lstStyle/>
+                    <a:p>
+                      <a:pPr marL="0" marR="0" indent="0" algn="l" defTabSz="914400" rtl="0" eaLnBrk="1" fontAlgn="auto" latinLnBrk="0" hangingPunct="1">
+                        <a:lnSpc>
+                          <a:spcPct val="100000"/>
+                        </a:lnSpc>
+                        <a:spcBef>
+                          <a:spcPts val="0"/>
+                        </a:spcBef>
+                        <a:spcAft>
+                          <a:spcPts val="0"/>
+                        </a:spcAft>
+                        <a:buClrTx/>
+                        <a:buSzTx/>
+                        <a:buFontTx/>
+                        <a:buNone/>
+                        <a:tabLst/>
+                        <a:defRPr/>
+                      </a:pPr>
+                      <a:r>
+                        <a:rPr lang="pt-BR" sz="1600" dirty="0" smtClean="0"/>
+                        <a:t>Os</a:t>
+                      </a:r>
+                      <a:r>
+                        <a:rPr lang="pt-BR" sz="1600" baseline="0" dirty="0" smtClean="0"/>
+                        <a:t> dados devem automaticamente </a:t>
+                      </a:r>
+                      <a:r>
+                        <a:rPr lang="pt-BR" sz="1600" baseline="0" dirty="0" smtClean="0"/>
+                        <a:t>preencher o campo :”Motivo”  a partir dos motivos da categoria informada</a:t>
+                      </a:r>
+                      <a:endParaRPr lang="pt-BR" sz="1600" dirty="0"/>
+                    </a:p>
+                  </a:txBody>
+                  <a:tcPr/>
+                </a:tc>
+                <a:extLst>
+                  <a:ext uri="{0D108BD9-81ED-4DB2-BD59-A6C34878D82A}">
+                    <a16:rowId xmlns:a16="http://schemas.microsoft.com/office/drawing/2014/main" val="1126438125"/>
+                  </a:ext>
+                </a:extLst>
+              </a:tr>
+            </a:tbl>
+          </a:graphicData>
+        </a:graphic>
+      </p:graphicFrame>
+    </p:spTree>
+    <p:extLst>
+      <p:ext uri="{BB962C8B-B14F-4D97-AF65-F5344CB8AC3E}">
+        <p14:creationId xmlns:p14="http://schemas.microsoft.com/office/powerpoint/2010/main" val="3623731658"/>
+      </p:ext>
+    </p:extLst>
+  </p:cSld>
+  <p:clrMapOvr>
+    <a:masterClrMapping/>
+  </p:clrMapOvr>
+</p:sld>
+</file>
+
+<file path=ppt/slides/slide19.xml><?xml version="1.0" encoding="utf-8"?>
+<p:sld xmlns:a="http://schemas.openxmlformats.org/drawingml/2006/main" xmlns:r="http://schemas.openxmlformats.org/officeDocument/2006/relationships" xmlns:p="http://schemas.openxmlformats.org/presentationml/2006/main">
+  <p:cSld>
+    <p:spTree>
+      <p:nvGrpSpPr>
+        <p:cNvPr id="1" name=""/>
+        <p:cNvGrpSpPr/>
+        <p:nvPr/>
+      </p:nvGrpSpPr>
+      <p:grpSpPr>
+        <a:xfrm>
+          <a:off x="0" y="0"/>
+          <a:ext cx="0" cy="0"/>
+          <a:chOff x="0" y="0"/>
+          <a:chExt cx="0" cy="0"/>
+        </a:xfrm>
+      </p:grpSpPr>
+      <p:sp>
+        <p:nvSpPr>
+          <p:cNvPr id="3" name="Retângulo Arredondado 2"/>
+          <p:cNvSpPr/>
+          <p:nvPr/>
+        </p:nvSpPr>
+        <p:spPr>
+          <a:xfrm>
+            <a:off x="1189608" y="705853"/>
+            <a:ext cx="9445841" cy="593558"/>
+          </a:xfrm>
+          <a:prstGeom prst="roundRect">
+            <a:avLst/>
+          </a:prstGeom>
+        </p:spPr>
+        <p:style>
+          <a:lnRef idx="2">
+            <a:schemeClr val="dk1">
+              <a:shade val="50000"/>
+            </a:schemeClr>
+          </a:lnRef>
+          <a:fillRef idx="1">
+            <a:schemeClr val="dk1"/>
+          </a:fillRef>
+          <a:effectRef idx="0">
+            <a:schemeClr val="dk1"/>
+          </a:effectRef>
+          <a:fontRef idx="minor">
+            <a:schemeClr val="lt1"/>
+          </a:fontRef>
+        </p:style>
+        <p:txBody>
+          <a:bodyPr rtlCol="0" anchor="ctr"/>
+          <a:lstStyle/>
+          <a:p>
+            <a:pPr algn="ctr"/>
+            <a:endParaRPr lang="pt-BR"/>
+          </a:p>
+        </p:txBody>
+      </p:sp>
+      <p:sp>
+        <p:nvSpPr>
+          <p:cNvPr id="5" name="Retângulo 4"/>
+          <p:cNvSpPr/>
+          <p:nvPr/>
+        </p:nvSpPr>
+        <p:spPr>
+          <a:xfrm>
+            <a:off x="1267324" y="1299410"/>
+            <a:ext cx="9272337" cy="5301665"/>
+          </a:xfrm>
+          <a:prstGeom prst="rect">
+            <a:avLst/>
+          </a:prstGeom>
+          <a:noFill/>
+          <a:ln>
+            <a:solidFill>
+              <a:schemeClr val="tx1"/>
+            </a:solidFill>
+          </a:ln>
+        </p:spPr>
+        <p:style>
+          <a:lnRef idx="2">
+            <a:schemeClr val="accent1">
+              <a:shade val="50000"/>
+            </a:schemeClr>
+          </a:lnRef>
+          <a:fillRef idx="1">
+            <a:schemeClr val="accent1"/>
+          </a:fillRef>
+          <a:effectRef idx="0">
+            <a:schemeClr val="accent1"/>
+          </a:effectRef>
+          <a:fontRef idx="minor">
+            <a:schemeClr val="lt1"/>
+          </a:fontRef>
+        </p:style>
+        <p:txBody>
+          <a:bodyPr rtlCol="0" anchor="ctr"/>
+          <a:lstStyle/>
+          <a:p>
+            <a:pPr algn="ctr"/>
+            <a:endParaRPr lang="pt-BR"/>
+          </a:p>
+        </p:txBody>
+      </p:sp>
+      <p:sp>
+        <p:nvSpPr>
+          <p:cNvPr id="6" name="CaixaDeTexto 5"/>
+          <p:cNvSpPr txBox="1"/>
+          <p:nvPr/>
+        </p:nvSpPr>
+        <p:spPr>
+          <a:xfrm>
+            <a:off x="1395660" y="1495732"/>
+            <a:ext cx="9144001" cy="1477328"/>
+          </a:xfrm>
+          <a:prstGeom prst="rect">
+            <a:avLst/>
+          </a:prstGeom>
+          <a:noFill/>
+        </p:spPr>
+        <p:txBody>
+          <a:bodyPr wrap="square" rtlCol="0">
+            <a:spAutoFit/>
+          </a:bodyPr>
+          <a:lstStyle/>
+          <a:p>
+            <a:r>
+              <a:rPr lang="pt-BR" b="1" dirty="0" smtClean="0"/>
+              <a:t>RN05</a:t>
+            </a:r>
+            <a:r>
+              <a:rPr lang="pt-BR" dirty="0" smtClean="0"/>
+              <a:t>: </a:t>
+            </a:r>
+            <a:r>
+              <a:rPr lang="pt-BR" dirty="0"/>
+              <a:t>Tela Requisição &gt; Motivo</a:t>
+            </a:r>
+          </a:p>
+          <a:p>
+            <a:pPr lvl="0"/>
+            <a:r>
+              <a:rPr lang="pt-BR" b="1" dirty="0" smtClean="0"/>
+              <a:t>CT</a:t>
+            </a:r>
+            <a:r>
+              <a:rPr lang="pt-BR" dirty="0" smtClean="0"/>
+              <a:t>: </a:t>
+            </a:r>
+            <a:r>
+              <a:rPr lang="pt-BR" dirty="0" smtClean="0"/>
+              <a:t>Ao </a:t>
+            </a:r>
+            <a:r>
+              <a:rPr lang="pt-BR" dirty="0"/>
+              <a:t>alterar os dados de uma categoria do </a:t>
+            </a:r>
+            <a:r>
+              <a:rPr lang="pt-BR" dirty="0" smtClean="0"/>
+              <a:t>motivo, </a:t>
+            </a:r>
+            <a:r>
+              <a:rPr lang="pt-BR" dirty="0"/>
+              <a:t>o campo motivo deve </a:t>
+            </a:r>
+            <a:r>
+              <a:rPr lang="pt-BR" dirty="0" smtClean="0"/>
+              <a:t>ser alterado e exibir  os </a:t>
+            </a:r>
+            <a:r>
+              <a:rPr lang="pt-BR" dirty="0"/>
+              <a:t>motivos da categoria </a:t>
+            </a:r>
+            <a:r>
+              <a:rPr lang="pt-BR" dirty="0" smtClean="0"/>
+              <a:t>que foi informada, se o campo da categoria não for preenchido, o campo motivo deve ficar desabilitado e com a cor de  fundo cinza;</a:t>
+            </a:r>
+            <a:endParaRPr lang="pt-BR" dirty="0" smtClean="0"/>
+          </a:p>
+          <a:p>
+            <a:r>
+              <a:rPr lang="pt-BR" b="1" dirty="0" err="1" smtClean="0"/>
+              <a:t>Pré</a:t>
+            </a:r>
+            <a:r>
+              <a:rPr lang="pt-BR" b="1" dirty="0" smtClean="0"/>
+              <a:t>- condição</a:t>
+            </a:r>
+            <a:r>
+              <a:rPr lang="pt-BR" dirty="0" smtClean="0"/>
+              <a:t>: Tela do almoxarifado deve estar aberta</a:t>
+            </a:r>
+            <a:endParaRPr lang="pt-BR" sz="2000" dirty="0"/>
+          </a:p>
+        </p:txBody>
+      </p:sp>
+      <p:graphicFrame>
+        <p:nvGraphicFramePr>
+          <p:cNvPr id="7" name="Tabela 6"/>
+          <p:cNvGraphicFramePr>
+            <a:graphicFrameLocks noGrp="1"/>
+          </p:cNvGraphicFramePr>
+          <p:nvPr>
+            <p:extLst>
+              <p:ext uri="{D42A27DB-BD31-4B8C-83A1-F6EECF244321}">
+                <p14:modId xmlns:p14="http://schemas.microsoft.com/office/powerpoint/2010/main" val="2616128368"/>
+              </p:ext>
+            </p:extLst>
+          </p:nvPr>
+        </p:nvGraphicFramePr>
+        <p:xfrm>
+          <a:off x="1489038" y="3169381"/>
+          <a:ext cx="8637974" cy="1188720"/>
+        </p:xfrm>
+        <a:graphic>
+          <a:graphicData uri="http://schemas.openxmlformats.org/drawingml/2006/table">
+            <a:tbl>
+              <a:tblPr firstRow="1" bandRow="1">
+                <a:tableStyleId>{073A0DAA-6AF3-43AB-8588-CEC1D06C72B9}</a:tableStyleId>
+              </a:tblPr>
+              <a:tblGrid>
+                <a:gridCol w="4318987">
+                  <a:extLst>
+                    <a:ext uri="{9D8B030D-6E8A-4147-A177-3AD203B41FA5}">
+                      <a16:colId xmlns:a16="http://schemas.microsoft.com/office/drawing/2014/main" val="1568086812"/>
+                    </a:ext>
+                  </a:extLst>
+                </a:gridCol>
+                <a:gridCol w="4318987">
+                  <a:extLst>
+                    <a:ext uri="{9D8B030D-6E8A-4147-A177-3AD203B41FA5}">
+                      <a16:colId xmlns:a16="http://schemas.microsoft.com/office/drawing/2014/main" val="2953003252"/>
+                    </a:ext>
+                  </a:extLst>
+                </a:gridCol>
+              </a:tblGrid>
+              <a:tr h="278720">
+                <a:tc>
+                  <a:txBody>
+                    <a:bodyPr/>
+                    <a:lstStyle/>
+                    <a:p>
+                      <a:r>
+                        <a:rPr lang="pt-BR" dirty="0" smtClean="0"/>
+                        <a:t>Ação</a:t>
+                      </a:r>
+                      <a:r>
+                        <a:rPr lang="pt-BR" baseline="0" dirty="0" smtClean="0"/>
+                        <a:t> </a:t>
+                      </a:r>
+                      <a:endParaRPr lang="pt-BR" dirty="0"/>
+                    </a:p>
+                  </a:txBody>
+                  <a:tcPr/>
+                </a:tc>
+                <a:tc>
+                  <a:txBody>
+                    <a:bodyPr/>
+                    <a:lstStyle/>
+                    <a:p>
+                      <a:r>
+                        <a:rPr lang="pt-BR" dirty="0" smtClean="0"/>
+                        <a:t>Resultado</a:t>
+                      </a:r>
+                      <a:r>
+                        <a:rPr lang="pt-BR" baseline="0" dirty="0" smtClean="0"/>
+                        <a:t> esperado</a:t>
+                      </a:r>
+                      <a:endParaRPr lang="pt-BR" dirty="0"/>
+                    </a:p>
+                  </a:txBody>
+                  <a:tcPr/>
+                </a:tc>
+                <a:extLst>
+                  <a:ext uri="{0D108BD9-81ED-4DB2-BD59-A6C34878D82A}">
+                    <a16:rowId xmlns:a16="http://schemas.microsoft.com/office/drawing/2014/main" val="2950044456"/>
+                  </a:ext>
+                </a:extLst>
+              </a:tr>
+              <a:tr h="699562">
+                <a:tc>
+                  <a:txBody>
+                    <a:bodyPr/>
+                    <a:lstStyle/>
+                    <a:p>
+                      <a:r>
+                        <a:rPr lang="pt-BR" sz="1600" dirty="0" smtClean="0"/>
+                        <a:t>1 - Clicar no</a:t>
+                      </a:r>
+                      <a:r>
+                        <a:rPr lang="pt-BR" sz="1600" baseline="0" dirty="0" smtClean="0"/>
+                        <a:t> </a:t>
+                      </a:r>
+                      <a:r>
+                        <a:rPr lang="pt-BR" sz="1600" dirty="0" smtClean="0"/>
+                        <a:t>campo</a:t>
+                      </a:r>
+                      <a:r>
+                        <a:rPr lang="pt-BR" sz="1600" baseline="0" dirty="0" smtClean="0"/>
+                        <a:t> </a:t>
+                      </a:r>
+                      <a:r>
+                        <a:rPr lang="pt-BR" sz="1600" baseline="0" dirty="0" smtClean="0"/>
+                        <a:t>:“Categoria Motivo</a:t>
+                      </a:r>
+                      <a:r>
+                        <a:rPr lang="pt-BR" sz="1600" baseline="0" dirty="0" smtClean="0"/>
+                        <a:t>”</a:t>
+                      </a:r>
+                      <a:endParaRPr lang="pt-BR" sz="1600" dirty="0"/>
+                    </a:p>
+                  </a:txBody>
+                  <a:tcPr/>
+                </a:tc>
+                <a:tc>
+                  <a:txBody>
+                    <a:bodyPr/>
+                    <a:lstStyle/>
+                    <a:p>
+                      <a:pPr marL="0" marR="0" indent="0" algn="l" defTabSz="914400" rtl="0" eaLnBrk="1" fontAlgn="auto" latinLnBrk="0" hangingPunct="1">
+                        <a:lnSpc>
+                          <a:spcPct val="100000"/>
+                        </a:lnSpc>
+                        <a:spcBef>
+                          <a:spcPts val="0"/>
+                        </a:spcBef>
+                        <a:spcAft>
+                          <a:spcPts val="0"/>
+                        </a:spcAft>
+                        <a:buClrTx/>
+                        <a:buSzTx/>
+                        <a:buFontTx/>
+                        <a:buNone/>
+                        <a:tabLst/>
+                        <a:defRPr/>
+                      </a:pPr>
+                      <a:r>
+                        <a:rPr lang="pt-BR" sz="1600" dirty="0" smtClean="0"/>
+                        <a:t>Os</a:t>
+                      </a:r>
+                      <a:r>
+                        <a:rPr lang="pt-BR" sz="1600" baseline="0" dirty="0" smtClean="0"/>
+                        <a:t> dados devem automaticamente </a:t>
+                      </a:r>
+                      <a:r>
+                        <a:rPr lang="pt-BR" sz="1600" baseline="0" dirty="0" smtClean="0"/>
+                        <a:t>preencher o campo :”Motivo”  a partir dos motivos da categoria informada</a:t>
+                      </a:r>
+                      <a:endParaRPr lang="pt-BR" sz="1600" dirty="0"/>
+                    </a:p>
+                  </a:txBody>
+                  <a:tcPr/>
+                </a:tc>
+                <a:extLst>
+                  <a:ext uri="{0D108BD9-81ED-4DB2-BD59-A6C34878D82A}">
+                    <a16:rowId xmlns:a16="http://schemas.microsoft.com/office/drawing/2014/main" val="1126438125"/>
+                  </a:ext>
+                </a:extLst>
+              </a:tr>
+            </a:tbl>
+          </a:graphicData>
+        </a:graphic>
+      </p:graphicFrame>
+    </p:spTree>
+    <p:extLst>
+      <p:ext uri="{BB962C8B-B14F-4D97-AF65-F5344CB8AC3E}">
+        <p14:creationId xmlns:p14="http://schemas.microsoft.com/office/powerpoint/2010/main" val="771735336"/>
       </p:ext>
     </p:extLst>
   </p:cSld>
@@ -5318,6 +7105,756 @@
     <p:extLst>
       <p:ext uri="{BB962C8B-B14F-4D97-AF65-F5344CB8AC3E}">
         <p14:creationId xmlns:p14="http://schemas.microsoft.com/office/powerpoint/2010/main" val="1222528831"/>
+      </p:ext>
+    </p:extLst>
+  </p:cSld>
+  <p:clrMapOvr>
+    <a:masterClrMapping/>
+  </p:clrMapOvr>
+</p:sld>
+</file>
+
+<file path=ppt/slides/slide20.xml><?xml version="1.0" encoding="utf-8"?>
+<p:sld xmlns:a="http://schemas.openxmlformats.org/drawingml/2006/main" xmlns:r="http://schemas.openxmlformats.org/officeDocument/2006/relationships" xmlns:p="http://schemas.openxmlformats.org/presentationml/2006/main">
+  <p:cSld>
+    <p:spTree>
+      <p:nvGrpSpPr>
+        <p:cNvPr id="1" name=""/>
+        <p:cNvGrpSpPr/>
+        <p:nvPr/>
+      </p:nvGrpSpPr>
+      <p:grpSpPr>
+        <a:xfrm>
+          <a:off x="0" y="0"/>
+          <a:ext cx="0" cy="0"/>
+          <a:chOff x="0" y="0"/>
+          <a:chExt cx="0" cy="0"/>
+        </a:xfrm>
+      </p:grpSpPr>
+      <p:sp>
+        <p:nvSpPr>
+          <p:cNvPr id="3" name="Retângulo Arredondado 2"/>
+          <p:cNvSpPr/>
+          <p:nvPr/>
+        </p:nvSpPr>
+        <p:spPr>
+          <a:xfrm>
+            <a:off x="1189608" y="705853"/>
+            <a:ext cx="9445841" cy="593558"/>
+          </a:xfrm>
+          <a:prstGeom prst="roundRect">
+            <a:avLst/>
+          </a:prstGeom>
+        </p:spPr>
+        <p:style>
+          <a:lnRef idx="2">
+            <a:schemeClr val="dk1">
+              <a:shade val="50000"/>
+            </a:schemeClr>
+          </a:lnRef>
+          <a:fillRef idx="1">
+            <a:schemeClr val="dk1"/>
+          </a:fillRef>
+          <a:effectRef idx="0">
+            <a:schemeClr val="dk1"/>
+          </a:effectRef>
+          <a:fontRef idx="minor">
+            <a:schemeClr val="lt1"/>
+          </a:fontRef>
+        </p:style>
+        <p:txBody>
+          <a:bodyPr rtlCol="0" anchor="ctr"/>
+          <a:lstStyle/>
+          <a:p>
+            <a:pPr algn="ctr"/>
+            <a:endParaRPr lang="pt-BR"/>
+          </a:p>
+        </p:txBody>
+      </p:sp>
+      <p:sp>
+        <p:nvSpPr>
+          <p:cNvPr id="5" name="Retângulo 4"/>
+          <p:cNvSpPr/>
+          <p:nvPr/>
+        </p:nvSpPr>
+        <p:spPr>
+          <a:xfrm>
+            <a:off x="1267324" y="1299410"/>
+            <a:ext cx="9272337" cy="5301665"/>
+          </a:xfrm>
+          <a:prstGeom prst="rect">
+            <a:avLst/>
+          </a:prstGeom>
+          <a:noFill/>
+          <a:ln>
+            <a:solidFill>
+              <a:schemeClr val="tx1"/>
+            </a:solidFill>
+          </a:ln>
+        </p:spPr>
+        <p:style>
+          <a:lnRef idx="2">
+            <a:schemeClr val="accent1">
+              <a:shade val="50000"/>
+            </a:schemeClr>
+          </a:lnRef>
+          <a:fillRef idx="1">
+            <a:schemeClr val="accent1"/>
+          </a:fillRef>
+          <a:effectRef idx="0">
+            <a:schemeClr val="accent1"/>
+          </a:effectRef>
+          <a:fontRef idx="minor">
+            <a:schemeClr val="lt1"/>
+          </a:fontRef>
+        </p:style>
+        <p:txBody>
+          <a:bodyPr rtlCol="0" anchor="ctr"/>
+          <a:lstStyle/>
+          <a:p>
+            <a:pPr algn="ctr"/>
+            <a:endParaRPr lang="pt-BR"/>
+          </a:p>
+        </p:txBody>
+      </p:sp>
+      <p:sp>
+        <p:nvSpPr>
+          <p:cNvPr id="6" name="CaixaDeTexto 5"/>
+          <p:cNvSpPr txBox="1"/>
+          <p:nvPr/>
+        </p:nvSpPr>
+        <p:spPr>
+          <a:xfrm>
+            <a:off x="1395660" y="1495732"/>
+            <a:ext cx="9144001" cy="1477328"/>
+          </a:xfrm>
+          <a:prstGeom prst="rect">
+            <a:avLst/>
+          </a:prstGeom>
+          <a:noFill/>
+        </p:spPr>
+        <p:txBody>
+          <a:bodyPr wrap="square" rtlCol="0">
+            <a:spAutoFit/>
+          </a:bodyPr>
+          <a:lstStyle/>
+          <a:p>
+            <a:r>
+              <a:rPr lang="pt-BR" b="1" dirty="0" smtClean="0"/>
+              <a:t>RN05</a:t>
+            </a:r>
+            <a:r>
+              <a:rPr lang="pt-BR" dirty="0" smtClean="0"/>
+              <a:t>: </a:t>
+            </a:r>
+            <a:r>
+              <a:rPr lang="pt-BR" dirty="0"/>
+              <a:t>Tela Requisição &gt; Motivo</a:t>
+            </a:r>
+          </a:p>
+          <a:p>
+            <a:pPr lvl="0"/>
+            <a:r>
+              <a:rPr lang="pt-BR" b="1" dirty="0" smtClean="0"/>
+              <a:t>CT</a:t>
+            </a:r>
+            <a:r>
+              <a:rPr lang="pt-BR" dirty="0" smtClean="0"/>
+              <a:t>: </a:t>
+            </a:r>
+            <a:r>
+              <a:rPr lang="pt-BR" dirty="0" smtClean="0"/>
+              <a:t>Ao </a:t>
+            </a:r>
+            <a:r>
+              <a:rPr lang="pt-BR" dirty="0"/>
+              <a:t>alterar os dados de uma categoria do </a:t>
+            </a:r>
+            <a:r>
+              <a:rPr lang="pt-BR" dirty="0" smtClean="0"/>
+              <a:t>motivo, </a:t>
+            </a:r>
+            <a:r>
+              <a:rPr lang="pt-BR" dirty="0"/>
+              <a:t>o campo motivo deve </a:t>
+            </a:r>
+            <a:r>
+              <a:rPr lang="pt-BR" dirty="0" smtClean="0"/>
+              <a:t>ser alterado e exibir  os </a:t>
+            </a:r>
+            <a:r>
+              <a:rPr lang="pt-BR" dirty="0"/>
+              <a:t>motivos da categoria </a:t>
+            </a:r>
+            <a:r>
+              <a:rPr lang="pt-BR" dirty="0" smtClean="0"/>
+              <a:t>que foi informada, se o campo da categoria não for preenchido, o campo motivo deve ficar desabilitado e com a cor de  fundo cinza;</a:t>
+            </a:r>
+            <a:endParaRPr lang="pt-BR" dirty="0" smtClean="0"/>
+          </a:p>
+          <a:p>
+            <a:r>
+              <a:rPr lang="pt-BR" b="1" dirty="0" err="1" smtClean="0"/>
+              <a:t>Pré</a:t>
+            </a:r>
+            <a:r>
+              <a:rPr lang="pt-BR" b="1" dirty="0" smtClean="0"/>
+              <a:t>- condição</a:t>
+            </a:r>
+            <a:r>
+              <a:rPr lang="pt-BR" dirty="0" smtClean="0"/>
+              <a:t>: Tela do almoxarifado deve estar aberta</a:t>
+            </a:r>
+            <a:endParaRPr lang="pt-BR" sz="2000" dirty="0"/>
+          </a:p>
+        </p:txBody>
+      </p:sp>
+      <p:graphicFrame>
+        <p:nvGraphicFramePr>
+          <p:cNvPr id="7" name="Tabela 6"/>
+          <p:cNvGraphicFramePr>
+            <a:graphicFrameLocks noGrp="1"/>
+          </p:cNvGraphicFramePr>
+          <p:nvPr>
+            <p:extLst>
+              <p:ext uri="{D42A27DB-BD31-4B8C-83A1-F6EECF244321}">
+                <p14:modId xmlns:p14="http://schemas.microsoft.com/office/powerpoint/2010/main" val="2616128368"/>
+              </p:ext>
+            </p:extLst>
+          </p:nvPr>
+        </p:nvGraphicFramePr>
+        <p:xfrm>
+          <a:off x="1489038" y="3169381"/>
+          <a:ext cx="8637974" cy="1188720"/>
+        </p:xfrm>
+        <a:graphic>
+          <a:graphicData uri="http://schemas.openxmlformats.org/drawingml/2006/table">
+            <a:tbl>
+              <a:tblPr firstRow="1" bandRow="1">
+                <a:tableStyleId>{073A0DAA-6AF3-43AB-8588-CEC1D06C72B9}</a:tableStyleId>
+              </a:tblPr>
+              <a:tblGrid>
+                <a:gridCol w="4318987">
+                  <a:extLst>
+                    <a:ext uri="{9D8B030D-6E8A-4147-A177-3AD203B41FA5}">
+                      <a16:colId xmlns:a16="http://schemas.microsoft.com/office/drawing/2014/main" val="1568086812"/>
+                    </a:ext>
+                  </a:extLst>
+                </a:gridCol>
+                <a:gridCol w="4318987">
+                  <a:extLst>
+                    <a:ext uri="{9D8B030D-6E8A-4147-A177-3AD203B41FA5}">
+                      <a16:colId xmlns:a16="http://schemas.microsoft.com/office/drawing/2014/main" val="2953003252"/>
+                    </a:ext>
+                  </a:extLst>
+                </a:gridCol>
+              </a:tblGrid>
+              <a:tr h="278720">
+                <a:tc>
+                  <a:txBody>
+                    <a:bodyPr/>
+                    <a:lstStyle/>
+                    <a:p>
+                      <a:r>
+                        <a:rPr lang="pt-BR" dirty="0" smtClean="0"/>
+                        <a:t>Ação</a:t>
+                      </a:r>
+                      <a:r>
+                        <a:rPr lang="pt-BR" baseline="0" dirty="0" smtClean="0"/>
+                        <a:t> </a:t>
+                      </a:r>
+                      <a:endParaRPr lang="pt-BR" dirty="0"/>
+                    </a:p>
+                  </a:txBody>
+                  <a:tcPr/>
+                </a:tc>
+                <a:tc>
+                  <a:txBody>
+                    <a:bodyPr/>
+                    <a:lstStyle/>
+                    <a:p>
+                      <a:r>
+                        <a:rPr lang="pt-BR" dirty="0" smtClean="0"/>
+                        <a:t>Resultado</a:t>
+                      </a:r>
+                      <a:r>
+                        <a:rPr lang="pt-BR" baseline="0" dirty="0" smtClean="0"/>
+                        <a:t> esperado</a:t>
+                      </a:r>
+                      <a:endParaRPr lang="pt-BR" dirty="0"/>
+                    </a:p>
+                  </a:txBody>
+                  <a:tcPr/>
+                </a:tc>
+                <a:extLst>
+                  <a:ext uri="{0D108BD9-81ED-4DB2-BD59-A6C34878D82A}">
+                    <a16:rowId xmlns:a16="http://schemas.microsoft.com/office/drawing/2014/main" val="2950044456"/>
+                  </a:ext>
+                </a:extLst>
+              </a:tr>
+              <a:tr h="699562">
+                <a:tc>
+                  <a:txBody>
+                    <a:bodyPr/>
+                    <a:lstStyle/>
+                    <a:p>
+                      <a:r>
+                        <a:rPr lang="pt-BR" sz="1600" dirty="0" smtClean="0"/>
+                        <a:t>1 - Clicar no</a:t>
+                      </a:r>
+                      <a:r>
+                        <a:rPr lang="pt-BR" sz="1600" baseline="0" dirty="0" smtClean="0"/>
+                        <a:t> </a:t>
+                      </a:r>
+                      <a:r>
+                        <a:rPr lang="pt-BR" sz="1600" dirty="0" smtClean="0"/>
+                        <a:t>campo</a:t>
+                      </a:r>
+                      <a:r>
+                        <a:rPr lang="pt-BR" sz="1600" baseline="0" dirty="0" smtClean="0"/>
+                        <a:t> </a:t>
+                      </a:r>
+                      <a:r>
+                        <a:rPr lang="pt-BR" sz="1600" baseline="0" dirty="0" smtClean="0"/>
+                        <a:t>:“Categoria Motivo</a:t>
+                      </a:r>
+                      <a:r>
+                        <a:rPr lang="pt-BR" sz="1600" baseline="0" dirty="0" smtClean="0"/>
+                        <a:t>”</a:t>
+                      </a:r>
+                      <a:endParaRPr lang="pt-BR" sz="1600" dirty="0"/>
+                    </a:p>
+                  </a:txBody>
+                  <a:tcPr/>
+                </a:tc>
+                <a:tc>
+                  <a:txBody>
+                    <a:bodyPr/>
+                    <a:lstStyle/>
+                    <a:p>
+                      <a:pPr marL="0" marR="0" indent="0" algn="l" defTabSz="914400" rtl="0" eaLnBrk="1" fontAlgn="auto" latinLnBrk="0" hangingPunct="1">
+                        <a:lnSpc>
+                          <a:spcPct val="100000"/>
+                        </a:lnSpc>
+                        <a:spcBef>
+                          <a:spcPts val="0"/>
+                        </a:spcBef>
+                        <a:spcAft>
+                          <a:spcPts val="0"/>
+                        </a:spcAft>
+                        <a:buClrTx/>
+                        <a:buSzTx/>
+                        <a:buFontTx/>
+                        <a:buNone/>
+                        <a:tabLst/>
+                        <a:defRPr/>
+                      </a:pPr>
+                      <a:r>
+                        <a:rPr lang="pt-BR" sz="1600" dirty="0" smtClean="0"/>
+                        <a:t>Os</a:t>
+                      </a:r>
+                      <a:r>
+                        <a:rPr lang="pt-BR" sz="1600" baseline="0" dirty="0" smtClean="0"/>
+                        <a:t> dados devem automaticamente </a:t>
+                      </a:r>
+                      <a:r>
+                        <a:rPr lang="pt-BR" sz="1600" baseline="0" dirty="0" smtClean="0"/>
+                        <a:t>preencher o campo :”Motivo”  a partir dos motivos da categoria informada</a:t>
+                      </a:r>
+                      <a:endParaRPr lang="pt-BR" sz="1600" dirty="0"/>
+                    </a:p>
+                  </a:txBody>
+                  <a:tcPr/>
+                </a:tc>
+                <a:extLst>
+                  <a:ext uri="{0D108BD9-81ED-4DB2-BD59-A6C34878D82A}">
+                    <a16:rowId xmlns:a16="http://schemas.microsoft.com/office/drawing/2014/main" val="1126438125"/>
+                  </a:ext>
+                </a:extLst>
+              </a:tr>
+            </a:tbl>
+          </a:graphicData>
+        </a:graphic>
+      </p:graphicFrame>
+    </p:spTree>
+    <p:extLst>
+      <p:ext uri="{BB962C8B-B14F-4D97-AF65-F5344CB8AC3E}">
+        <p14:creationId xmlns:p14="http://schemas.microsoft.com/office/powerpoint/2010/main" val="3743665738"/>
+      </p:ext>
+    </p:extLst>
+  </p:cSld>
+  <p:clrMapOvr>
+    <a:masterClrMapping/>
+  </p:clrMapOvr>
+</p:sld>
+</file>
+
+<file path=ppt/slides/slide21.xml><?xml version="1.0" encoding="utf-8"?>
+<p:sld xmlns:a="http://schemas.openxmlformats.org/drawingml/2006/main" xmlns:r="http://schemas.openxmlformats.org/officeDocument/2006/relationships" xmlns:p="http://schemas.openxmlformats.org/presentationml/2006/main">
+  <p:cSld>
+    <p:spTree>
+      <p:nvGrpSpPr>
+        <p:cNvPr id="1" name=""/>
+        <p:cNvGrpSpPr/>
+        <p:nvPr/>
+      </p:nvGrpSpPr>
+      <p:grpSpPr>
+        <a:xfrm>
+          <a:off x="0" y="0"/>
+          <a:ext cx="0" cy="0"/>
+          <a:chOff x="0" y="0"/>
+          <a:chExt cx="0" cy="0"/>
+        </a:xfrm>
+      </p:grpSpPr>
+      <p:sp>
+        <p:nvSpPr>
+          <p:cNvPr id="3" name="Retângulo Arredondado 2"/>
+          <p:cNvSpPr/>
+          <p:nvPr/>
+        </p:nvSpPr>
+        <p:spPr>
+          <a:xfrm>
+            <a:off x="1189608" y="705853"/>
+            <a:ext cx="9445841" cy="593558"/>
+          </a:xfrm>
+          <a:prstGeom prst="roundRect">
+            <a:avLst/>
+          </a:prstGeom>
+        </p:spPr>
+        <p:style>
+          <a:lnRef idx="2">
+            <a:schemeClr val="dk1">
+              <a:shade val="50000"/>
+            </a:schemeClr>
+          </a:lnRef>
+          <a:fillRef idx="1">
+            <a:schemeClr val="dk1"/>
+          </a:fillRef>
+          <a:effectRef idx="0">
+            <a:schemeClr val="dk1"/>
+          </a:effectRef>
+          <a:fontRef idx="minor">
+            <a:schemeClr val="lt1"/>
+          </a:fontRef>
+        </p:style>
+        <p:txBody>
+          <a:bodyPr rtlCol="0" anchor="ctr"/>
+          <a:lstStyle/>
+          <a:p>
+            <a:pPr algn="ctr"/>
+            <a:endParaRPr lang="pt-BR"/>
+          </a:p>
+        </p:txBody>
+      </p:sp>
+      <p:sp>
+        <p:nvSpPr>
+          <p:cNvPr id="5" name="Retângulo 4"/>
+          <p:cNvSpPr/>
+          <p:nvPr/>
+        </p:nvSpPr>
+        <p:spPr>
+          <a:xfrm>
+            <a:off x="1267324" y="1299410"/>
+            <a:ext cx="9272337" cy="5301665"/>
+          </a:xfrm>
+          <a:prstGeom prst="rect">
+            <a:avLst/>
+          </a:prstGeom>
+          <a:noFill/>
+          <a:ln>
+            <a:solidFill>
+              <a:schemeClr val="tx1"/>
+            </a:solidFill>
+          </a:ln>
+        </p:spPr>
+        <p:style>
+          <a:lnRef idx="2">
+            <a:schemeClr val="accent1">
+              <a:shade val="50000"/>
+            </a:schemeClr>
+          </a:lnRef>
+          <a:fillRef idx="1">
+            <a:schemeClr val="accent1"/>
+          </a:fillRef>
+          <a:effectRef idx="0">
+            <a:schemeClr val="accent1"/>
+          </a:effectRef>
+          <a:fontRef idx="minor">
+            <a:schemeClr val="lt1"/>
+          </a:fontRef>
+        </p:style>
+        <p:txBody>
+          <a:bodyPr rtlCol="0" anchor="ctr"/>
+          <a:lstStyle/>
+          <a:p>
+            <a:pPr algn="ctr"/>
+            <a:endParaRPr lang="pt-BR"/>
+          </a:p>
+        </p:txBody>
+      </p:sp>
+      <p:sp>
+        <p:nvSpPr>
+          <p:cNvPr id="6" name="CaixaDeTexto 5"/>
+          <p:cNvSpPr txBox="1"/>
+          <p:nvPr/>
+        </p:nvSpPr>
+        <p:spPr>
+          <a:xfrm>
+            <a:off x="1395660" y="1495732"/>
+            <a:ext cx="9144001" cy="1477328"/>
+          </a:xfrm>
+          <a:prstGeom prst="rect">
+            <a:avLst/>
+          </a:prstGeom>
+          <a:noFill/>
+        </p:spPr>
+        <p:txBody>
+          <a:bodyPr wrap="square" rtlCol="0">
+            <a:spAutoFit/>
+          </a:bodyPr>
+          <a:lstStyle/>
+          <a:p>
+            <a:r>
+              <a:rPr lang="pt-BR" b="1" dirty="0" smtClean="0"/>
+              <a:t>RN05</a:t>
+            </a:r>
+            <a:r>
+              <a:rPr lang="pt-BR" dirty="0" smtClean="0"/>
+              <a:t>: </a:t>
+            </a:r>
+            <a:r>
+              <a:rPr lang="pt-BR" dirty="0"/>
+              <a:t>Tela Requisição &gt; Motivo</a:t>
+            </a:r>
+          </a:p>
+          <a:p>
+            <a:pPr lvl="0"/>
+            <a:r>
+              <a:rPr lang="pt-BR" b="1" dirty="0" smtClean="0"/>
+              <a:t>CT</a:t>
+            </a:r>
+            <a:r>
+              <a:rPr lang="pt-BR" dirty="0" smtClean="0"/>
+              <a:t>: </a:t>
+            </a:r>
+            <a:r>
+              <a:rPr lang="pt-BR" dirty="0" smtClean="0"/>
+              <a:t>Ao </a:t>
+            </a:r>
+            <a:r>
+              <a:rPr lang="pt-BR" dirty="0"/>
+              <a:t>alterar os dados de uma categoria do </a:t>
+            </a:r>
+            <a:r>
+              <a:rPr lang="pt-BR" dirty="0" smtClean="0"/>
+              <a:t>motivo, </a:t>
+            </a:r>
+            <a:r>
+              <a:rPr lang="pt-BR" dirty="0"/>
+              <a:t>o campo motivo deve </a:t>
+            </a:r>
+            <a:r>
+              <a:rPr lang="pt-BR" dirty="0" smtClean="0"/>
+              <a:t>ser alterado e exibir  os </a:t>
+            </a:r>
+            <a:r>
+              <a:rPr lang="pt-BR" dirty="0"/>
+              <a:t>motivos da categoria </a:t>
+            </a:r>
+            <a:r>
+              <a:rPr lang="pt-BR" dirty="0" smtClean="0"/>
+              <a:t>que foi informada, se o campo da categoria não for preenchido, o campo motivo deve ficar desabilitado e com a cor de  fundo cinza;</a:t>
+            </a:r>
+            <a:endParaRPr lang="pt-BR" dirty="0" smtClean="0"/>
+          </a:p>
+          <a:p>
+            <a:r>
+              <a:rPr lang="pt-BR" b="1" dirty="0" err="1" smtClean="0"/>
+              <a:t>Pré</a:t>
+            </a:r>
+            <a:r>
+              <a:rPr lang="pt-BR" b="1" dirty="0" smtClean="0"/>
+              <a:t>- condição</a:t>
+            </a:r>
+            <a:r>
+              <a:rPr lang="pt-BR" dirty="0" smtClean="0"/>
+              <a:t>: Tela do almoxarifado deve estar aberta</a:t>
+            </a:r>
+            <a:endParaRPr lang="pt-BR" sz="2000" dirty="0"/>
+          </a:p>
+        </p:txBody>
+      </p:sp>
+      <p:graphicFrame>
+        <p:nvGraphicFramePr>
+          <p:cNvPr id="7" name="Tabela 6"/>
+          <p:cNvGraphicFramePr>
+            <a:graphicFrameLocks noGrp="1"/>
+          </p:cNvGraphicFramePr>
+          <p:nvPr>
+            <p:extLst>
+              <p:ext uri="{D42A27DB-BD31-4B8C-83A1-F6EECF244321}">
+                <p14:modId xmlns:p14="http://schemas.microsoft.com/office/powerpoint/2010/main" val="2616128368"/>
+              </p:ext>
+            </p:extLst>
+          </p:nvPr>
+        </p:nvGraphicFramePr>
+        <p:xfrm>
+          <a:off x="1489038" y="3169381"/>
+          <a:ext cx="8637974" cy="1188720"/>
+        </p:xfrm>
+        <a:graphic>
+          <a:graphicData uri="http://schemas.openxmlformats.org/drawingml/2006/table">
+            <a:tbl>
+              <a:tblPr firstRow="1" bandRow="1">
+                <a:tableStyleId>{073A0DAA-6AF3-43AB-8588-CEC1D06C72B9}</a:tableStyleId>
+              </a:tblPr>
+              <a:tblGrid>
+                <a:gridCol w="4318987">
+                  <a:extLst>
+                    <a:ext uri="{9D8B030D-6E8A-4147-A177-3AD203B41FA5}">
+                      <a16:colId xmlns:a16="http://schemas.microsoft.com/office/drawing/2014/main" val="1568086812"/>
+                    </a:ext>
+                  </a:extLst>
+                </a:gridCol>
+                <a:gridCol w="4318987">
+                  <a:extLst>
+                    <a:ext uri="{9D8B030D-6E8A-4147-A177-3AD203B41FA5}">
+                      <a16:colId xmlns:a16="http://schemas.microsoft.com/office/drawing/2014/main" val="2953003252"/>
+                    </a:ext>
+                  </a:extLst>
+                </a:gridCol>
+              </a:tblGrid>
+              <a:tr h="278720">
+                <a:tc>
+                  <a:txBody>
+                    <a:bodyPr/>
+                    <a:lstStyle/>
+                    <a:p>
+                      <a:r>
+                        <a:rPr lang="pt-BR" dirty="0" smtClean="0"/>
+                        <a:t>Ação</a:t>
+                      </a:r>
+                      <a:r>
+                        <a:rPr lang="pt-BR" baseline="0" dirty="0" smtClean="0"/>
+                        <a:t> </a:t>
+                      </a:r>
+                      <a:endParaRPr lang="pt-BR" dirty="0"/>
+                    </a:p>
+                  </a:txBody>
+                  <a:tcPr/>
+                </a:tc>
+                <a:tc>
+                  <a:txBody>
+                    <a:bodyPr/>
+                    <a:lstStyle/>
+                    <a:p>
+                      <a:r>
+                        <a:rPr lang="pt-BR" dirty="0" smtClean="0"/>
+                        <a:t>Resultado</a:t>
+                      </a:r>
+                      <a:r>
+                        <a:rPr lang="pt-BR" baseline="0" dirty="0" smtClean="0"/>
+                        <a:t> esperado</a:t>
+                      </a:r>
+                      <a:endParaRPr lang="pt-BR" dirty="0"/>
+                    </a:p>
+                  </a:txBody>
+                  <a:tcPr/>
+                </a:tc>
+                <a:extLst>
+                  <a:ext uri="{0D108BD9-81ED-4DB2-BD59-A6C34878D82A}">
+                    <a16:rowId xmlns:a16="http://schemas.microsoft.com/office/drawing/2014/main" val="2950044456"/>
+                  </a:ext>
+                </a:extLst>
+              </a:tr>
+              <a:tr h="699562">
+                <a:tc>
+                  <a:txBody>
+                    <a:bodyPr/>
+                    <a:lstStyle/>
+                    <a:p>
+                      <a:r>
+                        <a:rPr lang="pt-BR" sz="1600" dirty="0" smtClean="0"/>
+                        <a:t>1 - Clicar no</a:t>
+                      </a:r>
+                      <a:r>
+                        <a:rPr lang="pt-BR" sz="1600" baseline="0" dirty="0" smtClean="0"/>
+                        <a:t> </a:t>
+                      </a:r>
+                      <a:r>
+                        <a:rPr lang="pt-BR" sz="1600" dirty="0" smtClean="0"/>
+                        <a:t>campo</a:t>
+                      </a:r>
+                      <a:r>
+                        <a:rPr lang="pt-BR" sz="1600" baseline="0" dirty="0" smtClean="0"/>
+                        <a:t> </a:t>
+                      </a:r>
+                      <a:r>
+                        <a:rPr lang="pt-BR" sz="1600" baseline="0" dirty="0" smtClean="0"/>
+                        <a:t>:“Categoria Motivo</a:t>
+                      </a:r>
+                      <a:r>
+                        <a:rPr lang="pt-BR" sz="1600" baseline="0" dirty="0" smtClean="0"/>
+                        <a:t>”</a:t>
+                      </a:r>
+                      <a:endParaRPr lang="pt-BR" sz="1600" dirty="0"/>
+                    </a:p>
+                  </a:txBody>
+                  <a:tcPr/>
+                </a:tc>
+                <a:tc>
+                  <a:txBody>
+                    <a:bodyPr/>
+                    <a:lstStyle/>
+                    <a:p>
+                      <a:pPr marL="0" marR="0" indent="0" algn="l" defTabSz="914400" rtl="0" eaLnBrk="1" fontAlgn="auto" latinLnBrk="0" hangingPunct="1">
+                        <a:lnSpc>
+                          <a:spcPct val="100000"/>
+                        </a:lnSpc>
+                        <a:spcBef>
+                          <a:spcPts val="0"/>
+                        </a:spcBef>
+                        <a:spcAft>
+                          <a:spcPts val="0"/>
+                        </a:spcAft>
+                        <a:buClrTx/>
+                        <a:buSzTx/>
+                        <a:buFontTx/>
+                        <a:buNone/>
+                        <a:tabLst/>
+                        <a:defRPr/>
+                      </a:pPr>
+                      <a:r>
+                        <a:rPr lang="pt-BR" sz="1600" dirty="0" smtClean="0"/>
+                        <a:t>Os</a:t>
+                      </a:r>
+                      <a:r>
+                        <a:rPr lang="pt-BR" sz="1600" baseline="0" dirty="0" smtClean="0"/>
+                        <a:t> dados devem automaticamente </a:t>
+                      </a:r>
+                      <a:r>
+                        <a:rPr lang="pt-BR" sz="1600" baseline="0" dirty="0" smtClean="0"/>
+                        <a:t>preencher o campo :”Motivo”  a partir dos motivos da categoria informada</a:t>
+                      </a:r>
+                      <a:endParaRPr lang="pt-BR" sz="1600" dirty="0"/>
+                    </a:p>
+                  </a:txBody>
+                  <a:tcPr/>
+                </a:tc>
+                <a:extLst>
+                  <a:ext uri="{0D108BD9-81ED-4DB2-BD59-A6C34878D82A}">
+                    <a16:rowId xmlns:a16="http://schemas.microsoft.com/office/drawing/2014/main" val="1126438125"/>
+                  </a:ext>
+                </a:extLst>
+              </a:tr>
+            </a:tbl>
+          </a:graphicData>
+        </a:graphic>
+      </p:graphicFrame>
+    </p:spTree>
+    <p:extLst>
+      <p:ext uri="{BB962C8B-B14F-4D97-AF65-F5344CB8AC3E}">
+        <p14:creationId xmlns:p14="http://schemas.microsoft.com/office/powerpoint/2010/main" val="2582023558"/>
       </p:ext>
     </p:extLst>
   </p:cSld>

</xml_diff>

<commit_message>
Tdd Regra de Negócio 6 e 7
</commit_message>
<xml_diff>
--- a/RegrasNegocio/RN_Requisitos.pptx
+++ b/RegrasNegocio/RN_Requisitos.pptx
@@ -282,7 +282,7 @@
           <a:p>
             <a:fld id="{0A1764AE-7598-4101-9D63-6EC8D69CE664}" type="datetimeFigureOut">
               <a:rPr lang="pt-BR" smtClean="0"/>
-              <a:t>29/01/2024</a:t>
+              <a:t>31/01/2024</a:t>
             </a:fld>
             <a:endParaRPr lang="pt-BR"/>
           </a:p>
@@ -480,7 +480,7 @@
           <a:p>
             <a:fld id="{0A1764AE-7598-4101-9D63-6EC8D69CE664}" type="datetimeFigureOut">
               <a:rPr lang="pt-BR" smtClean="0"/>
-              <a:t>29/01/2024</a:t>
+              <a:t>31/01/2024</a:t>
             </a:fld>
             <a:endParaRPr lang="pt-BR"/>
           </a:p>
@@ -688,7 +688,7 @@
           <a:p>
             <a:fld id="{0A1764AE-7598-4101-9D63-6EC8D69CE664}" type="datetimeFigureOut">
               <a:rPr lang="pt-BR" smtClean="0"/>
-              <a:t>29/01/2024</a:t>
+              <a:t>31/01/2024</a:t>
             </a:fld>
             <a:endParaRPr lang="pt-BR"/>
           </a:p>
@@ -886,7 +886,7 @@
           <a:p>
             <a:fld id="{0A1764AE-7598-4101-9D63-6EC8D69CE664}" type="datetimeFigureOut">
               <a:rPr lang="pt-BR" smtClean="0"/>
-              <a:t>29/01/2024</a:t>
+              <a:t>31/01/2024</a:t>
             </a:fld>
             <a:endParaRPr lang="pt-BR"/>
           </a:p>
@@ -1161,7 +1161,7 @@
           <a:p>
             <a:fld id="{0A1764AE-7598-4101-9D63-6EC8D69CE664}" type="datetimeFigureOut">
               <a:rPr lang="pt-BR" smtClean="0"/>
-              <a:t>29/01/2024</a:t>
+              <a:t>31/01/2024</a:t>
             </a:fld>
             <a:endParaRPr lang="pt-BR"/>
           </a:p>
@@ -1426,7 +1426,7 @@
           <a:p>
             <a:fld id="{0A1764AE-7598-4101-9D63-6EC8D69CE664}" type="datetimeFigureOut">
               <a:rPr lang="pt-BR" smtClean="0"/>
-              <a:t>29/01/2024</a:t>
+              <a:t>31/01/2024</a:t>
             </a:fld>
             <a:endParaRPr lang="pt-BR"/>
           </a:p>
@@ -1838,7 +1838,7 @@
           <a:p>
             <a:fld id="{0A1764AE-7598-4101-9D63-6EC8D69CE664}" type="datetimeFigureOut">
               <a:rPr lang="pt-BR" smtClean="0"/>
-              <a:t>29/01/2024</a:t>
+              <a:t>31/01/2024</a:t>
             </a:fld>
             <a:endParaRPr lang="pt-BR"/>
           </a:p>
@@ -1979,7 +1979,7 @@
           <a:p>
             <a:fld id="{0A1764AE-7598-4101-9D63-6EC8D69CE664}" type="datetimeFigureOut">
               <a:rPr lang="pt-BR" smtClean="0"/>
-              <a:t>29/01/2024</a:t>
+              <a:t>31/01/2024</a:t>
             </a:fld>
             <a:endParaRPr lang="pt-BR"/>
           </a:p>
@@ -2092,7 +2092,7 @@
           <a:p>
             <a:fld id="{0A1764AE-7598-4101-9D63-6EC8D69CE664}" type="datetimeFigureOut">
               <a:rPr lang="pt-BR" smtClean="0"/>
-              <a:t>29/01/2024</a:t>
+              <a:t>31/01/2024</a:t>
             </a:fld>
             <a:endParaRPr lang="pt-BR"/>
           </a:p>
@@ -2403,7 +2403,7 @@
           <a:p>
             <a:fld id="{0A1764AE-7598-4101-9D63-6EC8D69CE664}" type="datetimeFigureOut">
               <a:rPr lang="pt-BR" smtClean="0"/>
-              <a:t>29/01/2024</a:t>
+              <a:t>31/01/2024</a:t>
             </a:fld>
             <a:endParaRPr lang="pt-BR"/>
           </a:p>
@@ -2691,7 +2691,7 @@
           <a:p>
             <a:fld id="{0A1764AE-7598-4101-9D63-6EC8D69CE664}" type="datetimeFigureOut">
               <a:rPr lang="pt-BR" smtClean="0"/>
-              <a:t>29/01/2024</a:t>
+              <a:t>31/01/2024</a:t>
             </a:fld>
             <a:endParaRPr lang="pt-BR"/>
           </a:p>
@@ -2932,7 +2932,7 @@
           <a:p>
             <a:fld id="{0A1764AE-7598-4101-9D63-6EC8D69CE664}" type="datetimeFigureOut">
               <a:rPr lang="pt-BR" smtClean="0"/>
-              <a:t>29/01/2024</a:t>
+              <a:t>31/01/2024</a:t>
             </a:fld>
             <a:endParaRPr lang="pt-BR"/>
           </a:p>
@@ -3461,11 +3461,11 @@
           <a:lstStyle/>
           <a:p>
             <a:r>
-              <a:rPr lang="pt-BR" sz="3200" dirty="0" smtClean="0"/>
+              <a:rPr lang="pt-BR" sz="3200" dirty="0"/>
               <a:t>Link </a:t>
             </a:r>
             <a:r>
-              <a:rPr lang="pt-BR" sz="3200" dirty="0" err="1" smtClean="0"/>
+              <a:rPr lang="pt-BR" sz="3200" dirty="0" err="1"/>
               <a:t>Api</a:t>
             </a:r>
             <a:r>
@@ -3614,63 +3614,42 @@
           <a:lstStyle/>
           <a:p>
             <a:r>
-              <a:rPr lang="pt-BR" b="1" dirty="0" smtClean="0"/>
+              <a:rPr lang="pt-BR" b="1" dirty="0"/>
               <a:t>RN01</a:t>
             </a:r>
             <a:r>
-              <a:rPr lang="pt-BR" dirty="0" smtClean="0"/>
-              <a:t>: Tela </a:t>
-            </a:r>
-            <a:r>
               <a:rPr lang="pt-BR" dirty="0"/>
-              <a:t>Requisição &gt; Campos</a:t>
-            </a:r>
-            <a:endParaRPr lang="pt-BR" dirty="0" smtClean="0"/>
-          </a:p>
-          <a:p>
-            <a:r>
-              <a:rPr lang="pt-BR" b="1" dirty="0" smtClean="0"/>
+              <a:t>: Tela Requisição &gt; Campos</a:t>
+            </a:r>
+          </a:p>
+          <a:p>
+            <a:r>
+              <a:rPr lang="pt-BR" b="1" dirty="0"/>
               <a:t>CT</a:t>
             </a:r>
             <a:r>
-              <a:rPr lang="pt-BR" dirty="0" smtClean="0"/>
+              <a:rPr lang="pt-BR" dirty="0"/>
               <a:t>: Validar a obrigatoriedade de alguns campos (com exceção do campo: Nome Funcionário)</a:t>
             </a:r>
           </a:p>
           <a:p>
             <a:pPr lvl="0"/>
             <a:r>
-              <a:rPr lang="pt-BR" dirty="0" smtClean="0"/>
-              <a:t>Resultado esperado: </a:t>
-            </a:r>
-            <a:r>
               <a:rPr lang="pt-BR" dirty="0"/>
-              <a:t>T</a:t>
-            </a:r>
-            <a:r>
-              <a:rPr lang="pt-BR" dirty="0" smtClean="0"/>
-              <a:t>odos </a:t>
+              <a:t>Resultado esperado: Todos os campos devem ser preenchidos obrigatoriamente, a única exceção deve ser o campo: ”Nome Funcionário”. Se os campos obrigatórios não forem preenchidos, eles devem ficar com os fundos vermelhos e alertar o usuário da sua obrigatoriedade. Se todos forem preenchidos, deve adicionar normalmente.</a:t>
+            </a:r>
+          </a:p>
+          <a:p>
+            <a:r>
+              <a:rPr lang="pt-BR" b="1" dirty="0" err="1"/>
+              <a:t>Pré</a:t>
+            </a:r>
+            <a:r>
+              <a:rPr lang="pt-BR" b="1" dirty="0"/>
+              <a:t>- condição</a:t>
             </a:r>
             <a:r>
               <a:rPr lang="pt-BR" dirty="0"/>
-              <a:t>os campos </a:t>
-            </a:r>
-            <a:r>
-              <a:rPr lang="pt-BR" dirty="0" smtClean="0"/>
-              <a:t>devem ser preenchidos obrigatoriamente, a única exceção deve ser o campo: ”Nome Funcionário”. Se os campos obrigatórios não forem preenchidos, eles devem ficar com os fundos vermelhos e alertar o usuário da sua obrigatoriedade. Se todos forem preenchidos, deve adicionar normalmente.</a:t>
-            </a:r>
-          </a:p>
-          <a:p>
-            <a:r>
-              <a:rPr lang="pt-BR" b="1" dirty="0" err="1" smtClean="0"/>
-              <a:t>Pré</a:t>
-            </a:r>
-            <a:r>
-              <a:rPr lang="pt-BR" b="1" dirty="0" smtClean="0"/>
-              <a:t>- condição</a:t>
-            </a:r>
-            <a:r>
-              <a:rPr lang="pt-BR" dirty="0" smtClean="0"/>
               <a:t>: Tela do almoxarifado deve estar aberta.</a:t>
             </a:r>
           </a:p>
@@ -3726,11 +3705,11 @@
                     <a:lstStyle/>
                     <a:p>
                       <a:r>
-                        <a:rPr lang="pt-BR" dirty="0" smtClean="0"/>
+                        <a:rPr lang="pt-BR" dirty="0"/>
                         <a:t>Ação</a:t>
                       </a:r>
                       <a:r>
-                        <a:rPr lang="pt-BR" baseline="0" dirty="0" smtClean="0"/>
+                        <a:rPr lang="pt-BR" baseline="0" dirty="0"/>
                         <a:t> </a:t>
                       </a:r>
                       <a:endParaRPr lang="pt-BR" dirty="0"/>
@@ -3744,11 +3723,11 @@
                     <a:lstStyle/>
                     <a:p>
                       <a:r>
-                        <a:rPr lang="pt-BR" dirty="0" smtClean="0"/>
+                        <a:rPr lang="pt-BR" dirty="0"/>
                         <a:t>Resultado</a:t>
                       </a:r>
                       <a:r>
-                        <a:rPr lang="pt-BR" baseline="0" dirty="0" smtClean="0"/>
+                        <a:rPr lang="pt-BR" baseline="0" dirty="0"/>
                         <a:t> esperado</a:t>
                       </a:r>
                       <a:endParaRPr lang="pt-BR" dirty="0"/>
@@ -3786,7 +3765,7 @@
                         <a:defRPr/>
                       </a:pPr>
                       <a:r>
-                        <a:rPr lang="pt-BR" sz="1600" dirty="0" smtClean="0"/>
+                        <a:rPr lang="pt-BR" sz="1600" dirty="0"/>
                         <a:t>1 - Clicar nos campos do almoxarifado</a:t>
                       </a:r>
                     </a:p>
@@ -3819,7 +3798,7 @@
                         <a:defRPr/>
                       </a:pPr>
                       <a:r>
-                        <a:rPr lang="pt-BR" sz="1600" dirty="0" smtClean="0"/>
+                        <a:rPr lang="pt-BR" sz="1600" dirty="0"/>
                         <a:t>O campo deve ficar disponível para o preenchimento </a:t>
                       </a:r>
                     </a:p>
@@ -3839,25 +3818,24 @@
                     <a:lstStyle/>
                     <a:p>
                       <a:r>
-                        <a:rPr lang="pt-BR" sz="1600" dirty="0" smtClean="0"/>
+                        <a:rPr lang="pt-BR" sz="1600" dirty="0"/>
                         <a:t>2 - Preenche-los com as informações correspondentes </a:t>
                       </a:r>
-                      <a:endParaRPr lang="pt-BR" sz="1600" dirty="0"/>
-                    </a:p>
-                  </a:txBody>
-                  <a:tcPr/>
-                </a:tc>
-                <a:tc>
-                  <a:txBody>
-                    <a:bodyPr/>
-                    <a:lstStyle/>
-                    <a:p>
-                      <a:r>
-                        <a:rPr lang="pt-BR" sz="1600" dirty="0" smtClean="0"/>
+                    </a:p>
+                  </a:txBody>
+                  <a:tcPr/>
+                </a:tc>
+                <a:tc>
+                  <a:txBody>
+                    <a:bodyPr/>
+                    <a:lstStyle/>
+                    <a:p>
+                      <a:r>
+                        <a:rPr lang="pt-BR" sz="1600" dirty="0"/>
                         <a:t>Os</a:t>
                       </a:r>
                       <a:r>
-                        <a:rPr lang="pt-BR" sz="1600" baseline="0" dirty="0" smtClean="0"/>
+                        <a:rPr lang="pt-BR" sz="1600" baseline="0" dirty="0"/>
                         <a:t> campos preenchidos </a:t>
                       </a:r>
                       <a:endParaRPr lang="pt-BR" sz="1600" dirty="0"/>
@@ -3878,24 +3856,22 @@
                     <a:lstStyle/>
                     <a:p>
                       <a:r>
-                        <a:rPr lang="pt-BR" sz="1600" dirty="0" smtClean="0"/>
+                        <a:rPr lang="pt-BR" sz="1600" dirty="0"/>
                         <a:t>3 - Clicar em adicionar após preencher os campos obrigatórios </a:t>
                       </a:r>
-                      <a:endParaRPr lang="pt-BR" sz="1600" dirty="0"/>
-                    </a:p>
-                  </a:txBody>
-                  <a:tcPr/>
-                </a:tc>
-                <a:tc>
-                  <a:txBody>
-                    <a:bodyPr/>
-                    <a:lstStyle/>
-                    <a:p>
-                      <a:r>
-                        <a:rPr lang="pt-BR" sz="1600" dirty="0" smtClean="0"/>
+                    </a:p>
+                  </a:txBody>
+                  <a:tcPr/>
+                </a:tc>
+                <a:tc>
+                  <a:txBody>
+                    <a:bodyPr/>
+                    <a:lstStyle/>
+                    <a:p>
+                      <a:r>
+                        <a:rPr lang="pt-BR" sz="1600" dirty="0"/>
                         <a:t>As informações devem ser adicionadas sem problemas</a:t>
                       </a:r>
-                      <a:endParaRPr lang="pt-BR" sz="1600" dirty="0"/>
                     </a:p>
                   </a:txBody>
                   <a:tcPr/>
@@ -4049,43 +4025,35 @@
           <a:lstStyle/>
           <a:p>
             <a:r>
-              <a:rPr lang="pt-BR" b="1" dirty="0" smtClean="0"/>
+              <a:rPr lang="pt-BR" b="1" dirty="0"/>
               <a:t>RN02</a:t>
             </a:r>
             <a:r>
-              <a:rPr lang="pt-BR" dirty="0" smtClean="0"/>
-              <a:t>: </a:t>
-            </a:r>
-            <a:r>
               <a:rPr lang="pt-BR" dirty="0"/>
-              <a:t>Tela Requisição &gt; </a:t>
-            </a:r>
-            <a:r>
-              <a:rPr lang="pt-BR" dirty="0" smtClean="0"/>
-              <a:t>Campos</a:t>
-            </a:r>
-          </a:p>
-          <a:p>
-            <a:r>
-              <a:rPr lang="pt-BR" b="1" dirty="0" smtClean="0"/>
+              <a:t>: Tela Requisição &gt; Campos</a:t>
+            </a:r>
+          </a:p>
+          <a:p>
+            <a:r>
+              <a:rPr lang="pt-BR" b="1" dirty="0"/>
               <a:t>CT</a:t>
             </a:r>
             <a:r>
-              <a:rPr lang="pt-BR" dirty="0" smtClean="0"/>
+              <a:rPr lang="pt-BR" dirty="0"/>
               <a:t>: Ao usuário clicar nos campos, ele devem ficar verdes </a:t>
             </a:r>
           </a:p>
           <a:p>
             <a:r>
-              <a:rPr lang="pt-BR" b="1" dirty="0" err="1" smtClean="0"/>
+              <a:rPr lang="pt-BR" b="1" dirty="0" err="1"/>
               <a:t>Pré</a:t>
             </a:r>
             <a:r>
-              <a:rPr lang="pt-BR" b="1" dirty="0" smtClean="0"/>
+              <a:rPr lang="pt-BR" b="1" dirty="0"/>
               <a:t>- condição</a:t>
             </a:r>
             <a:r>
-              <a:rPr lang="pt-BR" dirty="0" smtClean="0"/>
+              <a:rPr lang="pt-BR" dirty="0"/>
               <a:t>: Tela do almoxarifado deve estar aberta, e os campos devem ser clicados</a:t>
             </a:r>
           </a:p>
@@ -4141,11 +4109,11 @@
                     <a:lstStyle/>
                     <a:p>
                       <a:r>
-                        <a:rPr lang="pt-BR" dirty="0" smtClean="0"/>
+                        <a:rPr lang="pt-BR" dirty="0"/>
                         <a:t>Ação</a:t>
                       </a:r>
                       <a:r>
-                        <a:rPr lang="pt-BR" baseline="0" dirty="0" smtClean="0"/>
+                        <a:rPr lang="pt-BR" baseline="0" dirty="0"/>
                         <a:t> </a:t>
                       </a:r>
                       <a:endParaRPr lang="pt-BR" dirty="0"/>
@@ -4159,11 +4127,11 @@
                     <a:lstStyle/>
                     <a:p>
                       <a:r>
-                        <a:rPr lang="pt-BR" dirty="0" smtClean="0"/>
+                        <a:rPr lang="pt-BR" dirty="0"/>
                         <a:t>Resultado</a:t>
                       </a:r>
                       <a:r>
-                        <a:rPr lang="pt-BR" baseline="0" dirty="0" smtClean="0"/>
+                        <a:rPr lang="pt-BR" baseline="0" dirty="0"/>
                         <a:t> esperado</a:t>
                       </a:r>
                       <a:endParaRPr lang="pt-BR" dirty="0"/>
@@ -4184,10 +4152,9 @@
                     <a:lstStyle/>
                     <a:p>
                       <a:r>
-                        <a:rPr lang="pt-BR" sz="1600" dirty="0" smtClean="0"/>
+                        <a:rPr lang="pt-BR" sz="1600" dirty="0"/>
                         <a:t>1 - Clicar nos campos do almoxarifado</a:t>
                       </a:r>
-                      <a:endParaRPr lang="pt-BR" sz="1600" dirty="0"/>
                     </a:p>
                   </a:txBody>
                   <a:tcPr/>
@@ -4215,11 +4182,11 @@
                         <a:defRPr/>
                       </a:pPr>
                       <a:r>
-                        <a:rPr lang="pt-BR" sz="1600" dirty="0" smtClean="0"/>
+                        <a:rPr lang="pt-BR" sz="1600" dirty="0"/>
                         <a:t>O campo deve</a:t>
                       </a:r>
                       <a:r>
-                        <a:rPr lang="pt-BR" sz="1600" baseline="0" dirty="0" smtClean="0"/>
+                        <a:rPr lang="pt-BR" sz="1600" baseline="0" dirty="0"/>
                         <a:t> ficar com o fundo verde</a:t>
                       </a:r>
                       <a:endParaRPr lang="pt-BR" sz="1600" dirty="0"/>
@@ -4376,39 +4343,35 @@
           <a:lstStyle/>
           <a:p>
             <a:r>
-              <a:rPr lang="pt-BR" b="1" dirty="0" smtClean="0"/>
+              <a:rPr lang="pt-BR" b="1" dirty="0"/>
               <a:t>RN03</a:t>
             </a:r>
             <a:r>
-              <a:rPr lang="pt-BR" dirty="0" smtClean="0"/>
-              <a:t>: </a:t>
-            </a:r>
-            <a:r>
               <a:rPr lang="pt-BR" dirty="0"/>
-              <a:t>Tela Requisição &gt; Campos</a:t>
-            </a:r>
-          </a:p>
-          <a:p>
-            <a:r>
-              <a:rPr lang="pt-BR" b="1" dirty="0" smtClean="0"/>
+              <a:t>: Tela Requisição &gt; Campos</a:t>
+            </a:r>
+          </a:p>
+          <a:p>
+            <a:r>
+              <a:rPr lang="pt-BR" b="1" dirty="0"/>
               <a:t>CT</a:t>
             </a:r>
             <a:r>
-              <a:rPr lang="pt-BR" dirty="0" smtClean="0"/>
+              <a:rPr lang="pt-BR" dirty="0"/>
               <a:t>: Os campos :”ID” e “Quantidade” só podem receber valores inteiros;</a:t>
             </a:r>
           </a:p>
           <a:p>
             <a:r>
-              <a:rPr lang="pt-BR" b="1" dirty="0" err="1" smtClean="0"/>
+              <a:rPr lang="pt-BR" b="1" dirty="0" err="1"/>
               <a:t>Pré</a:t>
             </a:r>
             <a:r>
-              <a:rPr lang="pt-BR" b="1" dirty="0" smtClean="0"/>
+              <a:rPr lang="pt-BR" b="1" dirty="0"/>
               <a:t>- condição</a:t>
             </a:r>
             <a:r>
-              <a:rPr lang="pt-BR" dirty="0" smtClean="0"/>
+              <a:rPr lang="pt-BR" dirty="0"/>
               <a:t>: Tela do almoxarifado deve estar aberta</a:t>
             </a:r>
             <a:endParaRPr lang="pt-BR" sz="2000" dirty="0"/>
@@ -4462,11 +4425,11 @@
                     <a:lstStyle/>
                     <a:p>
                       <a:r>
-                        <a:rPr lang="pt-BR" dirty="0" smtClean="0"/>
+                        <a:rPr lang="pt-BR" dirty="0"/>
                         <a:t>Ação</a:t>
                       </a:r>
                       <a:r>
-                        <a:rPr lang="pt-BR" baseline="0" dirty="0" smtClean="0"/>
+                        <a:rPr lang="pt-BR" baseline="0" dirty="0"/>
                         <a:t> </a:t>
                       </a:r>
                       <a:endParaRPr lang="pt-BR" dirty="0"/>
@@ -4480,11 +4443,11 @@
                     <a:lstStyle/>
                     <a:p>
                       <a:r>
-                        <a:rPr lang="pt-BR" dirty="0" smtClean="0"/>
+                        <a:rPr lang="pt-BR" dirty="0"/>
                         <a:t>Resultado</a:t>
                       </a:r>
                       <a:r>
-                        <a:rPr lang="pt-BR" baseline="0" dirty="0" smtClean="0"/>
+                        <a:rPr lang="pt-BR" baseline="0" dirty="0"/>
                         <a:t> esperado</a:t>
                       </a:r>
                       <a:endParaRPr lang="pt-BR" dirty="0"/>
@@ -4505,19 +4468,19 @@
                     <a:lstStyle/>
                     <a:p>
                       <a:r>
-                        <a:rPr lang="pt-BR" sz="1600" dirty="0" smtClean="0"/>
+                        <a:rPr lang="pt-BR" sz="1600" dirty="0"/>
                         <a:t>1 - Clicar nos</a:t>
                       </a:r>
                       <a:r>
-                        <a:rPr lang="pt-BR" sz="1600" baseline="0" dirty="0" smtClean="0"/>
+                        <a:rPr lang="pt-BR" sz="1600" baseline="0" dirty="0"/>
                         <a:t> </a:t>
                       </a:r>
                       <a:r>
-                        <a:rPr lang="pt-BR" sz="1600" dirty="0" smtClean="0"/>
+                        <a:rPr lang="pt-BR" sz="1600" dirty="0"/>
                         <a:t>campos</a:t>
                       </a:r>
                       <a:r>
-                        <a:rPr lang="pt-BR" sz="1600" baseline="0" dirty="0" smtClean="0"/>
+                        <a:rPr lang="pt-BR" sz="1600" baseline="0" dirty="0"/>
                         <a:t> ID e Quantidade, e preenche-lo </a:t>
                       </a:r>
                       <a:endParaRPr lang="pt-BR" sz="1600" dirty="0"/>
@@ -4548,11 +4511,11 @@
                         <a:defRPr/>
                       </a:pPr>
                       <a:r>
-                        <a:rPr lang="pt-BR" sz="1600" dirty="0" smtClean="0"/>
+                        <a:rPr lang="pt-BR" sz="1600" dirty="0"/>
                         <a:t>Se for preenchido com valor inteiro</a:t>
                       </a:r>
                       <a:r>
-                        <a:rPr lang="pt-BR" sz="1600" baseline="0" dirty="0" smtClean="0"/>
+                        <a:rPr lang="pt-BR" sz="1600" baseline="0" dirty="0"/>
                         <a:t>, deve ser adicionado sem problemas, caso seja preenchido com algo distinto, fundo deve ficar vermelho e informar o erro </a:t>
                       </a:r>
                       <a:endParaRPr lang="pt-BR" sz="1600" dirty="0"/>
@@ -4573,11 +4536,11 @@
                     <a:lstStyle/>
                     <a:p>
                       <a:r>
-                        <a:rPr lang="pt-BR" sz="1600" dirty="0" smtClean="0"/>
+                        <a:rPr lang="pt-BR" sz="1600" dirty="0"/>
                         <a:t>2 - Clicar em adicionar após preencher os campos da</a:t>
                       </a:r>
                       <a:r>
-                        <a:rPr lang="pt-BR" sz="1600" baseline="0" dirty="0" smtClean="0"/>
+                        <a:rPr lang="pt-BR" sz="1600" baseline="0" dirty="0"/>
                         <a:t> forma correta</a:t>
                       </a:r>
                       <a:endParaRPr lang="pt-BR" sz="1600" dirty="0"/>
@@ -4591,10 +4554,9 @@
                     <a:lstStyle/>
                     <a:p>
                       <a:r>
-                        <a:rPr lang="pt-BR" sz="1600" dirty="0" smtClean="0"/>
+                        <a:rPr lang="pt-BR" sz="1600" dirty="0"/>
                         <a:t>As informações devem ser adicionadas sem problemas</a:t>
                       </a:r>
-                      <a:endParaRPr lang="pt-BR" sz="1600" dirty="0"/>
                     </a:p>
                   </a:txBody>
                   <a:tcPr/>
@@ -4748,48 +4710,36 @@
           <a:lstStyle/>
           <a:p>
             <a:r>
-              <a:rPr lang="pt-BR" b="1" dirty="0" smtClean="0"/>
+              <a:rPr lang="pt-BR" b="1" dirty="0"/>
               <a:t>RN04</a:t>
             </a:r>
             <a:r>
-              <a:rPr lang="pt-BR" dirty="0" smtClean="0"/>
-              <a:t>: </a:t>
-            </a:r>
-            <a:r>
               <a:rPr lang="pt-BR" dirty="0"/>
-              <a:t>Tela Requisição &gt; Categoria Motivo</a:t>
+              <a:t>: Tela Requisição &gt; Categoria Motivo</a:t>
             </a:r>
           </a:p>
           <a:p>
             <a:pPr lvl="0"/>
             <a:r>
-              <a:rPr lang="pt-BR" b="1" dirty="0" smtClean="0"/>
+              <a:rPr lang="pt-BR" b="1" dirty="0"/>
               <a:t>CT</a:t>
             </a:r>
             <a:r>
-              <a:rPr lang="pt-BR" dirty="0" smtClean="0"/>
-              <a:t>: </a:t>
-            </a:r>
-            <a:r>
               <a:rPr lang="pt-BR" dirty="0"/>
-              <a:t>Ao carregar a tela os dados da Categoria Motivo devem ser carregados da API</a:t>
-            </a:r>
-            <a:r>
-              <a:rPr lang="pt-BR" dirty="0" smtClean="0"/>
-              <a:t>.;</a:t>
-            </a:r>
-          </a:p>
-          <a:p>
-            <a:r>
-              <a:rPr lang="pt-BR" b="1" dirty="0" err="1" smtClean="0"/>
+              <a:t>: Ao carregar a tela os dados da Categoria Motivo devem ser carregados da API.;</a:t>
+            </a:r>
+          </a:p>
+          <a:p>
+            <a:r>
+              <a:rPr lang="pt-BR" b="1" dirty="0" err="1"/>
               <a:t>Pré</a:t>
             </a:r>
             <a:r>
-              <a:rPr lang="pt-BR" b="1" dirty="0" smtClean="0"/>
+              <a:rPr lang="pt-BR" b="1" dirty="0"/>
               <a:t>- condição</a:t>
             </a:r>
             <a:r>
-              <a:rPr lang="pt-BR" dirty="0" smtClean="0"/>
+              <a:rPr lang="pt-BR" dirty="0"/>
               <a:t>: Tela do almoxarifado deve estar aberta</a:t>
             </a:r>
             <a:endParaRPr lang="pt-BR" sz="2000" dirty="0"/>
@@ -4843,11 +4793,11 @@
                     <a:lstStyle/>
                     <a:p>
                       <a:r>
-                        <a:rPr lang="pt-BR" dirty="0" smtClean="0"/>
+                        <a:rPr lang="pt-BR" dirty="0"/>
                         <a:t>Ação</a:t>
                       </a:r>
                       <a:r>
-                        <a:rPr lang="pt-BR" baseline="0" dirty="0" smtClean="0"/>
+                        <a:rPr lang="pt-BR" baseline="0" dirty="0"/>
                         <a:t> </a:t>
                       </a:r>
                       <a:endParaRPr lang="pt-BR" dirty="0"/>
@@ -4861,11 +4811,11 @@
                     <a:lstStyle/>
                     <a:p>
                       <a:r>
-                        <a:rPr lang="pt-BR" dirty="0" smtClean="0"/>
+                        <a:rPr lang="pt-BR" dirty="0"/>
                         <a:t>Resultado</a:t>
                       </a:r>
                       <a:r>
-                        <a:rPr lang="pt-BR" baseline="0" dirty="0" smtClean="0"/>
+                        <a:rPr lang="pt-BR" baseline="0" dirty="0"/>
                         <a:t> esperado</a:t>
                       </a:r>
                       <a:endParaRPr lang="pt-BR" dirty="0"/>
@@ -4886,19 +4836,19 @@
                     <a:lstStyle/>
                     <a:p>
                       <a:r>
-                        <a:rPr lang="pt-BR" sz="1600" dirty="0" smtClean="0"/>
+                        <a:rPr lang="pt-BR" sz="1600" dirty="0"/>
                         <a:t>1 - Clicar no</a:t>
                       </a:r>
                       <a:r>
-                        <a:rPr lang="pt-BR" sz="1600" baseline="0" dirty="0" smtClean="0"/>
+                        <a:rPr lang="pt-BR" sz="1600" baseline="0" dirty="0"/>
                         <a:t> </a:t>
                       </a:r>
                       <a:r>
-                        <a:rPr lang="pt-BR" sz="1600" dirty="0" smtClean="0"/>
+                        <a:rPr lang="pt-BR" sz="1600" dirty="0"/>
                         <a:t>campo</a:t>
                       </a:r>
                       <a:r>
-                        <a:rPr lang="pt-BR" sz="1600" baseline="0" dirty="0" smtClean="0"/>
+                        <a:rPr lang="pt-BR" sz="1600" baseline="0" dirty="0"/>
                         <a:t> :“Motivo”</a:t>
                       </a:r>
                       <a:endParaRPr lang="pt-BR" sz="1600" dirty="0"/>
@@ -4929,11 +4879,11 @@
                         <a:defRPr/>
                       </a:pPr>
                       <a:r>
-                        <a:rPr lang="pt-BR" sz="1600" dirty="0" smtClean="0"/>
+                        <a:rPr lang="pt-BR" sz="1600" dirty="0"/>
                         <a:t>Os</a:t>
                       </a:r>
                       <a:r>
-                        <a:rPr lang="pt-BR" sz="1600" baseline="0" dirty="0" smtClean="0"/>
+                        <a:rPr lang="pt-BR" sz="1600" baseline="0" dirty="0"/>
                         <a:t> dados devem automaticamente preencher esse campo com as informações salvas</a:t>
                       </a:r>
                       <a:endParaRPr lang="pt-BR" sz="1600" dirty="0"/>
@@ -5090,64 +5040,36 @@
           <a:lstStyle/>
           <a:p>
             <a:r>
-              <a:rPr lang="pt-BR" b="1" dirty="0" smtClean="0"/>
+              <a:rPr lang="pt-BR" b="1" dirty="0"/>
               <a:t>RN05</a:t>
             </a:r>
             <a:r>
-              <a:rPr lang="pt-BR" dirty="0" smtClean="0"/>
-              <a:t>: </a:t>
-            </a:r>
-            <a:r>
               <a:rPr lang="pt-BR" dirty="0"/>
-              <a:t>Tela Requisição &gt; Motivo</a:t>
+              <a:t>: Tela Requisição &gt; Motivo</a:t>
             </a:r>
           </a:p>
           <a:p>
             <a:pPr lvl="0"/>
             <a:r>
-              <a:rPr lang="pt-BR" b="1" dirty="0" smtClean="0"/>
+              <a:rPr lang="pt-BR" b="1" dirty="0"/>
               <a:t>CT</a:t>
             </a:r>
             <a:r>
-              <a:rPr lang="pt-BR" dirty="0" smtClean="0"/>
-              <a:t>: Ao </a:t>
-            </a:r>
-            <a:r>
               <a:rPr lang="pt-BR" dirty="0"/>
-              <a:t>alterar os dados de uma categoria do </a:t>
-            </a:r>
-            <a:r>
-              <a:rPr lang="pt-BR" dirty="0" smtClean="0"/>
-              <a:t>motivo, </a:t>
+              <a:t>: Ao alterar os dados de uma categoria do motivo, o campo motivo deve ser alterado e exibir  os motivos da categoria que foi informada, se o campo da categoria não for preenchido, o campo motivo deve ficar desabilitado e com a cor de  fundo cinza;</a:t>
+            </a:r>
+          </a:p>
+          <a:p>
+            <a:r>
+              <a:rPr lang="pt-BR" b="1" dirty="0" err="1"/>
+              <a:t>Pré</a:t>
+            </a:r>
+            <a:r>
+              <a:rPr lang="pt-BR" b="1" dirty="0"/>
+              <a:t>- condição</a:t>
             </a:r>
             <a:r>
               <a:rPr lang="pt-BR" dirty="0"/>
-              <a:t>o campo motivo deve </a:t>
-            </a:r>
-            <a:r>
-              <a:rPr lang="pt-BR" dirty="0" smtClean="0"/>
-              <a:t>ser alterado e exibir  os </a:t>
-            </a:r>
-            <a:r>
-              <a:rPr lang="pt-BR" dirty="0"/>
-              <a:t>motivos da categoria </a:t>
-            </a:r>
-            <a:r>
-              <a:rPr lang="pt-BR" dirty="0" smtClean="0"/>
-              <a:t>que foi informada, se o campo da categoria não for preenchido, o campo motivo deve ficar desabilitado e com a cor de  fundo cinza;</a:t>
-            </a:r>
-          </a:p>
-          <a:p>
-            <a:r>
-              <a:rPr lang="pt-BR" b="1" dirty="0" err="1" smtClean="0"/>
-              <a:t>Pré</a:t>
-            </a:r>
-            <a:r>
-              <a:rPr lang="pt-BR" b="1" dirty="0" smtClean="0"/>
-              <a:t>- condição</a:t>
-            </a:r>
-            <a:r>
-              <a:rPr lang="pt-BR" dirty="0" smtClean="0"/>
               <a:t>: Tela do almoxarifado deve estar aberta</a:t>
             </a:r>
             <a:endParaRPr lang="pt-BR" sz="2000" dirty="0"/>
@@ -5201,11 +5123,11 @@
                     <a:lstStyle/>
                     <a:p>
                       <a:r>
-                        <a:rPr lang="pt-BR" dirty="0" smtClean="0"/>
+                        <a:rPr lang="pt-BR" dirty="0"/>
                         <a:t>Ação</a:t>
                       </a:r>
                       <a:r>
-                        <a:rPr lang="pt-BR" baseline="0" dirty="0" smtClean="0"/>
+                        <a:rPr lang="pt-BR" baseline="0" dirty="0"/>
                         <a:t> </a:t>
                       </a:r>
                       <a:endParaRPr lang="pt-BR" dirty="0"/>
@@ -5219,11 +5141,11 @@
                     <a:lstStyle/>
                     <a:p>
                       <a:r>
-                        <a:rPr lang="pt-BR" dirty="0" smtClean="0"/>
+                        <a:rPr lang="pt-BR" dirty="0"/>
                         <a:t>Resultado</a:t>
                       </a:r>
                       <a:r>
-                        <a:rPr lang="pt-BR" baseline="0" dirty="0" smtClean="0"/>
+                        <a:rPr lang="pt-BR" baseline="0" dirty="0"/>
                         <a:t> esperado</a:t>
                       </a:r>
                       <a:endParaRPr lang="pt-BR" dirty="0"/>
@@ -5244,19 +5166,19 @@
                     <a:lstStyle/>
                     <a:p>
                       <a:r>
-                        <a:rPr lang="pt-BR" sz="1600" dirty="0" smtClean="0"/>
+                        <a:rPr lang="pt-BR" sz="1600" dirty="0"/>
                         <a:t>1 - Clicar no</a:t>
                       </a:r>
                       <a:r>
-                        <a:rPr lang="pt-BR" sz="1600" baseline="0" dirty="0" smtClean="0"/>
+                        <a:rPr lang="pt-BR" sz="1600" baseline="0" dirty="0"/>
                         <a:t> </a:t>
                       </a:r>
                       <a:r>
-                        <a:rPr lang="pt-BR" sz="1600" dirty="0" smtClean="0"/>
+                        <a:rPr lang="pt-BR" sz="1600" dirty="0"/>
                         <a:t>campo</a:t>
                       </a:r>
                       <a:r>
-                        <a:rPr lang="pt-BR" sz="1600" baseline="0" dirty="0" smtClean="0"/>
+                        <a:rPr lang="pt-BR" sz="1600" baseline="0" dirty="0"/>
                         <a:t> :“Categoria Motivo”</a:t>
                       </a:r>
                       <a:endParaRPr lang="pt-BR" sz="1600" dirty="0"/>
@@ -5287,11 +5209,11 @@
                         <a:defRPr/>
                       </a:pPr>
                       <a:r>
-                        <a:rPr lang="pt-BR" sz="1600" dirty="0" smtClean="0"/>
+                        <a:rPr lang="pt-BR" sz="1600" dirty="0"/>
                         <a:t>Os</a:t>
                       </a:r>
                       <a:r>
-                        <a:rPr lang="pt-BR" sz="1600" baseline="0" dirty="0" smtClean="0"/>
+                        <a:rPr lang="pt-BR" sz="1600" baseline="0" dirty="0"/>
                         <a:t> dados devem automaticamente preencher o campo :”Motivo”  a partir dos motivos da categoria informada</a:t>
                       </a:r>
                       <a:endParaRPr lang="pt-BR" sz="1600" dirty="0"/>
@@ -5448,7 +5370,7 @@
           <a:lstStyle/>
           <a:p>
             <a:r>
-              <a:rPr lang="pt-BR" b="1" dirty="0" smtClean="0"/>
+              <a:rPr lang="pt-BR" b="1" dirty="0"/>
               <a:t>RN06</a:t>
             </a:r>
             <a:r>
@@ -5458,58 +5380,25 @@
           </a:p>
           <a:p>
             <a:r>
-              <a:rPr lang="pt-BR" b="1" dirty="0" smtClean="0"/>
+              <a:rPr lang="pt-BR" b="1" dirty="0"/>
               <a:t>CT</a:t>
             </a:r>
             <a:r>
-              <a:rPr lang="pt-BR" dirty="0" smtClean="0"/>
-              <a:t>: </a:t>
-            </a:r>
-            <a:r>
               <a:rPr lang="pt-BR" dirty="0"/>
-              <a:t>Ao digitar um </a:t>
-            </a:r>
-            <a:r>
-              <a:rPr lang="pt-BR" dirty="0" smtClean="0"/>
-              <a:t>id </a:t>
+              <a:t>: Ao digitar um id no campo [ID] e esse existe na base de dados ou API o sistema deve exibir a descrição do departamento no campo Departamento. Se ao digitar um código, o mesmo não existir, logo a descrição do campo Departamento deverá está vazia.</a:t>
+            </a:r>
+          </a:p>
+          <a:p>
+            <a:r>
+              <a:rPr lang="pt-BR" b="1" dirty="0" err="1"/>
+              <a:t>Pré</a:t>
+            </a:r>
+            <a:r>
+              <a:rPr lang="pt-BR" b="1" dirty="0"/>
+              <a:t>- condição</a:t>
             </a:r>
             <a:r>
               <a:rPr lang="pt-BR" dirty="0"/>
-              <a:t>no campo [ID] e esse existe na base de </a:t>
-            </a:r>
-            <a:r>
-              <a:rPr lang="pt-BR" dirty="0" smtClean="0"/>
-              <a:t>dados ou API o sistema </a:t>
-            </a:r>
-            <a:r>
-              <a:rPr lang="pt-BR" dirty="0"/>
-              <a:t>deve exibir a descrição do departamento no campo Departamento. Se ao digitar um código, o mesmo não existir, logo a </a:t>
-            </a:r>
-            <a:r>
-              <a:rPr lang="pt-BR" dirty="0"/>
-              <a:t>descrição do campo Departamento </a:t>
-            </a:r>
-            <a:r>
-              <a:rPr lang="pt-BR" dirty="0"/>
-              <a:t>deverá está </a:t>
-            </a:r>
-            <a:r>
-              <a:rPr lang="pt-BR" dirty="0" smtClean="0"/>
-              <a:t>vazia.</a:t>
-            </a:r>
-            <a:endParaRPr lang="pt-BR" dirty="0" smtClean="0"/>
-          </a:p>
-          <a:p>
-            <a:r>
-              <a:rPr lang="pt-BR" b="1" dirty="0" err="1" smtClean="0"/>
-              <a:t>Pré</a:t>
-            </a:r>
-            <a:r>
-              <a:rPr lang="pt-BR" b="1" dirty="0" smtClean="0"/>
-              <a:t>- condição</a:t>
-            </a:r>
-            <a:r>
-              <a:rPr lang="pt-BR" dirty="0" smtClean="0"/>
               <a:t>: Tela do almoxarifado deve estar aberta</a:t>
             </a:r>
             <a:endParaRPr lang="pt-BR" sz="2000" dirty="0"/>
@@ -5563,11 +5452,11 @@
                     <a:lstStyle/>
                     <a:p>
                       <a:r>
-                        <a:rPr lang="pt-BR" dirty="0" smtClean="0"/>
+                        <a:rPr lang="pt-BR" dirty="0"/>
                         <a:t>Ação</a:t>
                       </a:r>
                       <a:r>
-                        <a:rPr lang="pt-BR" baseline="0" dirty="0" smtClean="0"/>
+                        <a:rPr lang="pt-BR" baseline="0" dirty="0"/>
                         <a:t> </a:t>
                       </a:r>
                       <a:endParaRPr lang="pt-BR" dirty="0"/>
@@ -5581,11 +5470,11 @@
                     <a:lstStyle/>
                     <a:p>
                       <a:r>
-                        <a:rPr lang="pt-BR" dirty="0" smtClean="0"/>
+                        <a:rPr lang="pt-BR" dirty="0"/>
                         <a:t>Resultado</a:t>
                       </a:r>
                       <a:r>
-                        <a:rPr lang="pt-BR" baseline="0" dirty="0" smtClean="0"/>
+                        <a:rPr lang="pt-BR" baseline="0" dirty="0"/>
                         <a:t> esperado</a:t>
                       </a:r>
                       <a:endParaRPr lang="pt-BR" dirty="0"/>
@@ -5606,19 +5495,19 @@
                     <a:lstStyle/>
                     <a:p>
                       <a:r>
-                        <a:rPr lang="pt-BR" sz="1600" dirty="0" smtClean="0"/>
+                        <a:rPr lang="pt-BR" sz="1600" dirty="0"/>
                         <a:t>1 - Clicar no</a:t>
                       </a:r>
                       <a:r>
-                        <a:rPr lang="pt-BR" sz="1600" baseline="0" dirty="0" smtClean="0"/>
+                        <a:rPr lang="pt-BR" sz="1600" baseline="0" dirty="0"/>
                         <a:t> </a:t>
                       </a:r>
                       <a:r>
-                        <a:rPr lang="pt-BR" sz="1600" dirty="0" smtClean="0"/>
+                        <a:rPr lang="pt-BR" sz="1600" dirty="0"/>
                         <a:t>campo</a:t>
                       </a:r>
                       <a:r>
-                        <a:rPr lang="pt-BR" sz="1600" baseline="0" dirty="0" smtClean="0"/>
+                        <a:rPr lang="pt-BR" sz="1600" baseline="0" dirty="0"/>
                         <a:t> :“ID”</a:t>
                       </a:r>
                       <a:endParaRPr lang="pt-BR" sz="1600" dirty="0"/>
@@ -5649,11 +5538,11 @@
                         <a:defRPr/>
                       </a:pPr>
                       <a:r>
-                        <a:rPr lang="pt-BR" sz="1600" dirty="0" smtClean="0"/>
+                        <a:rPr lang="pt-BR" sz="1600" dirty="0"/>
                         <a:t>O campo</a:t>
                       </a:r>
                       <a:r>
-                        <a:rPr lang="pt-BR" sz="1600" baseline="0" dirty="0" smtClean="0"/>
+                        <a:rPr lang="pt-BR" sz="1600" baseline="0" dirty="0"/>
                         <a:t> ficar habilitado;</a:t>
                       </a:r>
                       <a:endParaRPr lang="pt-BR" sz="1600" dirty="0"/>
@@ -5674,11 +5563,11 @@
                     <a:lstStyle/>
                     <a:p>
                       <a:r>
-                        <a:rPr lang="pt-BR" sz="1600" dirty="0" smtClean="0"/>
+                        <a:rPr lang="pt-BR" sz="1600" dirty="0"/>
                         <a:t>2 – Informar</a:t>
                       </a:r>
                       <a:r>
-                        <a:rPr lang="pt-BR" sz="1600" baseline="0" dirty="0" smtClean="0"/>
+                        <a:rPr lang="pt-BR" sz="1600" baseline="0" dirty="0"/>
                         <a:t> um id</a:t>
                       </a:r>
                       <a:endParaRPr lang="pt-BR" sz="1600" dirty="0"/>
@@ -5709,11 +5598,11 @@
                         <a:defRPr/>
                       </a:pPr>
                       <a:r>
-                        <a:rPr lang="pt-BR" sz="1600" dirty="0" smtClean="0"/>
+                        <a:rPr lang="pt-BR" sz="1600" dirty="0"/>
                         <a:t>Se o id</a:t>
                       </a:r>
                       <a:r>
-                        <a:rPr lang="pt-BR" sz="1600" baseline="0" dirty="0" smtClean="0"/>
+                        <a:rPr lang="pt-BR" sz="1600" baseline="0" dirty="0"/>
                         <a:t> informado existir na base de dados, o campo Departamento deve ser preenchido automaticamente com a descrição do departamento. Se o id não existir, a descrição deve ficar vazia</a:t>
                       </a:r>
                       <a:endParaRPr lang="pt-BR" sz="1600" dirty="0"/>
@@ -5873,7 +5762,7 @@
               <a:defRPr/>
             </a:pPr>
             <a:r>
-              <a:rPr lang="pt-BR" b="1" dirty="0" smtClean="0"/>
+              <a:rPr lang="pt-BR" b="1" dirty="0"/>
               <a:t>RN07</a:t>
             </a:r>
             <a:r>
@@ -5886,26 +5775,17 @@
             </a:r>
             <a:r>
               <a:rPr lang="pt-BR" dirty="0"/>
-              <a:t>] [Nome </a:t>
-            </a:r>
-            <a:r>
-              <a:rPr lang="pt-BR" dirty="0" smtClean="0"/>
-              <a:t>Funcionário]</a:t>
-            </a:r>
-            <a:endParaRPr lang="pt-BR" dirty="0"/>
-          </a:p>
-          <a:p>
-            <a:r>
-              <a:rPr lang="pt-BR" b="1" dirty="0" smtClean="0"/>
+              <a:t>] [Nome Funcionário]</a:t>
+            </a:r>
+          </a:p>
+          <a:p>
+            <a:r>
+              <a:rPr lang="pt-BR" b="1" dirty="0"/>
               <a:t>CT</a:t>
             </a:r>
             <a:r>
-              <a:rPr lang="pt-BR" dirty="0" smtClean="0"/>
-              <a:t>: </a:t>
-            </a:r>
-            <a:r>
               <a:rPr lang="pt-BR" dirty="0"/>
-              <a:t>Ao digitar um código no campo ID </a:t>
+              <a:t>: Ao digitar um código no campo ID </a:t>
             </a:r>
             <a:r>
               <a:rPr lang="pt-BR" dirty="0" err="1"/>
@@ -5913,48 +5793,20 @@
             </a:r>
             <a:r>
               <a:rPr lang="pt-BR" dirty="0"/>
-              <a:t> e esse existe na base de </a:t>
-            </a:r>
-            <a:r>
-              <a:rPr lang="pt-BR" dirty="0" smtClean="0"/>
-              <a:t>dados o </a:t>
+              <a:t> e esse existe na base de dados o sistema deve exibir o nome do funcionário no campo: Nome Funcionário. Se ao digitar um código, o mesmo não existir, logo o campo deve fica vazio.</a:t>
+            </a:r>
+          </a:p>
+          <a:p>
+            <a:r>
+              <a:rPr lang="pt-BR" b="1" dirty="0" err="1"/>
+              <a:t>Pré</a:t>
+            </a:r>
+            <a:r>
+              <a:rPr lang="pt-BR" b="1" dirty="0"/>
+              <a:t>- condição</a:t>
             </a:r>
             <a:r>
               <a:rPr lang="pt-BR" dirty="0"/>
-              <a:t>sistema deve exibir o nome do funcionário no </a:t>
-            </a:r>
-            <a:r>
-              <a:rPr lang="pt-BR" dirty="0" smtClean="0"/>
-              <a:t>campo: Nome Funcionário. </a:t>
-            </a:r>
-            <a:r>
-              <a:rPr lang="pt-BR" dirty="0"/>
-              <a:t>Se ao digitar um código, o mesmo não existir, logo o campo </a:t>
-            </a:r>
-            <a:r>
-              <a:rPr lang="pt-BR" dirty="0" smtClean="0"/>
-              <a:t>deve fica </a:t>
-            </a:r>
-            <a:r>
-              <a:rPr lang="pt-BR" dirty="0"/>
-              <a:t>vazio</a:t>
-            </a:r>
-            <a:r>
-              <a:rPr lang="pt-BR" dirty="0" smtClean="0"/>
-              <a:t>.</a:t>
-            </a:r>
-          </a:p>
-          <a:p>
-            <a:r>
-              <a:rPr lang="pt-BR" b="1" dirty="0" err="1" smtClean="0"/>
-              <a:t>Pré</a:t>
-            </a:r>
-            <a:r>
-              <a:rPr lang="pt-BR" b="1" dirty="0" smtClean="0"/>
-              <a:t>- condição</a:t>
-            </a:r>
-            <a:r>
-              <a:rPr lang="pt-BR" dirty="0" smtClean="0"/>
               <a:t>: Tela do almoxarifado deve estar aberta</a:t>
             </a:r>
             <a:endParaRPr lang="pt-BR" sz="2000" dirty="0"/>
@@ -6008,11 +5860,11 @@
                     <a:lstStyle/>
                     <a:p>
                       <a:r>
-                        <a:rPr lang="pt-BR" dirty="0" smtClean="0"/>
+                        <a:rPr lang="pt-BR" dirty="0"/>
                         <a:t>Ação</a:t>
                       </a:r>
                       <a:r>
-                        <a:rPr lang="pt-BR" baseline="0" dirty="0" smtClean="0"/>
+                        <a:rPr lang="pt-BR" baseline="0" dirty="0"/>
                         <a:t> </a:t>
                       </a:r>
                       <a:endParaRPr lang="pt-BR" dirty="0"/>
@@ -6026,11 +5878,11 @@
                     <a:lstStyle/>
                     <a:p>
                       <a:r>
-                        <a:rPr lang="pt-BR" dirty="0" smtClean="0"/>
+                        <a:rPr lang="pt-BR" dirty="0"/>
                         <a:t>Resultado</a:t>
                       </a:r>
                       <a:r>
-                        <a:rPr lang="pt-BR" baseline="0" dirty="0" smtClean="0"/>
+                        <a:rPr lang="pt-BR" baseline="0" dirty="0"/>
                         <a:t> esperado</a:t>
                       </a:r>
                       <a:endParaRPr lang="pt-BR" dirty="0"/>
@@ -6051,35 +5903,35 @@
                     <a:lstStyle/>
                     <a:p>
                       <a:r>
-                        <a:rPr lang="pt-BR" sz="1600" dirty="0" smtClean="0"/>
+                        <a:rPr lang="pt-BR" sz="1600" dirty="0"/>
                         <a:t>1 - Clicar no</a:t>
                       </a:r>
                       <a:r>
-                        <a:rPr lang="pt-BR" sz="1600" baseline="0" dirty="0" smtClean="0"/>
+                        <a:rPr lang="pt-BR" sz="1600" baseline="0" dirty="0"/>
                         <a:t> </a:t>
                       </a:r>
                       <a:r>
-                        <a:rPr lang="pt-BR" sz="1600" dirty="0" smtClean="0"/>
+                        <a:rPr lang="pt-BR" sz="1600" dirty="0"/>
                         <a:t>campo</a:t>
                       </a:r>
                       <a:r>
-                        <a:rPr lang="pt-BR" sz="1600" baseline="0" dirty="0" smtClean="0"/>
+                        <a:rPr lang="pt-BR" sz="1600" baseline="0" dirty="0"/>
                         <a:t> :“</a:t>
                       </a:r>
                       <a:r>
-                        <a:rPr lang="pt-BR" sz="1600" dirty="0" smtClean="0"/>
+                        <a:rPr lang="pt-BR" sz="1600" dirty="0"/>
                         <a:t>ID </a:t>
                       </a:r>
                       <a:r>
-                        <a:rPr lang="pt-BR" sz="1600" dirty="0" err="1" smtClean="0"/>
+                        <a:rPr lang="pt-BR" sz="1600" dirty="0" err="1"/>
                         <a:t>Func</a:t>
                       </a:r>
                       <a:r>
-                        <a:rPr lang="pt-BR" sz="1600" dirty="0" smtClean="0"/>
+                        <a:rPr lang="pt-BR" sz="1600" dirty="0"/>
                         <a:t> </a:t>
                       </a:r>
                       <a:r>
-                        <a:rPr lang="pt-BR" sz="1600" baseline="0" dirty="0" smtClean="0"/>
+                        <a:rPr lang="pt-BR" sz="1600" baseline="0" dirty="0"/>
                         <a:t>”</a:t>
                       </a:r>
                       <a:endParaRPr lang="pt-BR" sz="1600" dirty="0"/>
@@ -6110,14 +5962,14 @@
                         <a:defRPr/>
                       </a:pPr>
                       <a:r>
-                        <a:rPr lang="pt-BR" sz="1600" dirty="0" smtClean="0"/>
+                        <a:rPr lang="pt-BR" sz="1600" dirty="0"/>
                         <a:t>O campo</a:t>
                       </a:r>
                       <a:r>
-                        <a:rPr lang="pt-BR" sz="1600" baseline="0" dirty="0" smtClean="0"/>
+                        <a:rPr lang="pt-BR" sz="1600" baseline="0" dirty="0"/>
                         <a:t> ficar habilitado;</a:t>
                       </a:r>
-                      <a:endParaRPr lang="pt-BR" sz="1600" dirty="0" smtClean="0"/>
+                      <a:endParaRPr lang="pt-BR" sz="1600" dirty="0"/>
                     </a:p>
                     <a:p>
                       <a:pPr marL="0" marR="0" indent="0" algn="l" defTabSz="914400" rtl="0" eaLnBrk="1" fontAlgn="auto" latinLnBrk="0" hangingPunct="1">
@@ -6172,14 +6024,14 @@
                         <a:defRPr/>
                       </a:pPr>
                       <a:r>
-                        <a:rPr lang="pt-BR" sz="1600" dirty="0" smtClean="0"/>
+                        <a:rPr lang="pt-BR" sz="1600" dirty="0"/>
                         <a:t>2 – Informar</a:t>
                       </a:r>
                       <a:r>
-                        <a:rPr lang="pt-BR" sz="1600" baseline="0" dirty="0" smtClean="0"/>
+                        <a:rPr lang="pt-BR" sz="1600" baseline="0" dirty="0"/>
                         <a:t> um id</a:t>
                       </a:r>
-                      <a:endParaRPr lang="pt-BR" sz="1600" dirty="0" smtClean="0"/>
+                      <a:endParaRPr lang="pt-BR" sz="1600" dirty="0"/>
                     </a:p>
                     <a:p>
                       <a:endParaRPr lang="pt-BR" sz="1600" dirty="0"/>
@@ -6210,26 +6062,25 @@
                         <a:defRPr/>
                       </a:pPr>
                       <a:r>
-                        <a:rPr lang="pt-BR" sz="1600" dirty="0" smtClean="0"/>
+                        <a:rPr lang="pt-BR" sz="1600" dirty="0"/>
                         <a:t>Se</a:t>
                       </a:r>
                       <a:r>
-                        <a:rPr lang="pt-BR" sz="1600" baseline="0" dirty="0" smtClean="0"/>
+                        <a:rPr lang="pt-BR" sz="1600" baseline="0" dirty="0"/>
                         <a:t> o id do funcionário existir, o</a:t>
                       </a:r>
                       <a:r>
-                        <a:rPr lang="pt-BR" sz="1600" dirty="0" smtClean="0"/>
+                        <a:rPr lang="pt-BR" sz="1600" dirty="0"/>
                         <a:t>s</a:t>
                       </a:r>
                       <a:r>
-                        <a:rPr lang="pt-BR" sz="1600" baseline="0" dirty="0" smtClean="0"/>
+                        <a:rPr lang="pt-BR" sz="1600" baseline="0" dirty="0"/>
                         <a:t> dados devem automaticamente preencher o campo :”</a:t>
                       </a:r>
                       <a:r>
-                        <a:rPr lang="pt-BR" sz="1600" dirty="0" smtClean="0"/>
+                        <a:rPr lang="pt-BR" sz="1600" dirty="0"/>
                         <a:t> Nome Funcionário”. Se não, o campo deve ficar vazio</a:t>
                       </a:r>
-                      <a:endParaRPr lang="pt-BR" sz="1600" dirty="0"/>
                     </a:p>
                   </a:txBody>
                   <a:tcPr/>
@@ -6384,7 +6235,7 @@
           <a:p>
             <a:pPr lvl="0"/>
             <a:r>
-              <a:rPr lang="pt-BR" b="1" dirty="0" smtClean="0"/>
+              <a:rPr lang="pt-BR" b="1" dirty="0"/>
               <a:t>RN08</a:t>
             </a:r>
             <a:r>
@@ -6392,52 +6243,44 @@
               <a:t>: Tela Requisição &gt; [ ID] [</a:t>
             </a:r>
             <a:r>
-              <a:rPr lang="pt-BR" dirty="0" err="1" smtClean="0"/>
+              <a:rPr lang="pt-BR" dirty="0" err="1"/>
               <a:t>Descricao</a:t>
             </a:r>
             <a:r>
-              <a:rPr lang="pt-BR" dirty="0" smtClean="0"/>
-              <a:t>] </a:t>
-            </a:r>
-            <a:r>
               <a:rPr lang="pt-BR" dirty="0"/>
-              <a:t>[Estoque</a:t>
-            </a:r>
-            <a:r>
-              <a:rPr lang="pt-BR" dirty="0" smtClean="0"/>
-              <a:t>]</a:t>
+              <a:t>] [Estoque]</a:t>
             </a:r>
           </a:p>
           <a:p>
             <a:pPr lvl="0"/>
             <a:r>
-              <a:rPr lang="pt-BR" b="1" dirty="0" smtClean="0"/>
+              <a:rPr lang="pt-BR" b="1" dirty="0"/>
               <a:t>CT</a:t>
             </a:r>
             <a:r>
-              <a:rPr lang="pt-BR" dirty="0" smtClean="0"/>
+              <a:rPr lang="pt-BR" dirty="0"/>
               <a:t>: Ao digitar um código no campo </a:t>
             </a:r>
             <a:r>
-              <a:rPr lang="pt-BR" dirty="0" err="1" smtClean="0"/>
+              <a:rPr lang="pt-BR" dirty="0" err="1"/>
               <a:t>Cod</a:t>
             </a:r>
             <a:r>
-              <a:rPr lang="pt-BR" dirty="0" smtClean="0"/>
+              <a:rPr lang="pt-BR" dirty="0"/>
               <a:t> Produto e esse existe na base de dados, o sistema deve exibir o nome do produto no campo [Descrição] a quantidade de itens no campo [Estoque] referentes aquele determinado código. Se o código não existir, os campos Descrição e Estoque devem ficar em brancos;</a:t>
             </a:r>
           </a:p>
           <a:p>
             <a:r>
-              <a:rPr lang="pt-BR" b="1" dirty="0" err="1" smtClean="0"/>
+              <a:rPr lang="pt-BR" b="1" dirty="0" err="1"/>
               <a:t>Pré</a:t>
             </a:r>
             <a:r>
-              <a:rPr lang="pt-BR" b="1" dirty="0" smtClean="0"/>
+              <a:rPr lang="pt-BR" b="1" dirty="0"/>
               <a:t>- condição</a:t>
             </a:r>
             <a:r>
-              <a:rPr lang="pt-BR" dirty="0" smtClean="0"/>
+              <a:rPr lang="pt-BR" dirty="0"/>
               <a:t>: Tela do almoxarifado deve estar aberta</a:t>
             </a:r>
             <a:endParaRPr lang="pt-BR" sz="2000" dirty="0"/>
@@ -6491,11 +6334,11 @@
                     <a:lstStyle/>
                     <a:p>
                       <a:r>
-                        <a:rPr lang="pt-BR" dirty="0" smtClean="0"/>
+                        <a:rPr lang="pt-BR" dirty="0"/>
                         <a:t>Ação</a:t>
                       </a:r>
                       <a:r>
-                        <a:rPr lang="pt-BR" baseline="0" dirty="0" smtClean="0"/>
+                        <a:rPr lang="pt-BR" baseline="0" dirty="0"/>
                         <a:t> </a:t>
                       </a:r>
                       <a:endParaRPr lang="pt-BR" dirty="0"/>
@@ -6509,11 +6352,11 @@
                     <a:lstStyle/>
                     <a:p>
                       <a:r>
-                        <a:rPr lang="pt-BR" dirty="0" smtClean="0"/>
+                        <a:rPr lang="pt-BR" dirty="0"/>
                         <a:t>Resultado</a:t>
                       </a:r>
                       <a:r>
-                        <a:rPr lang="pt-BR" baseline="0" dirty="0" smtClean="0"/>
+                        <a:rPr lang="pt-BR" baseline="0" dirty="0"/>
                         <a:t> esperado</a:t>
                       </a:r>
                       <a:endParaRPr lang="pt-BR" dirty="0"/>
@@ -6534,27 +6377,27 @@
                     <a:lstStyle/>
                     <a:p>
                       <a:r>
-                        <a:rPr lang="pt-BR" sz="1600" dirty="0" smtClean="0"/>
+                        <a:rPr lang="pt-BR" sz="1600" dirty="0"/>
                         <a:t>1 - Clicar no</a:t>
                       </a:r>
                       <a:r>
-                        <a:rPr lang="pt-BR" sz="1600" baseline="0" dirty="0" smtClean="0"/>
+                        <a:rPr lang="pt-BR" sz="1600" baseline="0" dirty="0"/>
                         <a:t> </a:t>
                       </a:r>
                       <a:r>
-                        <a:rPr lang="pt-BR" sz="1600" dirty="0" smtClean="0"/>
+                        <a:rPr lang="pt-BR" sz="1600" dirty="0"/>
                         <a:t>campo</a:t>
                       </a:r>
                       <a:r>
-                        <a:rPr lang="pt-BR" sz="1600" baseline="0" dirty="0" smtClean="0"/>
+                        <a:rPr lang="pt-BR" sz="1600" baseline="0" dirty="0"/>
                         <a:t> :“</a:t>
                       </a:r>
                       <a:r>
-                        <a:rPr lang="pt-BR" sz="1600" baseline="0" dirty="0" err="1" smtClean="0"/>
+                        <a:rPr lang="pt-BR" sz="1600" baseline="0" dirty="0" err="1"/>
                         <a:t>Cod.Produto</a:t>
                       </a:r>
                       <a:r>
-                        <a:rPr lang="pt-BR" sz="1600" baseline="0" dirty="0" smtClean="0"/>
+                        <a:rPr lang="pt-BR" sz="1600" baseline="0" dirty="0"/>
                         <a:t>”</a:t>
                       </a:r>
                       <a:endParaRPr lang="pt-BR" sz="1600" dirty="0"/>
@@ -6585,11 +6428,11 @@
                         <a:defRPr/>
                       </a:pPr>
                       <a:r>
-                        <a:rPr lang="pt-BR" sz="1600" dirty="0" smtClean="0"/>
+                        <a:rPr lang="pt-BR" sz="1600" dirty="0"/>
                         <a:t>O campo</a:t>
                       </a:r>
                       <a:r>
-                        <a:rPr lang="pt-BR" sz="1600" baseline="0" dirty="0" smtClean="0"/>
+                        <a:rPr lang="pt-BR" sz="1600" baseline="0" dirty="0"/>
                         <a:t> ficar habilitado;</a:t>
                       </a:r>
                       <a:endParaRPr lang="pt-BR" sz="1600" dirty="0"/>
@@ -6610,11 +6453,11 @@
                     <a:lstStyle/>
                     <a:p>
                       <a:r>
-                        <a:rPr lang="pt-BR" sz="1600" dirty="0" smtClean="0"/>
+                        <a:rPr lang="pt-BR" sz="1600" dirty="0"/>
                         <a:t>2 – Informar</a:t>
                       </a:r>
                       <a:r>
-                        <a:rPr lang="pt-BR" sz="1600" baseline="0" dirty="0" smtClean="0"/>
+                        <a:rPr lang="pt-BR" sz="1600" baseline="0" dirty="0"/>
                         <a:t> um código</a:t>
                       </a:r>
                       <a:endParaRPr lang="pt-BR" sz="1600" dirty="0"/>
@@ -6645,18 +6488,17 @@
                         <a:defRPr/>
                       </a:pPr>
                       <a:r>
-                        <a:rPr lang="pt-BR" sz="1600" dirty="0" smtClean="0"/>
+                        <a:rPr lang="pt-BR" sz="1600" dirty="0"/>
                         <a:t>Se</a:t>
                       </a:r>
                       <a:r>
-                        <a:rPr lang="pt-BR" sz="1600" baseline="0" dirty="0" smtClean="0"/>
+                        <a:rPr lang="pt-BR" sz="1600" baseline="0" dirty="0"/>
                         <a:t> o código existir, o</a:t>
                       </a:r>
                       <a:r>
-                        <a:rPr lang="pt-BR" sz="1600" dirty="0" smtClean="0"/>
+                        <a:rPr lang="pt-BR" sz="1600" dirty="0"/>
                         <a:t> sistema deve exibir o nome do produto no campo [Descrição] a quantidade de itens no campo [Estoque] referentes aquele determinado código;</a:t>
                       </a:r>
-                      <a:endParaRPr lang="pt-BR" sz="1600" dirty="0"/>
                     </a:p>
                   </a:txBody>
                   <a:tcPr/>
@@ -6811,61 +6653,36 @@
           <a:p>
             <a:pPr lvl="0"/>
             <a:r>
-              <a:rPr lang="pt-BR" b="1" dirty="0" smtClean="0"/>
+              <a:rPr lang="pt-BR" b="1" dirty="0"/>
               <a:t>RN09</a:t>
             </a:r>
             <a:r>
               <a:rPr lang="pt-BR" dirty="0"/>
-              <a:t>: Tela Requisição &gt; Campo [Quantidade</a:t>
-            </a:r>
-            <a:r>
-              <a:rPr lang="pt-BR" dirty="0" smtClean="0"/>
-              <a:t>]</a:t>
-            </a:r>
-            <a:endParaRPr lang="pt-BR" dirty="0"/>
+              <a:t>: Tela Requisição &gt; Campo [Quantidade]</a:t>
+            </a:r>
           </a:p>
           <a:p>
             <a:pPr lvl="0"/>
             <a:r>
-              <a:rPr lang="pt-BR" b="1" dirty="0" smtClean="0"/>
+              <a:rPr lang="pt-BR" b="1" dirty="0"/>
               <a:t>CT</a:t>
             </a:r>
             <a:r>
               <a:rPr lang="pt-BR" dirty="0"/>
-              <a:t>: </a:t>
-            </a:r>
-            <a:r>
-              <a:rPr lang="pt-BR" dirty="0" smtClean="0"/>
-              <a:t>Campo: Quantidade </a:t>
+              <a:t>: Campo: Quantidade só é habilitado, depois que um produto for localizado a partir do código, e quantidade em estoque for maior que zero;</a:t>
+            </a:r>
+          </a:p>
+          <a:p>
+            <a:r>
+              <a:rPr lang="pt-BR" b="1" dirty="0" err="1"/>
+              <a:t>Pré</a:t>
+            </a:r>
+            <a:r>
+              <a:rPr lang="pt-BR" b="1" dirty="0"/>
+              <a:t>- condição</a:t>
             </a:r>
             <a:r>
               <a:rPr lang="pt-BR" dirty="0"/>
-              <a:t>só é habilitado, depois que um produto for localizado </a:t>
-            </a:r>
-            <a:r>
-              <a:rPr lang="pt-BR" dirty="0" smtClean="0"/>
-              <a:t>a partir do código, e </a:t>
-            </a:r>
-            <a:r>
-              <a:rPr lang="pt-BR" dirty="0"/>
-              <a:t>quantidade em estoque for maior que </a:t>
-            </a:r>
-            <a:r>
-              <a:rPr lang="pt-BR" dirty="0" smtClean="0"/>
-              <a:t>zero;</a:t>
-            </a:r>
-          </a:p>
-          <a:p>
-            <a:r>
-              <a:rPr lang="pt-BR" b="1" dirty="0" err="1" smtClean="0"/>
-              <a:t>Pré</a:t>
-            </a:r>
-            <a:r>
-              <a:rPr lang="pt-BR" b="1" dirty="0" smtClean="0"/>
-              <a:t>- condição</a:t>
-            </a:r>
-            <a:r>
-              <a:rPr lang="pt-BR" dirty="0" smtClean="0"/>
               <a:t>: Tela do almoxarifado deve estar aberta</a:t>
             </a:r>
             <a:endParaRPr lang="pt-BR" sz="2000" dirty="0"/>
@@ -6919,11 +6736,11 @@
                     <a:lstStyle/>
                     <a:p>
                       <a:r>
-                        <a:rPr lang="pt-BR" dirty="0" smtClean="0"/>
+                        <a:rPr lang="pt-BR" dirty="0"/>
                         <a:t>Ação</a:t>
                       </a:r>
                       <a:r>
-                        <a:rPr lang="pt-BR" baseline="0" dirty="0" smtClean="0"/>
+                        <a:rPr lang="pt-BR" baseline="0" dirty="0"/>
                         <a:t> </a:t>
                       </a:r>
                       <a:endParaRPr lang="pt-BR" dirty="0"/>
@@ -6937,11 +6754,11 @@
                     <a:lstStyle/>
                     <a:p>
                       <a:r>
-                        <a:rPr lang="pt-BR" dirty="0" smtClean="0"/>
+                        <a:rPr lang="pt-BR" dirty="0"/>
                         <a:t>Resultado</a:t>
                       </a:r>
                       <a:r>
-                        <a:rPr lang="pt-BR" baseline="0" dirty="0" smtClean="0"/>
+                        <a:rPr lang="pt-BR" baseline="0" dirty="0"/>
                         <a:t> esperado</a:t>
                       </a:r>
                       <a:endParaRPr lang="pt-BR" dirty="0"/>
@@ -6962,27 +6779,27 @@
                     <a:lstStyle/>
                     <a:p>
                       <a:r>
-                        <a:rPr lang="pt-BR" sz="1600" dirty="0" smtClean="0"/>
+                        <a:rPr lang="pt-BR" sz="1600" dirty="0"/>
                         <a:t>1 - Clicar no</a:t>
                       </a:r>
                       <a:r>
-                        <a:rPr lang="pt-BR" sz="1600" baseline="0" dirty="0" smtClean="0"/>
+                        <a:rPr lang="pt-BR" sz="1600" baseline="0" dirty="0"/>
                         <a:t> </a:t>
                       </a:r>
                       <a:r>
-                        <a:rPr lang="pt-BR" sz="1600" dirty="0" smtClean="0"/>
+                        <a:rPr lang="pt-BR" sz="1600" dirty="0"/>
                         <a:t>campo</a:t>
                       </a:r>
                       <a:r>
-                        <a:rPr lang="pt-BR" sz="1600" baseline="0" dirty="0" smtClean="0"/>
+                        <a:rPr lang="pt-BR" sz="1600" baseline="0" dirty="0"/>
                         <a:t> :“</a:t>
                       </a:r>
                       <a:r>
-                        <a:rPr lang="pt-BR" sz="1600" baseline="0" dirty="0" err="1" smtClean="0"/>
+                        <a:rPr lang="pt-BR" sz="1600" baseline="0" dirty="0" err="1"/>
                         <a:t>Cod.Produto</a:t>
                       </a:r>
                       <a:r>
-                        <a:rPr lang="pt-BR" sz="1600" baseline="0" dirty="0" smtClean="0"/>
+                        <a:rPr lang="pt-BR" sz="1600" baseline="0" dirty="0"/>
                         <a:t>”</a:t>
                       </a:r>
                       <a:endParaRPr lang="pt-BR" sz="1600" dirty="0"/>
@@ -7013,11 +6830,11 @@
                         <a:defRPr/>
                       </a:pPr>
                       <a:r>
-                        <a:rPr lang="pt-BR" sz="1600" dirty="0" smtClean="0"/>
+                        <a:rPr lang="pt-BR" sz="1600" dirty="0"/>
                         <a:t>O campo</a:t>
                       </a:r>
                       <a:r>
-                        <a:rPr lang="pt-BR" sz="1600" baseline="0" dirty="0" smtClean="0"/>
+                        <a:rPr lang="pt-BR" sz="1600" baseline="0" dirty="0"/>
                         <a:t> ficar habilitado;</a:t>
                       </a:r>
                       <a:endParaRPr lang="pt-BR" sz="1600" dirty="0"/>
@@ -7038,11 +6855,11 @@
                     <a:lstStyle/>
                     <a:p>
                       <a:r>
-                        <a:rPr lang="pt-BR" sz="1600" dirty="0" smtClean="0"/>
+                        <a:rPr lang="pt-BR" sz="1600" dirty="0"/>
                         <a:t>2 – Informar</a:t>
                       </a:r>
                       <a:r>
-                        <a:rPr lang="pt-BR" sz="1600" baseline="0" dirty="0" smtClean="0"/>
+                        <a:rPr lang="pt-BR" sz="1600" baseline="0" dirty="0"/>
                         <a:t> um código</a:t>
                       </a:r>
                       <a:endParaRPr lang="pt-BR" sz="1600" dirty="0"/>
@@ -7073,18 +6890,17 @@
                         <a:defRPr/>
                       </a:pPr>
                       <a:r>
-                        <a:rPr lang="pt-BR" sz="1600" dirty="0" smtClean="0"/>
+                        <a:rPr lang="pt-BR" sz="1600" dirty="0"/>
                         <a:t>O sistema</a:t>
                       </a:r>
                       <a:r>
-                        <a:rPr lang="pt-BR" sz="1600" baseline="0" dirty="0" smtClean="0"/>
+                        <a:rPr lang="pt-BR" sz="1600" baseline="0" dirty="0"/>
                         <a:t> deve habilitar o campo: Quantidade apenas se o código do produto existir e a quantidade dele em estoque for maior que zero</a:t>
                       </a:r>
                       <a:r>
-                        <a:rPr lang="pt-BR" sz="1600" dirty="0" smtClean="0"/>
+                        <a:rPr lang="pt-BR" sz="1600" dirty="0"/>
                         <a:t>;</a:t>
                       </a:r>
-                      <a:endParaRPr lang="pt-BR" sz="1600" dirty="0"/>
                     </a:p>
                   </a:txBody>
                   <a:tcPr/>
@@ -7321,64 +7137,36 @@
           <a:lstStyle/>
           <a:p>
             <a:r>
-              <a:rPr lang="pt-BR" b="1" dirty="0" smtClean="0"/>
+              <a:rPr lang="pt-BR" b="1" dirty="0"/>
               <a:t>RN10: </a:t>
             </a:r>
             <a:r>
-              <a:rPr lang="pt-BR" dirty="0" smtClean="0"/>
-              <a:t>Tela </a:t>
-            </a:r>
-            <a:r>
               <a:rPr lang="pt-BR" dirty="0"/>
-              <a:t>Requisição &gt; Campo [Quantidade</a:t>
-            </a:r>
-            <a:r>
-              <a:rPr lang="pt-BR" dirty="0" smtClean="0"/>
-              <a:t>] </a:t>
+              <a:t>Tela Requisição &gt; Campo [Quantidade] </a:t>
             </a:r>
           </a:p>
           <a:p>
             <a:pPr lvl="0"/>
             <a:r>
-              <a:rPr lang="pt-BR" b="1" dirty="0" smtClean="0"/>
+              <a:rPr lang="pt-BR" b="1" dirty="0"/>
               <a:t>CT</a:t>
             </a:r>
             <a:r>
               <a:rPr lang="pt-BR" dirty="0"/>
-              <a:t>:O </a:t>
-            </a:r>
-            <a:r>
-              <a:rPr lang="pt-BR" dirty="0" smtClean="0"/>
-              <a:t>campo: Quantidade </a:t>
+              <a:t>:O campo: Quantidade só aceita valores inteiros maior que zero.;</a:t>
+            </a:r>
+          </a:p>
+          <a:p>
+            <a:r>
+              <a:rPr lang="pt-BR" b="1" dirty="0" err="1"/>
+              <a:t>Pré</a:t>
+            </a:r>
+            <a:r>
+              <a:rPr lang="pt-BR" b="1" dirty="0"/>
+              <a:t>- condição</a:t>
             </a:r>
             <a:r>
               <a:rPr lang="pt-BR" dirty="0"/>
-              <a:t>só </a:t>
-            </a:r>
-            <a:r>
-              <a:rPr lang="pt-BR" dirty="0" smtClean="0"/>
-              <a:t>aceita </a:t>
-            </a:r>
-            <a:r>
-              <a:rPr lang="pt-BR" dirty="0"/>
-              <a:t>valores inteiros maior que zero</a:t>
-            </a:r>
-            <a:r>
-              <a:rPr lang="pt-BR" dirty="0" smtClean="0"/>
-              <a:t>.;</a:t>
-            </a:r>
-          </a:p>
-          <a:p>
-            <a:r>
-              <a:rPr lang="pt-BR" b="1" dirty="0" err="1" smtClean="0"/>
-              <a:t>Pré</a:t>
-            </a:r>
-            <a:r>
-              <a:rPr lang="pt-BR" b="1" dirty="0" smtClean="0"/>
-              <a:t>- condição</a:t>
-            </a:r>
-            <a:r>
-              <a:rPr lang="pt-BR" dirty="0" smtClean="0"/>
               <a:t>: Tela do almoxarifado deve estar aberta</a:t>
             </a:r>
             <a:endParaRPr lang="pt-BR" sz="2000" dirty="0"/>
@@ -7432,11 +7220,11 @@
                     <a:lstStyle/>
                     <a:p>
                       <a:r>
-                        <a:rPr lang="pt-BR" dirty="0" smtClean="0"/>
+                        <a:rPr lang="pt-BR" dirty="0"/>
                         <a:t>Ação</a:t>
                       </a:r>
                       <a:r>
-                        <a:rPr lang="pt-BR" baseline="0" dirty="0" smtClean="0"/>
+                        <a:rPr lang="pt-BR" baseline="0" dirty="0"/>
                         <a:t> </a:t>
                       </a:r>
                       <a:endParaRPr lang="pt-BR" dirty="0"/>
@@ -7450,11 +7238,11 @@
                     <a:lstStyle/>
                     <a:p>
                       <a:r>
-                        <a:rPr lang="pt-BR" dirty="0" smtClean="0"/>
+                        <a:rPr lang="pt-BR" dirty="0"/>
                         <a:t>Resultado</a:t>
                       </a:r>
                       <a:r>
-                        <a:rPr lang="pt-BR" baseline="0" dirty="0" smtClean="0"/>
+                        <a:rPr lang="pt-BR" baseline="0" dirty="0"/>
                         <a:t> esperado</a:t>
                       </a:r>
                       <a:endParaRPr lang="pt-BR" dirty="0"/>
@@ -7475,27 +7263,27 @@
                     <a:lstStyle/>
                     <a:p>
                       <a:r>
-                        <a:rPr lang="pt-BR" sz="1600" dirty="0" smtClean="0"/>
+                        <a:rPr lang="pt-BR" sz="1600" dirty="0"/>
                         <a:t>1 - Clicar no</a:t>
                       </a:r>
                       <a:r>
-                        <a:rPr lang="pt-BR" sz="1600" baseline="0" dirty="0" smtClean="0"/>
+                        <a:rPr lang="pt-BR" sz="1600" baseline="0" dirty="0"/>
                         <a:t> </a:t>
                       </a:r>
                       <a:r>
-                        <a:rPr lang="pt-BR" sz="1600" dirty="0" smtClean="0"/>
+                        <a:rPr lang="pt-BR" sz="1600" dirty="0"/>
                         <a:t>campo</a:t>
                       </a:r>
                       <a:r>
-                        <a:rPr lang="pt-BR" sz="1600" baseline="0" dirty="0" smtClean="0"/>
+                        <a:rPr lang="pt-BR" sz="1600" baseline="0" dirty="0"/>
                         <a:t> :“</a:t>
                       </a:r>
                       <a:r>
-                        <a:rPr lang="pt-BR" sz="1600" dirty="0" smtClean="0"/>
+                        <a:rPr lang="pt-BR" sz="1600" dirty="0"/>
                         <a:t>Quantidade</a:t>
                       </a:r>
                       <a:r>
-                        <a:rPr lang="pt-BR" sz="1600" baseline="0" dirty="0" smtClean="0"/>
+                        <a:rPr lang="pt-BR" sz="1600" baseline="0" dirty="0"/>
                         <a:t>”</a:t>
                       </a:r>
                       <a:endParaRPr lang="pt-BR" sz="1600" dirty="0"/>
@@ -7526,11 +7314,11 @@
                         <a:defRPr/>
                       </a:pPr>
                       <a:r>
-                        <a:rPr lang="pt-BR" sz="1600" dirty="0" smtClean="0"/>
+                        <a:rPr lang="pt-BR" sz="1600" dirty="0"/>
                         <a:t>O campo</a:t>
                       </a:r>
                       <a:r>
-                        <a:rPr lang="pt-BR" sz="1600" baseline="0" dirty="0" smtClean="0"/>
+                        <a:rPr lang="pt-BR" sz="1600" baseline="0" dirty="0"/>
                         <a:t> ficar habilitado;</a:t>
                       </a:r>
                       <a:endParaRPr lang="pt-BR" sz="1600" dirty="0"/>
@@ -7551,11 +7339,11 @@
                     <a:lstStyle/>
                     <a:p>
                       <a:r>
-                        <a:rPr lang="pt-BR" sz="1600" dirty="0" smtClean="0"/>
+                        <a:rPr lang="pt-BR" sz="1600" dirty="0"/>
                         <a:t>2 – Informar</a:t>
                       </a:r>
                       <a:r>
-                        <a:rPr lang="pt-BR" sz="1600" baseline="0" dirty="0" smtClean="0"/>
+                        <a:rPr lang="pt-BR" sz="1600" baseline="0" dirty="0"/>
                         <a:t> um valor</a:t>
                       </a:r>
                       <a:endParaRPr lang="pt-BR" sz="1600" dirty="0"/>
@@ -7586,18 +7374,17 @@
                         <a:defRPr/>
                       </a:pPr>
                       <a:r>
-                        <a:rPr lang="pt-BR" sz="1600" dirty="0" smtClean="0"/>
+                        <a:rPr lang="pt-BR" sz="1600" dirty="0"/>
                         <a:t>Se o</a:t>
                       </a:r>
                       <a:r>
-                        <a:rPr lang="pt-BR" sz="1600" baseline="0" dirty="0" smtClean="0"/>
+                        <a:rPr lang="pt-BR" sz="1600" baseline="0" dirty="0"/>
                         <a:t> valor informado for igual aa zero ou maior, o sistema deve aceitar. Se não, o valor não deve aparecer no campo</a:t>
                       </a:r>
                       <a:r>
-                        <a:rPr lang="pt-BR" sz="1600" dirty="0" smtClean="0"/>
+                        <a:rPr lang="pt-BR" sz="1600" dirty="0"/>
                         <a:t>;</a:t>
                       </a:r>
-                      <a:endParaRPr lang="pt-BR" sz="1600" dirty="0"/>
                     </a:p>
                   </a:txBody>
                   <a:tcPr/>
@@ -7751,56 +7538,35 @@
           <a:lstStyle/>
           <a:p>
             <a:r>
-              <a:rPr lang="pt-BR" b="1" dirty="0" smtClean="0"/>
+              <a:rPr lang="pt-BR" b="1" dirty="0"/>
               <a:t>RN11</a:t>
             </a:r>
             <a:r>
-              <a:rPr lang="pt-BR" dirty="0" smtClean="0"/>
-              <a:t>:Tela </a:t>
-            </a:r>
-            <a:r>
               <a:rPr lang="pt-BR" dirty="0"/>
-              <a:t>Requisição &gt; Botão </a:t>
-            </a:r>
-            <a:r>
-              <a:rPr lang="pt-BR" dirty="0" smtClean="0"/>
-              <a:t>Gravar</a:t>
-            </a:r>
-          </a:p>
-          <a:p>
-            <a:r>
-              <a:rPr lang="pt-BR" b="1" dirty="0" smtClean="0"/>
+              <a:t>:Tela Requisição &gt; Botão Gravar</a:t>
+            </a:r>
+          </a:p>
+          <a:p>
+            <a:r>
+              <a:rPr lang="pt-BR" b="1" dirty="0"/>
               <a:t>CT</a:t>
             </a:r>
             <a:r>
               <a:rPr lang="pt-BR" dirty="0"/>
-              <a:t>:O botão gravar só deve </a:t>
-            </a:r>
-            <a:r>
-              <a:rPr lang="pt-BR" dirty="0" smtClean="0"/>
-              <a:t>ficar </a:t>
+              <a:t>:O botão gravar só deve ficar ativo depois que o valor da quantidade informada for maior que zero e se a quantidade for menor ou igual ao valor exibido no estoque;</a:t>
+            </a:r>
+          </a:p>
+          <a:p>
+            <a:r>
+              <a:rPr lang="pt-BR" b="1" dirty="0" err="1"/>
+              <a:t>Pré</a:t>
+            </a:r>
+            <a:r>
+              <a:rPr lang="pt-BR" b="1" dirty="0"/>
+              <a:t>- condição</a:t>
             </a:r>
             <a:r>
               <a:rPr lang="pt-BR" dirty="0"/>
-              <a:t>ativo depois que o valor da </a:t>
-            </a:r>
-            <a:r>
-              <a:rPr lang="pt-BR" dirty="0" smtClean="0"/>
-              <a:t>quantidade informada for maior que zero e se a quantidade for menor ou igual ao valor exibido no estoque;</a:t>
-            </a:r>
-            <a:endParaRPr lang="pt-BR" dirty="0" smtClean="0"/>
-          </a:p>
-          <a:p>
-            <a:r>
-              <a:rPr lang="pt-BR" b="1" dirty="0" err="1" smtClean="0"/>
-              <a:t>Pré</a:t>
-            </a:r>
-            <a:r>
-              <a:rPr lang="pt-BR" b="1" dirty="0" smtClean="0"/>
-              <a:t>- condição</a:t>
-            </a:r>
-            <a:r>
-              <a:rPr lang="pt-BR" dirty="0" smtClean="0"/>
               <a:t>: Tela do almoxarifado deve estar aberta</a:t>
             </a:r>
             <a:endParaRPr lang="pt-BR" sz="2000" dirty="0"/>
@@ -7854,11 +7620,11 @@
                     <a:lstStyle/>
                     <a:p>
                       <a:r>
-                        <a:rPr lang="pt-BR" dirty="0" smtClean="0"/>
+                        <a:rPr lang="pt-BR" dirty="0"/>
                         <a:t>Ação</a:t>
                       </a:r>
                       <a:r>
-                        <a:rPr lang="pt-BR" baseline="0" dirty="0" smtClean="0"/>
+                        <a:rPr lang="pt-BR" baseline="0" dirty="0"/>
                         <a:t> </a:t>
                       </a:r>
                       <a:endParaRPr lang="pt-BR" dirty="0"/>
@@ -7872,11 +7638,11 @@
                     <a:lstStyle/>
                     <a:p>
                       <a:r>
-                        <a:rPr lang="pt-BR" dirty="0" smtClean="0"/>
+                        <a:rPr lang="pt-BR" dirty="0"/>
                         <a:t>Resultado</a:t>
                       </a:r>
                       <a:r>
-                        <a:rPr lang="pt-BR" baseline="0" dirty="0" smtClean="0"/>
+                        <a:rPr lang="pt-BR" baseline="0" dirty="0"/>
                         <a:t> esperado</a:t>
                       </a:r>
                       <a:endParaRPr lang="pt-BR" dirty="0"/>
@@ -7897,31 +7663,27 @@
                     <a:lstStyle/>
                     <a:p>
                       <a:r>
-                        <a:rPr lang="pt-BR" sz="1600" dirty="0" smtClean="0"/>
+                        <a:rPr lang="pt-BR" sz="1600" dirty="0"/>
                         <a:t>1 - Clicar no</a:t>
                       </a:r>
                       <a:r>
-                        <a:rPr lang="pt-BR" sz="1600" baseline="0" dirty="0" smtClean="0"/>
+                        <a:rPr lang="pt-BR" sz="1600" baseline="0" dirty="0"/>
                         <a:t> </a:t>
                       </a:r>
                       <a:r>
-                        <a:rPr lang="pt-BR" sz="1600" dirty="0" smtClean="0"/>
+                        <a:rPr lang="pt-BR" sz="1600" dirty="0"/>
                         <a:t>campo</a:t>
                       </a:r>
                       <a:r>
-                        <a:rPr lang="pt-BR" sz="1600" baseline="0" dirty="0" smtClean="0"/>
-                        <a:t> </a:t>
-                      </a:r>
-                      <a:r>
-                        <a:rPr lang="pt-BR" sz="1600" baseline="0" dirty="0" smtClean="0"/>
-                        <a:t>:“</a:t>
-                      </a:r>
-                      <a:r>
-                        <a:rPr lang="pt-BR" sz="1600" baseline="0" dirty="0" err="1" smtClean="0"/>
+                        <a:rPr lang="pt-BR" sz="1600" baseline="0" dirty="0"/>
+                        <a:t> :“</a:t>
+                      </a:r>
+                      <a:r>
+                        <a:rPr lang="pt-BR" sz="1600" baseline="0" dirty="0" err="1"/>
                         <a:t>Cod.Produto</a:t>
                       </a:r>
                       <a:r>
-                        <a:rPr lang="pt-BR" sz="1600" baseline="0" dirty="0" smtClean="0"/>
+                        <a:rPr lang="pt-BR" sz="1600" baseline="0" dirty="0"/>
                         <a:t>”</a:t>
                       </a:r>
                     </a:p>
@@ -7954,11 +7716,11 @@
                         <a:defRPr/>
                       </a:pPr>
                       <a:r>
-                        <a:rPr lang="pt-BR" sz="1600" dirty="0" smtClean="0"/>
+                        <a:rPr lang="pt-BR" sz="1600" dirty="0"/>
                         <a:t>O campo ficar habilitado</a:t>
                       </a:r>
                       <a:r>
-                        <a:rPr lang="pt-BR" sz="1600" baseline="0" dirty="0" smtClean="0"/>
+                        <a:rPr lang="pt-BR" sz="1600" baseline="0" dirty="0"/>
                         <a:t> e se o código existir, preencher os campos: “Descrição” e “Estoque”. Se não, os campos devem ficar vazios;</a:t>
                       </a:r>
                       <a:endParaRPr lang="pt-BR" sz="1600" dirty="0"/>
@@ -7979,11 +7741,11 @@
                     <a:lstStyle/>
                     <a:p>
                       <a:r>
-                        <a:rPr lang="pt-BR" sz="1600" dirty="0" smtClean="0"/>
+                        <a:rPr lang="pt-BR" sz="1600" dirty="0"/>
                         <a:t>2 - </a:t>
                       </a:r>
                       <a:r>
-                        <a:rPr lang="pt-BR" sz="1600" baseline="0" dirty="0" smtClean="0"/>
+                        <a:rPr lang="pt-BR" sz="1600" baseline="0" dirty="0"/>
                         <a:t>Preencher os campos: “Descrição”, “Estoque” e a “Quantidade”</a:t>
                       </a:r>
                       <a:endParaRPr lang="pt-BR" sz="1600" dirty="0"/>
@@ -8014,11 +7776,11 @@
                         <a:defRPr/>
                       </a:pPr>
                       <a:r>
-                        <a:rPr lang="pt-BR" sz="1600" dirty="0" smtClean="0"/>
+                        <a:rPr lang="pt-BR" sz="1600" dirty="0"/>
                         <a:t>O campo: “Quantidade” deve</a:t>
                       </a:r>
                       <a:r>
-                        <a:rPr lang="pt-BR" sz="1600" baseline="0" dirty="0" smtClean="0"/>
+                        <a:rPr lang="pt-BR" sz="1600" baseline="0" dirty="0"/>
                         <a:t> ter valores menores ou iguais ao valor preenchido ou exibido no  campo: "Estoque”;</a:t>
                       </a:r>
                       <a:endParaRPr lang="pt-BR" sz="1600" dirty="0"/>
@@ -8039,11 +7801,11 @@
                     <a:lstStyle/>
                     <a:p>
                       <a:r>
-                        <a:rPr lang="pt-BR" sz="1600" dirty="0" smtClean="0"/>
+                        <a:rPr lang="pt-BR" sz="1600" dirty="0"/>
                         <a:t>3 – Checar</a:t>
                       </a:r>
                       <a:r>
-                        <a:rPr lang="pt-BR" sz="1600" baseline="0" dirty="0" smtClean="0"/>
+                        <a:rPr lang="pt-BR" sz="1600" baseline="0" dirty="0"/>
                         <a:t> o botão: “Gravar”</a:t>
                       </a:r>
                       <a:endParaRPr lang="pt-BR" sz="1600" dirty="0"/>
@@ -8074,18 +7836,17 @@
                         <a:defRPr/>
                       </a:pPr>
                       <a:r>
-                        <a:rPr lang="pt-BR" sz="1600" dirty="0" smtClean="0"/>
+                        <a:rPr lang="pt-BR" sz="1600" dirty="0"/>
                         <a:t>Ele só deve ficar</a:t>
                       </a:r>
                       <a:r>
-                        <a:rPr lang="pt-BR" sz="1600" baseline="0" dirty="0" smtClean="0"/>
+                        <a:rPr lang="pt-BR" sz="1600" baseline="0" dirty="0"/>
                         <a:t> ativo se </a:t>
                       </a:r>
                       <a:r>
-                        <a:rPr lang="pt-BR" sz="1600" dirty="0" smtClean="0"/>
+                        <a:rPr lang="pt-BR" sz="1600" dirty="0"/>
                         <a:t>o valor da quantidade informada for maior que zero, e se a quantidade for menor ou igual ao valor exibido no estoque;</a:t>
                       </a:r>
-                      <a:endParaRPr lang="pt-BR" sz="1600" dirty="0"/>
                     </a:p>
                   </a:txBody>
                   <a:tcPr/>
@@ -8239,16 +8000,12 @@
           <a:lstStyle/>
           <a:p>
             <a:r>
-              <a:rPr lang="pt-BR" b="1" dirty="0" smtClean="0"/>
+              <a:rPr lang="pt-BR" b="1" dirty="0"/>
               <a:t>RN12</a:t>
             </a:r>
             <a:r>
-              <a:rPr lang="pt-BR" dirty="0" smtClean="0"/>
-              <a:t>:Tela </a:t>
-            </a:r>
-            <a:r>
               <a:rPr lang="pt-BR" dirty="0"/>
-              <a:t>Requisição &gt; </a:t>
+              <a:t>:Tela Requisição &gt; </a:t>
             </a:r>
             <a:r>
               <a:rPr lang="pt-BR" dirty="0" err="1"/>
@@ -8256,40 +8013,30 @@
             </a:r>
             <a:r>
               <a:rPr lang="pt-BR" dirty="0"/>
-              <a:t> </a:t>
-            </a:r>
-            <a:r>
-              <a:rPr lang="pt-BR" dirty="0" smtClean="0"/>
-              <a:t>Prioridade</a:t>
-            </a:r>
-            <a:endParaRPr lang="pt-BR" dirty="0"/>
-          </a:p>
-          <a:p>
-            <a:r>
-              <a:rPr lang="pt-BR" b="1" dirty="0" smtClean="0"/>
+              <a:t> Prioridade</a:t>
+            </a:r>
+          </a:p>
+          <a:p>
+            <a:r>
+              <a:rPr lang="pt-BR" b="1" dirty="0"/>
               <a:t>CT</a:t>
             </a:r>
             <a:r>
               <a:rPr lang="pt-BR" dirty="0"/>
-              <a:t>: </a:t>
-            </a:r>
-            <a:r>
-              <a:rPr lang="pt-BR" dirty="0" smtClean="0"/>
-              <a:t>As cores do nível de prioridade devem mudar ao serem marcados, para: vermelho em urgente, amarelo para médio, e verde para baixo;</a:t>
-            </a:r>
-            <a:endParaRPr lang="pt-BR" dirty="0" smtClean="0"/>
-          </a:p>
-          <a:p>
-            <a:r>
-              <a:rPr lang="pt-BR" b="1" dirty="0" err="1" smtClean="0"/>
+              <a:t>: As cores do nível de prioridade devem mudar ao serem marcados, para: vermelho em urgente, amarelo para médio, e verde para baixo;</a:t>
+            </a:r>
+          </a:p>
+          <a:p>
+            <a:r>
+              <a:rPr lang="pt-BR" b="1" dirty="0" err="1"/>
               <a:t>Pré</a:t>
             </a:r>
             <a:r>
-              <a:rPr lang="pt-BR" b="1" dirty="0" smtClean="0"/>
+              <a:rPr lang="pt-BR" b="1" dirty="0"/>
               <a:t>- condição</a:t>
             </a:r>
             <a:r>
-              <a:rPr lang="pt-BR" dirty="0" smtClean="0"/>
+              <a:rPr lang="pt-BR" dirty="0"/>
               <a:t>: Tela do almoxarifado deve estar aberta</a:t>
             </a:r>
             <a:endParaRPr lang="pt-BR" sz="2000" dirty="0"/>
@@ -8343,11 +8090,11 @@
                     <a:lstStyle/>
                     <a:p>
                       <a:r>
-                        <a:rPr lang="pt-BR" dirty="0" smtClean="0"/>
+                        <a:rPr lang="pt-BR" dirty="0"/>
                         <a:t>Ação</a:t>
                       </a:r>
                       <a:r>
-                        <a:rPr lang="pt-BR" baseline="0" dirty="0" smtClean="0"/>
+                        <a:rPr lang="pt-BR" baseline="0" dirty="0"/>
                         <a:t> </a:t>
                       </a:r>
                       <a:endParaRPr lang="pt-BR" dirty="0"/>
@@ -8361,11 +8108,11 @@
                     <a:lstStyle/>
                     <a:p>
                       <a:r>
-                        <a:rPr lang="pt-BR" dirty="0" smtClean="0"/>
+                        <a:rPr lang="pt-BR" dirty="0"/>
                         <a:t>Resultado</a:t>
                       </a:r>
                       <a:r>
-                        <a:rPr lang="pt-BR" baseline="0" dirty="0" smtClean="0"/>
+                        <a:rPr lang="pt-BR" baseline="0" dirty="0"/>
                         <a:t> esperado</a:t>
                       </a:r>
                       <a:endParaRPr lang="pt-BR" dirty="0"/>
@@ -8386,28 +8133,20 @@
                     <a:lstStyle/>
                     <a:p>
                       <a:r>
-                        <a:rPr lang="pt-BR" sz="1600" dirty="0" smtClean="0"/>
-                        <a:t>1 - Clicar </a:t>
-                      </a:r>
-                      <a:r>
-                        <a:rPr lang="pt-BR" sz="1600" dirty="0" smtClean="0"/>
-                        <a:t>em</a:t>
-                      </a:r>
-                      <a:r>
-                        <a:rPr lang="pt-BR" sz="1600" baseline="0" dirty="0" smtClean="0"/>
+                        <a:rPr lang="pt-BR" sz="1600" dirty="0"/>
+                        <a:t>1 - Clicar em</a:t>
+                      </a:r>
+                      <a:r>
+                        <a:rPr lang="pt-BR" sz="1600" baseline="0" dirty="0"/>
                         <a:t>: “Urgente”, no </a:t>
                       </a:r>
                       <a:r>
-                        <a:rPr lang="pt-BR" sz="1600" dirty="0" smtClean="0"/>
+                        <a:rPr lang="pt-BR" sz="1600" dirty="0"/>
                         <a:t>campo</a:t>
                       </a:r>
                       <a:r>
-                        <a:rPr lang="pt-BR" sz="1600" baseline="0" dirty="0" smtClean="0"/>
-                        <a:t> </a:t>
-                      </a:r>
-                      <a:r>
-                        <a:rPr lang="pt-BR" sz="1600" baseline="0" dirty="0" smtClean="0"/>
-                        <a:t>:“Nível de Prioridade”</a:t>
+                        <a:rPr lang="pt-BR" sz="1600" baseline="0" dirty="0"/>
+                        <a:t> :“Nível de Prioridade”</a:t>
                       </a:r>
                       <a:endParaRPr lang="pt-BR" sz="1600" dirty="0"/>
                     </a:p>
@@ -8437,10 +8176,9 @@
                         <a:defRPr/>
                       </a:pPr>
                       <a:r>
-                        <a:rPr lang="pt-BR" sz="1600" dirty="0" smtClean="0"/>
+                        <a:rPr lang="pt-BR" sz="1600" dirty="0"/>
                         <a:t>A cor deve ser mudada para vermelho</a:t>
                       </a:r>
-                      <a:endParaRPr lang="pt-BR" sz="1600" dirty="0"/>
                     </a:p>
                   </a:txBody>
                   <a:tcPr/>
@@ -8458,19 +8196,19 @@
                     <a:lstStyle/>
                     <a:p>
                       <a:r>
-                        <a:rPr lang="pt-BR" sz="1600" dirty="0" smtClean="0"/>
+                        <a:rPr lang="pt-BR" sz="1600" dirty="0"/>
                         <a:t>1 - Clicar em</a:t>
                       </a:r>
                       <a:r>
-                        <a:rPr lang="pt-BR" sz="1600" baseline="0" dirty="0" smtClean="0"/>
+                        <a:rPr lang="pt-BR" sz="1600" baseline="0" dirty="0"/>
                         <a:t>: “Médio”, no </a:t>
                       </a:r>
                       <a:r>
-                        <a:rPr lang="pt-BR" sz="1600" dirty="0" smtClean="0"/>
+                        <a:rPr lang="pt-BR" sz="1600" dirty="0"/>
                         <a:t>campo</a:t>
                       </a:r>
                       <a:r>
-                        <a:rPr lang="pt-BR" sz="1600" baseline="0" dirty="0" smtClean="0"/>
+                        <a:rPr lang="pt-BR" sz="1600" baseline="0" dirty="0"/>
                         <a:t> :“Nível de Prioridade</a:t>
                       </a:r>
                       <a:endParaRPr lang="pt-BR" sz="1600" dirty="0"/>
@@ -8501,7 +8239,7 @@
                         <a:defRPr/>
                       </a:pPr>
                       <a:r>
-                        <a:rPr lang="pt-BR" sz="1600" dirty="0" smtClean="0"/>
+                        <a:rPr lang="pt-BR" sz="1600" dirty="0"/>
                         <a:t>A cor deve ser mudada para amarelo</a:t>
                       </a:r>
                     </a:p>
@@ -8541,19 +8279,19 @@
                     <a:lstStyle/>
                     <a:p>
                       <a:r>
-                        <a:rPr lang="pt-BR" sz="1600" dirty="0" smtClean="0"/>
+                        <a:rPr lang="pt-BR" sz="1600" dirty="0"/>
                         <a:t>1 - Clicar em</a:t>
                       </a:r>
                       <a:r>
-                        <a:rPr lang="pt-BR" sz="1600" baseline="0" dirty="0" smtClean="0"/>
+                        <a:rPr lang="pt-BR" sz="1600" baseline="0" dirty="0"/>
                         <a:t>: “Baixo”, no </a:t>
                       </a:r>
                       <a:r>
-                        <a:rPr lang="pt-BR" sz="1600" dirty="0" smtClean="0"/>
+                        <a:rPr lang="pt-BR" sz="1600" dirty="0"/>
                         <a:t>campo</a:t>
                       </a:r>
                       <a:r>
-                        <a:rPr lang="pt-BR" sz="1600" baseline="0" dirty="0" smtClean="0"/>
+                        <a:rPr lang="pt-BR" sz="1600" baseline="0" dirty="0"/>
                         <a:t> :“Nível de Prioridade</a:t>
                       </a:r>
                       <a:endParaRPr lang="pt-BR" sz="1600" dirty="0"/>
@@ -8584,7 +8322,7 @@
                         <a:defRPr/>
                       </a:pPr>
                       <a:r>
-                        <a:rPr lang="pt-BR" sz="1600" dirty="0" smtClean="0"/>
+                        <a:rPr lang="pt-BR" sz="1600" dirty="0"/>
                         <a:t>A cor deve ser mudada para verde</a:t>
                       </a:r>
                     </a:p>
@@ -8763,49 +8501,36 @@
               <a:defRPr/>
             </a:pPr>
             <a:r>
-              <a:rPr lang="pt-BR" b="1" dirty="0" smtClean="0"/>
+              <a:rPr lang="pt-BR" b="1" dirty="0"/>
               <a:t>RN13</a:t>
             </a:r>
             <a:r>
-              <a:rPr lang="pt-BR" dirty="0" smtClean="0"/>
-              <a:t>:</a:t>
-            </a:r>
-            <a:r>
               <a:rPr lang="pt-BR" dirty="0"/>
-              <a:t>Tela Requisição &gt; Elemento Status Estoque</a:t>
+              <a:t>:Tela Requisição &gt; Elemento Status Estoque</a:t>
             </a:r>
           </a:p>
           <a:p>
             <a:pPr lvl="0"/>
             <a:r>
-              <a:rPr lang="pt-BR" b="1" dirty="0" smtClean="0"/>
+              <a:rPr lang="pt-BR" b="1" dirty="0"/>
               <a:t>CT</a:t>
             </a:r>
             <a:r>
               <a:rPr lang="pt-BR" dirty="0"/>
-              <a:t>: O elemento Status Estoque é o retângulo exibido ao lado do campo quantidade e deve ficar com as cores a seguir e conforme </a:t>
-            </a:r>
-            <a:r>
-              <a:rPr lang="pt-BR" dirty="0" smtClean="0"/>
-              <a:t>legenda</a:t>
-            </a:r>
-            <a:r>
-              <a:rPr lang="pt-BR" dirty="0" smtClean="0"/>
-              <a:t>;</a:t>
-            </a:r>
-            <a:endParaRPr lang="pt-BR" dirty="0" smtClean="0"/>
-          </a:p>
-          <a:p>
-            <a:r>
-              <a:rPr lang="pt-BR" b="1" dirty="0" err="1" smtClean="0"/>
+              <a:t>: O elemento Status Estoque é o retângulo exibido ao lado do campo quantidade e deve ficar com as cores a seguir e conforme legenda;</a:t>
+            </a:r>
+          </a:p>
+          <a:p>
+            <a:r>
+              <a:rPr lang="pt-BR" b="1" dirty="0" err="1"/>
               <a:t>Pré</a:t>
             </a:r>
             <a:r>
-              <a:rPr lang="pt-BR" b="1" dirty="0" smtClean="0"/>
+              <a:rPr lang="pt-BR" b="1" dirty="0"/>
               <a:t>- condição</a:t>
             </a:r>
             <a:r>
-              <a:rPr lang="pt-BR" dirty="0" smtClean="0"/>
+              <a:rPr lang="pt-BR" dirty="0"/>
               <a:t>: Tela do almoxarifado deve estar aberta</a:t>
             </a:r>
             <a:endParaRPr lang="pt-BR" sz="2000" dirty="0"/>
@@ -8859,11 +8584,11 @@
                     <a:lstStyle/>
                     <a:p>
                       <a:r>
-                        <a:rPr lang="pt-BR" dirty="0" smtClean="0"/>
+                        <a:rPr lang="pt-BR" dirty="0"/>
                         <a:t>Ação</a:t>
                       </a:r>
                       <a:r>
-                        <a:rPr lang="pt-BR" baseline="0" dirty="0" smtClean="0"/>
+                        <a:rPr lang="pt-BR" baseline="0" dirty="0"/>
                         <a:t> </a:t>
                       </a:r>
                       <a:endParaRPr lang="pt-BR" dirty="0"/>
@@ -8877,11 +8602,11 @@
                     <a:lstStyle/>
                     <a:p>
                       <a:r>
-                        <a:rPr lang="pt-BR" dirty="0" smtClean="0"/>
+                        <a:rPr lang="pt-BR" dirty="0"/>
                         <a:t>Resultado</a:t>
                       </a:r>
                       <a:r>
-                        <a:rPr lang="pt-BR" baseline="0" dirty="0" smtClean="0"/>
+                        <a:rPr lang="pt-BR" baseline="0" dirty="0"/>
                         <a:t> esperado</a:t>
                       </a:r>
                       <a:endParaRPr lang="pt-BR" dirty="0"/>
@@ -8902,31 +8627,27 @@
                     <a:lstStyle/>
                     <a:p>
                       <a:r>
-                        <a:rPr lang="pt-BR" sz="1600" dirty="0" smtClean="0"/>
-                        <a:t>1 </a:t>
-                      </a:r>
-                      <a:r>
-                        <a:rPr lang="pt-BR" sz="1600" dirty="0" smtClean="0"/>
-                        <a:t>- Clicar no</a:t>
-                      </a:r>
-                      <a:r>
-                        <a:rPr lang="pt-BR" sz="1600" baseline="0" dirty="0" smtClean="0"/>
+                        <a:rPr lang="pt-BR" sz="1600" dirty="0"/>
+                        <a:t>1 - Clicar no</a:t>
+                      </a:r>
+                      <a:r>
+                        <a:rPr lang="pt-BR" sz="1600" baseline="0" dirty="0"/>
                         <a:t> </a:t>
                       </a:r>
                       <a:r>
-                        <a:rPr lang="pt-BR" sz="1600" dirty="0" smtClean="0"/>
+                        <a:rPr lang="pt-BR" sz="1600" dirty="0"/>
                         <a:t>campo</a:t>
                       </a:r>
                       <a:r>
-                        <a:rPr lang="pt-BR" sz="1600" baseline="0" dirty="0" smtClean="0"/>
+                        <a:rPr lang="pt-BR" sz="1600" baseline="0" dirty="0"/>
                         <a:t> :“</a:t>
                       </a:r>
                       <a:r>
-                        <a:rPr lang="pt-BR" sz="1600" baseline="0" dirty="0" err="1" smtClean="0"/>
+                        <a:rPr lang="pt-BR" sz="1600" baseline="0" dirty="0" err="1"/>
                         <a:t>Cod.Produto</a:t>
                       </a:r>
                       <a:r>
-                        <a:rPr lang="pt-BR" sz="1600" baseline="0" dirty="0" smtClean="0"/>
+                        <a:rPr lang="pt-BR" sz="1600" baseline="0" dirty="0"/>
                         <a:t>” e coloque o id 1</a:t>
                       </a:r>
                       <a:endParaRPr lang="pt-BR" sz="1600" dirty="0"/>
@@ -8957,11 +8678,11 @@
                         <a:defRPr/>
                       </a:pPr>
                       <a:r>
-                        <a:rPr lang="pt-BR" sz="1600" dirty="0" smtClean="0"/>
+                        <a:rPr lang="pt-BR" sz="1600" dirty="0"/>
                         <a:t>A cor do</a:t>
                       </a:r>
                       <a:r>
-                        <a:rPr lang="pt-BR" sz="1600" baseline="0" dirty="0" smtClean="0"/>
+                        <a:rPr lang="pt-BR" sz="1600" baseline="0" dirty="0"/>
                         <a:t> Status Estoque deve ser mudada para verde</a:t>
                       </a:r>
                       <a:endParaRPr lang="pt-BR" sz="1600" dirty="0"/>
@@ -8999,30 +8720,30 @@
                         <a:defRPr/>
                       </a:pPr>
                       <a:r>
-                        <a:rPr lang="pt-BR" sz="1600" dirty="0" smtClean="0"/>
+                        <a:rPr lang="pt-BR" sz="1600" dirty="0"/>
                         <a:t>2 - Clicar no</a:t>
                       </a:r>
                       <a:r>
-                        <a:rPr lang="pt-BR" sz="1600" baseline="0" dirty="0" smtClean="0"/>
+                        <a:rPr lang="pt-BR" sz="1600" baseline="0" dirty="0"/>
                         <a:t> </a:t>
                       </a:r>
                       <a:r>
-                        <a:rPr lang="pt-BR" sz="1600" dirty="0" smtClean="0"/>
+                        <a:rPr lang="pt-BR" sz="1600" dirty="0"/>
                         <a:t>campo</a:t>
                       </a:r>
                       <a:r>
-                        <a:rPr lang="pt-BR" sz="1600" baseline="0" dirty="0" smtClean="0"/>
+                        <a:rPr lang="pt-BR" sz="1600" baseline="0" dirty="0"/>
                         <a:t> :“</a:t>
                       </a:r>
                       <a:r>
-                        <a:rPr lang="pt-BR" sz="1600" baseline="0" dirty="0" err="1" smtClean="0"/>
+                        <a:rPr lang="pt-BR" sz="1600" baseline="0" dirty="0" err="1"/>
                         <a:t>Cod.Produto</a:t>
                       </a:r>
                       <a:r>
-                        <a:rPr lang="pt-BR" sz="1600" baseline="0" dirty="0" smtClean="0"/>
+                        <a:rPr lang="pt-BR" sz="1600" baseline="0" dirty="0"/>
                         <a:t>” e coloque o id 2</a:t>
                       </a:r>
-                      <a:endParaRPr lang="pt-BR" sz="1600" dirty="0" smtClean="0"/>
+                      <a:endParaRPr lang="pt-BR" sz="1600" dirty="0"/>
                     </a:p>
                     <a:p>
                       <a:endParaRPr lang="pt-BR" sz="1600" dirty="0"/>
@@ -9053,14 +8774,14 @@
                         <a:defRPr/>
                       </a:pPr>
                       <a:r>
-                        <a:rPr lang="pt-BR" sz="1600" dirty="0" smtClean="0"/>
+                        <a:rPr lang="pt-BR" sz="1600" dirty="0"/>
                         <a:t>A cor do</a:t>
                       </a:r>
                       <a:r>
-                        <a:rPr lang="pt-BR" sz="1600" baseline="0" dirty="0" smtClean="0"/>
+                        <a:rPr lang="pt-BR" sz="1600" baseline="0" dirty="0"/>
                         <a:t> Status Estoque deve ser mudada para amarela</a:t>
                       </a:r>
-                      <a:endParaRPr lang="pt-BR" sz="1600" dirty="0" smtClean="0"/>
+                      <a:endParaRPr lang="pt-BR" sz="1600" dirty="0"/>
                     </a:p>
                     <a:p>
                       <a:pPr marL="0" marR="0" indent="0" algn="l" defTabSz="914400" rtl="0" eaLnBrk="1" fontAlgn="auto" latinLnBrk="0" hangingPunct="1">
@@ -9115,30 +8836,30 @@
                         <a:defRPr/>
                       </a:pPr>
                       <a:r>
-                        <a:rPr lang="pt-BR" sz="1600" dirty="0" smtClean="0"/>
+                        <a:rPr lang="pt-BR" sz="1600" dirty="0"/>
                         <a:t>3 - Clicar no</a:t>
                       </a:r>
                       <a:r>
-                        <a:rPr lang="pt-BR" sz="1600" baseline="0" dirty="0" smtClean="0"/>
+                        <a:rPr lang="pt-BR" sz="1600" baseline="0" dirty="0"/>
                         <a:t> </a:t>
                       </a:r>
                       <a:r>
-                        <a:rPr lang="pt-BR" sz="1600" dirty="0" smtClean="0"/>
+                        <a:rPr lang="pt-BR" sz="1600" dirty="0"/>
                         <a:t>campo</a:t>
                       </a:r>
                       <a:r>
-                        <a:rPr lang="pt-BR" sz="1600" baseline="0" dirty="0" smtClean="0"/>
+                        <a:rPr lang="pt-BR" sz="1600" baseline="0" dirty="0"/>
                         <a:t> :“</a:t>
                       </a:r>
                       <a:r>
-                        <a:rPr lang="pt-BR" sz="1600" baseline="0" dirty="0" err="1" smtClean="0"/>
+                        <a:rPr lang="pt-BR" sz="1600" baseline="0" dirty="0" err="1"/>
                         <a:t>Cod.Produto</a:t>
                       </a:r>
                       <a:r>
-                        <a:rPr lang="pt-BR" sz="1600" baseline="0" dirty="0" smtClean="0"/>
+                        <a:rPr lang="pt-BR" sz="1600" baseline="0" dirty="0"/>
                         <a:t>” e coloque o id 3</a:t>
                       </a:r>
-                      <a:endParaRPr lang="pt-BR" sz="1600" dirty="0" smtClean="0"/>
+                      <a:endParaRPr lang="pt-BR" sz="1600" dirty="0"/>
                     </a:p>
                     <a:p>
                       <a:endParaRPr lang="pt-BR" sz="1600" dirty="0"/>
@@ -9169,14 +8890,14 @@
                         <a:defRPr/>
                       </a:pPr>
                       <a:r>
-                        <a:rPr lang="pt-BR" sz="1600" dirty="0" smtClean="0"/>
+                        <a:rPr lang="pt-BR" sz="1600" dirty="0"/>
                         <a:t>A cor do</a:t>
                       </a:r>
                       <a:r>
-                        <a:rPr lang="pt-BR" sz="1600" baseline="0" dirty="0" smtClean="0"/>
+                        <a:rPr lang="pt-BR" sz="1600" baseline="0" dirty="0"/>
                         <a:t> Status Estoque deve ser mudada para vermelha</a:t>
                       </a:r>
-                      <a:endParaRPr lang="pt-BR" sz="1600" dirty="0" smtClean="0"/>
+                      <a:endParaRPr lang="pt-BR" sz="1600" dirty="0"/>
                     </a:p>
                     <a:p>
                       <a:pPr marL="0" marR="0" indent="0" algn="l" defTabSz="914400" rtl="0" eaLnBrk="1" fontAlgn="auto" latinLnBrk="0" hangingPunct="1">
@@ -9350,16 +9071,12 @@
           <a:lstStyle/>
           <a:p>
             <a:r>
-              <a:rPr lang="pt-BR" b="1" dirty="0" smtClean="0"/>
+              <a:rPr lang="pt-BR" b="1" dirty="0"/>
               <a:t>RN14</a:t>
             </a:r>
             <a:r>
-              <a:rPr lang="pt-BR" dirty="0" smtClean="0"/>
-              <a:t>:</a:t>
-            </a:r>
-            <a:r>
               <a:rPr lang="pt-BR" dirty="0"/>
-              <a:t>Tela Requisição &gt; Status Estoque &gt; </a:t>
+              <a:t>:Tela Requisição &gt; Status Estoque &gt; </a:t>
             </a:r>
             <a:r>
               <a:rPr lang="pt-BR" dirty="0" err="1"/>
@@ -9370,89 +9087,48 @@
           <a:p>
             <a:pPr lvl="0"/>
             <a:r>
-              <a:rPr lang="pt-BR" b="1" dirty="0" smtClean="0"/>
+              <a:rPr lang="pt-BR" b="1" dirty="0"/>
               <a:t>CT</a:t>
             </a:r>
             <a:r>
               <a:rPr lang="pt-BR" dirty="0"/>
-              <a:t>: Ao colocar o mouse sobre o elemento Status Estoque (retângulo) deve ser exibido </a:t>
-            </a:r>
-            <a:r>
-              <a:rPr lang="pt-BR" dirty="0" smtClean="0"/>
-              <a:t>as legendas: </a:t>
+              <a:t>: Ao colocar o mouse sobre o elemento Status Estoque (retângulo) deve ser exibido as legendas: </a:t>
             </a:r>
           </a:p>
           <a:p>
             <a:pPr lvl="0"/>
             <a:r>
-              <a:rPr lang="pt-BR" dirty="0" smtClean="0"/>
+              <a:rPr lang="pt-BR" dirty="0"/>
               <a:t>- Verde: Estoque acima de 10% do Estoque mínimo</a:t>
             </a:r>
           </a:p>
           <a:p>
             <a:r>
-              <a:rPr lang="pt-BR" dirty="0" smtClean="0"/>
-              <a:t>- Amarelo: </a:t>
-            </a:r>
-            <a:r>
               <a:rPr lang="pt-BR" dirty="0"/>
-              <a:t>Estoque </a:t>
-            </a:r>
-            <a:r>
-              <a:rPr lang="pt-BR" dirty="0" smtClean="0"/>
-              <a:t>abaixo </a:t>
-            </a:r>
+              <a:t>- Amarelo: Estoque abaixo de 10% do Estoque mínimo</a:t>
+            </a:r>
+          </a:p>
+          <a:p>
             <a:r>
               <a:rPr lang="pt-BR" dirty="0"/>
-              <a:t>de 10% do Estoque </a:t>
-            </a:r>
-            <a:r>
-              <a:rPr lang="pt-BR" dirty="0" smtClean="0"/>
-              <a:t>mínimo</a:t>
-            </a:r>
-            <a:endParaRPr lang="pt-BR" dirty="0" smtClean="0"/>
-          </a:p>
-          <a:p>
+              <a:t>- Vermelho: Estoque abaixo do Estoque mínimo;</a:t>
+            </a:r>
+          </a:p>
+          <a:p>
+            <a:pPr lvl="0"/>
+            <a:endParaRPr lang="pt-BR" dirty="0"/>
+          </a:p>
+          <a:p>
+            <a:r>
+              <a:rPr lang="pt-BR" b="1" dirty="0" err="1"/>
+              <a:t>Pré</a:t>
+            </a:r>
+            <a:r>
+              <a:rPr lang="pt-BR" b="1" dirty="0"/>
+              <a:t>- condição</a:t>
+            </a:r>
             <a:r>
               <a:rPr lang="pt-BR" dirty="0"/>
-              <a:t>- </a:t>
-            </a:r>
-            <a:r>
-              <a:rPr lang="pt-BR" dirty="0" smtClean="0"/>
-              <a:t>Vermelho: </a:t>
-            </a:r>
-            <a:r>
-              <a:rPr lang="pt-BR" dirty="0"/>
-              <a:t>Estoque </a:t>
-            </a:r>
-            <a:r>
-              <a:rPr lang="pt-BR" dirty="0" smtClean="0"/>
-              <a:t>abaixo do Estoque </a:t>
-            </a:r>
-            <a:r>
-              <a:rPr lang="pt-BR" dirty="0"/>
-              <a:t>mínimo;</a:t>
-            </a:r>
-          </a:p>
-          <a:p>
-            <a:pPr lvl="0"/>
-            <a:endParaRPr lang="pt-BR" dirty="0" smtClean="0"/>
-          </a:p>
-          <a:p>
-            <a:r>
-              <a:rPr lang="pt-BR" b="1" dirty="0" err="1" smtClean="0"/>
-              <a:t>Pré</a:t>
-            </a:r>
-            <a:r>
-              <a:rPr lang="pt-BR" b="1" dirty="0" smtClean="0"/>
-              <a:t>- </a:t>
-            </a:r>
-            <a:r>
-              <a:rPr lang="pt-BR" b="1" dirty="0" smtClean="0"/>
-              <a:t>condição</a:t>
-            </a:r>
-            <a:r>
-              <a:rPr lang="pt-BR" dirty="0" smtClean="0"/>
               <a:t>: Tela do almoxarifado deve estar aberta</a:t>
             </a:r>
             <a:endParaRPr lang="pt-BR" sz="2000" dirty="0"/>
@@ -9506,11 +9182,11 @@
                     <a:lstStyle/>
                     <a:p>
                       <a:r>
-                        <a:rPr lang="pt-BR" dirty="0" smtClean="0"/>
+                        <a:rPr lang="pt-BR" dirty="0"/>
                         <a:t>Ação</a:t>
                       </a:r>
                       <a:r>
-                        <a:rPr lang="pt-BR" baseline="0" dirty="0" smtClean="0"/>
+                        <a:rPr lang="pt-BR" baseline="0" dirty="0"/>
                         <a:t> </a:t>
                       </a:r>
                       <a:endParaRPr lang="pt-BR" dirty="0"/>
@@ -9524,11 +9200,11 @@
                     <a:lstStyle/>
                     <a:p>
                       <a:r>
-                        <a:rPr lang="pt-BR" dirty="0" smtClean="0"/>
+                        <a:rPr lang="pt-BR" dirty="0"/>
                         <a:t>Resultado</a:t>
                       </a:r>
                       <a:r>
-                        <a:rPr lang="pt-BR" baseline="0" dirty="0" smtClean="0"/>
+                        <a:rPr lang="pt-BR" baseline="0" dirty="0"/>
                         <a:t> esperado</a:t>
                       </a:r>
                       <a:endParaRPr lang="pt-BR" dirty="0"/>
@@ -9549,14 +9225,9 @@
                     <a:lstStyle/>
                     <a:p>
                       <a:r>
-                        <a:rPr lang="pt-BR" sz="1600" dirty="0" smtClean="0"/>
-                        <a:t>1 </a:t>
-                      </a:r>
-                      <a:r>
-                        <a:rPr lang="pt-BR" sz="1600" dirty="0" smtClean="0"/>
-                        <a:t>– Passar o mouse sobre o Status Estoque </a:t>
-                      </a:r>
-                      <a:endParaRPr lang="pt-BR" sz="1600" dirty="0"/>
+                        <a:rPr lang="pt-BR" sz="1600" dirty="0"/>
+                        <a:t>1 – Passar o mouse sobre o Status Estoque </a:t>
+                      </a:r>
                     </a:p>
                   </a:txBody>
                   <a:tcPr/>
@@ -9584,11 +9255,11 @@
                         <a:defRPr/>
                       </a:pPr>
                       <a:r>
-                        <a:rPr lang="pt-BR" sz="1600" dirty="0" smtClean="0"/>
+                        <a:rPr lang="pt-BR" sz="1600" dirty="0"/>
                         <a:t>Exibir a</a:t>
                       </a:r>
                       <a:r>
-                        <a:rPr lang="pt-BR" sz="1600" baseline="0" dirty="0" smtClean="0"/>
+                        <a:rPr lang="pt-BR" sz="1600" baseline="0" dirty="0"/>
                         <a:t> legenda com suas respectivas cores e textos;</a:t>
                       </a:r>
                       <a:endParaRPr lang="pt-BR" sz="1600" dirty="0"/>
@@ -12203,10 +11874,9 @@
           <a:lstStyle/>
           <a:p>
             <a:r>
-              <a:rPr lang="pt-BR" b="1" dirty="0" smtClean="0"/>
+              <a:rPr lang="pt-BR" b="1" dirty="0"/>
               <a:t>Casos de testes</a:t>
             </a:r>
-            <a:endParaRPr lang="pt-BR" b="1" dirty="0"/>
           </a:p>
         </p:txBody>
       </p:sp>

</xml_diff>

<commit_message>
Todos os tdd acabados
</commit_message>
<xml_diff>
--- a/RegrasNegocio/RN_Requisitos.pptx
+++ b/RegrasNegocio/RN_Requisitos.pptx
@@ -11434,7 +11434,7 @@
         </p:blipFill>
         <p:spPr>
           <a:xfrm>
-            <a:off x="4288327" y="2179007"/>
+            <a:off x="4227870" y="2455937"/>
             <a:ext cx="2018551" cy="683599"/>
           </a:xfrm>
           <a:prstGeom prst="rect">
@@ -11464,7 +11464,7 @@
         </p:blipFill>
         <p:spPr>
           <a:xfrm>
-            <a:off x="6586326" y="2179007"/>
+            <a:off x="6506143" y="2455937"/>
             <a:ext cx="2018551" cy="714904"/>
           </a:xfrm>
           <a:prstGeom prst="rect">
@@ -11494,7 +11494,7 @@
         </p:blipFill>
         <p:spPr>
           <a:xfrm>
-            <a:off x="8784417" y="2188747"/>
+            <a:off x="8784416" y="2450720"/>
             <a:ext cx="2563521" cy="725337"/>
           </a:xfrm>
           <a:prstGeom prst="rect">

</xml_diff>